<commit_message>
Update Fake Product Identification Using Blockchain.pptx
</commit_message>
<xml_diff>
--- a/files/Fake Product Identification Using Blockchain.pptx
+++ b/files/Fake Product Identification Using Blockchain.pptx
@@ -18,7 +18,8 @@
     <p:sldId id="265" r:id="rId12"/>
     <p:sldId id="266" r:id="rId13"/>
     <p:sldId id="267" r:id="rId14"/>
-    <p:sldId id="268" r:id="rId15"/>
+    <p:sldId id="271" r:id="rId15"/>
+    <p:sldId id="268" r:id="rId16"/>
   </p:sldIdLst>
   <p:sldSz cx="12192000" cy="6858000"/>
   <p:notesSz cx="6858000" cy="9144000"/>
@@ -126,11 +127,11 @@
 </file>
 
 <file path=ppt/diagrams/colors1.xml><?xml version="1.0" encoding="utf-8"?>
-<dgm:colorsDef xmlns:dgm="http://schemas.openxmlformats.org/drawingml/2006/diagram" xmlns:a="http://schemas.openxmlformats.org/drawingml/2006/main" uniqueId="urn:microsoft.com/office/officeart/2005/8/colors/accent1_2">
+<dgm:colorsDef xmlns:dgm="http://schemas.openxmlformats.org/drawingml/2006/diagram" xmlns:a="http://schemas.openxmlformats.org/drawingml/2006/main" uniqueId="urn:microsoft.com/office/officeart/2005/8/colors/colorful2">
   <dgm:title val=""/>
   <dgm:desc val=""/>
   <dgm:catLst>
-    <dgm:cat type="accent1" pri="11200"/>
+    <dgm:cat type="colorful" pri="10200"/>
   </dgm:catLst>
   <dgm:styleLbl name="node0">
     <dgm:fillClrLst meth="repeat">
@@ -144,21 +145,10 @@
     <dgm:txFillClrLst/>
     <dgm:txEffectClrLst/>
   </dgm:styleLbl>
-  <dgm:styleLbl name="alignNode1">
-    <dgm:fillClrLst meth="repeat">
-      <a:schemeClr val="accent1"/>
-    </dgm:fillClrLst>
-    <dgm:linClrLst meth="repeat">
-      <a:schemeClr val="accent1"/>
-    </dgm:linClrLst>
-    <dgm:effectClrLst/>
-    <dgm:txLinClrLst/>
-    <dgm:txFillClrLst/>
-    <dgm:txEffectClrLst/>
-  </dgm:styleLbl>
   <dgm:styleLbl name="node1">
-    <dgm:fillClrLst meth="repeat">
-      <a:schemeClr val="accent1"/>
+    <dgm:fillClrLst>
+      <a:schemeClr val="accent2"/>
+      <a:schemeClr val="accent3"/>
     </dgm:fillClrLst>
     <dgm:linClrLst meth="repeat">
       <a:schemeClr val="lt1"/>
@@ -168,9 +158,24 @@
     <dgm:txFillClrLst/>
     <dgm:txEffectClrLst/>
   </dgm:styleLbl>
+  <dgm:styleLbl name="alignNode1">
+    <dgm:fillClrLst>
+      <a:schemeClr val="accent2"/>
+      <a:schemeClr val="accent3"/>
+    </dgm:fillClrLst>
+    <dgm:linClrLst>
+      <a:schemeClr val="accent2"/>
+      <a:schemeClr val="accent3"/>
+    </dgm:linClrLst>
+    <dgm:effectClrLst/>
+    <dgm:txLinClrLst/>
+    <dgm:txFillClrLst/>
+    <dgm:txEffectClrLst/>
+  </dgm:styleLbl>
   <dgm:styleLbl name="lnNode1">
-    <dgm:fillClrLst meth="repeat">
-      <a:schemeClr val="accent1"/>
+    <dgm:fillClrLst>
+      <a:schemeClr val="accent2"/>
+      <a:schemeClr val="accent3"/>
     </dgm:fillClrLst>
     <dgm:linClrLst meth="repeat">
       <a:schemeClr val="lt1"/>
@@ -181,8 +186,11 @@
     <dgm:txEffectClrLst/>
   </dgm:styleLbl>
   <dgm:styleLbl name="vennNode1">
-    <dgm:fillClrLst meth="repeat">
-      <a:schemeClr val="accent1">
+    <dgm:fillClrLst>
+      <a:schemeClr val="accent2">
+        <a:alpha val="50000"/>
+      </a:schemeClr>
+      <a:schemeClr val="accent3">
         <a:alpha val="50000"/>
       </a:schemeClr>
     </dgm:fillClrLst>
@@ -195,8 +203,8 @@
     <dgm:txEffectClrLst/>
   </dgm:styleLbl>
   <dgm:styleLbl name="node2">
-    <dgm:fillClrLst meth="repeat">
-      <a:schemeClr val="accent1"/>
+    <dgm:fillClrLst>
+      <a:schemeClr val="accent3"/>
     </dgm:fillClrLst>
     <dgm:linClrLst meth="repeat">
       <a:schemeClr val="lt1"/>
@@ -207,8 +215,8 @@
     <dgm:txEffectClrLst/>
   </dgm:styleLbl>
   <dgm:styleLbl name="node3">
-    <dgm:fillClrLst meth="repeat">
-      <a:schemeClr val="accent1"/>
+    <dgm:fillClrLst>
+      <a:schemeClr val="accent4"/>
     </dgm:fillClrLst>
     <dgm:linClrLst meth="repeat">
       <a:schemeClr val="lt1"/>
@@ -219,8 +227,8 @@
     <dgm:txEffectClrLst/>
   </dgm:styleLbl>
   <dgm:styleLbl name="node4">
-    <dgm:fillClrLst meth="repeat">
-      <a:schemeClr val="accent1"/>
+    <dgm:fillClrLst>
+      <a:schemeClr val="accent5"/>
     </dgm:fillClrLst>
     <dgm:linClrLst meth="repeat">
       <a:schemeClr val="lt1"/>
@@ -231,8 +239,11 @@
     <dgm:txEffectClrLst/>
   </dgm:styleLbl>
   <dgm:styleLbl name="fgImgPlace1">
-    <dgm:fillClrLst meth="repeat">
-      <a:schemeClr val="accent1">
+    <dgm:fillClrLst>
+      <a:schemeClr val="accent2">
+        <a:tint val="50000"/>
+      </a:schemeClr>
+      <a:schemeClr val="accent3">
         <a:tint val="50000"/>
       </a:schemeClr>
     </dgm:fillClrLst>
@@ -247,9 +258,12 @@
     <dgm:txEffectClrLst/>
   </dgm:styleLbl>
   <dgm:styleLbl name="alignImgPlace1">
-    <dgm:fillClrLst meth="repeat">
-      <a:schemeClr val="accent1">
+    <dgm:fillClrLst>
+      <a:schemeClr val="accent2">
         <a:tint val="50000"/>
+      </a:schemeClr>
+      <a:schemeClr val="accent3">
+        <a:tint val="20000"/>
       </a:schemeClr>
     </dgm:fillClrLst>
     <dgm:linClrLst meth="repeat">
@@ -263,9 +277,12 @@
     <dgm:txEffectClrLst/>
   </dgm:styleLbl>
   <dgm:styleLbl name="bgImgPlace1">
-    <dgm:fillClrLst meth="repeat">
-      <a:schemeClr val="accent1">
+    <dgm:fillClrLst>
+      <a:schemeClr val="accent2">
         <a:tint val="50000"/>
+      </a:schemeClr>
+      <a:schemeClr val="accent3">
+        <a:tint val="20000"/>
       </a:schemeClr>
     </dgm:fillClrLst>
     <dgm:linClrLst meth="repeat">
@@ -279,15 +296,12 @@
     <dgm:txEffectClrLst/>
   </dgm:styleLbl>
   <dgm:styleLbl name="sibTrans2D1">
-    <dgm:fillClrLst meth="repeat">
-      <a:schemeClr val="accent1">
-        <a:tint val="60000"/>
-      </a:schemeClr>
+    <dgm:fillClrLst>
+      <a:schemeClr val="accent2"/>
+      <a:schemeClr val="accent3"/>
     </dgm:fillClrLst>
     <dgm:linClrLst meth="repeat">
-      <a:schemeClr val="accent1">
-        <a:tint val="60000"/>
-      </a:schemeClr>
+      <a:schemeClr val="lt1"/>
     </dgm:linClrLst>
     <dgm:effectClrLst/>
     <dgm:txLinClrLst/>
@@ -295,43 +309,40 @@
     <dgm:txEffectClrLst/>
   </dgm:styleLbl>
   <dgm:styleLbl name="fgSibTrans2D1">
-    <dgm:fillClrLst meth="repeat">
-      <a:schemeClr val="accent1">
-        <a:tint val="60000"/>
-      </a:schemeClr>
+    <dgm:fillClrLst>
+      <a:schemeClr val="accent2"/>
+      <a:schemeClr val="accent3"/>
     </dgm:fillClrLst>
     <dgm:linClrLst meth="repeat">
-      <a:schemeClr val="accent1">
-        <a:tint val="60000"/>
-      </a:schemeClr>
+      <a:schemeClr val="lt1"/>
     </dgm:linClrLst>
     <dgm:effectClrLst/>
     <dgm:txLinClrLst/>
-    <dgm:txFillClrLst/>
+    <dgm:txFillClrLst meth="repeat">
+      <a:schemeClr val="lt1"/>
+    </dgm:txFillClrLst>
     <dgm:txEffectClrLst/>
   </dgm:styleLbl>
   <dgm:styleLbl name="bgSibTrans2D1">
-    <dgm:fillClrLst meth="repeat">
-      <a:schemeClr val="accent1">
-        <a:tint val="60000"/>
-      </a:schemeClr>
+    <dgm:fillClrLst>
+      <a:schemeClr val="accent2"/>
+      <a:schemeClr val="accent3"/>
     </dgm:fillClrLst>
     <dgm:linClrLst meth="repeat">
-      <a:schemeClr val="accent1">
-        <a:tint val="60000"/>
-      </a:schemeClr>
+      <a:schemeClr val="lt1"/>
     </dgm:linClrLst>
     <dgm:effectClrLst/>
     <dgm:txLinClrLst/>
-    <dgm:txFillClrLst/>
+    <dgm:txFillClrLst meth="repeat">
+      <a:schemeClr val="lt1"/>
+    </dgm:txFillClrLst>
     <dgm:txEffectClrLst/>
   </dgm:styleLbl>
   <dgm:styleLbl name="sibTrans1D1">
-    <dgm:fillClrLst meth="repeat">
-      <a:schemeClr val="accent1"/>
-    </dgm:fillClrLst>
-    <dgm:linClrLst meth="repeat">
-      <a:schemeClr val="accent1"/>
+    <dgm:fillClrLst/>
+    <dgm:linClrLst>
+      <a:schemeClr val="accent2"/>
+      <a:schemeClr val="accent3"/>
     </dgm:linClrLst>
     <dgm:effectClrLst/>
     <dgm:txLinClrLst/>
@@ -342,10 +353,10 @@
   </dgm:styleLbl>
   <dgm:styleLbl name="callout">
     <dgm:fillClrLst meth="repeat">
-      <a:schemeClr val="accent1"/>
+      <a:schemeClr val="accent2"/>
     </dgm:fillClrLst>
     <dgm:linClrLst meth="repeat">
-      <a:schemeClr val="accent1">
+      <a:schemeClr val="accent2">
         <a:tint val="50000"/>
       </a:schemeClr>
     </dgm:linClrLst>
@@ -358,7 +369,35 @@
   </dgm:styleLbl>
   <dgm:styleLbl name="asst0">
     <dgm:fillClrLst meth="repeat">
-      <a:schemeClr val="accent1"/>
+      <a:schemeClr val="accent2"/>
+    </dgm:fillClrLst>
+    <dgm:linClrLst meth="repeat">
+      <a:schemeClr val="lt1">
+        <a:shade val="80000"/>
+      </a:schemeClr>
+    </dgm:linClrLst>
+    <dgm:effectClrLst/>
+    <dgm:txLinClrLst/>
+    <dgm:txFillClrLst/>
+    <dgm:txEffectClrLst/>
+  </dgm:styleLbl>
+  <dgm:styleLbl name="asst1">
+    <dgm:fillClrLst meth="repeat">
+      <a:schemeClr val="accent3"/>
+    </dgm:fillClrLst>
+    <dgm:linClrLst meth="repeat">
+      <a:schemeClr val="lt1">
+        <a:shade val="80000"/>
+      </a:schemeClr>
+    </dgm:linClrLst>
+    <dgm:effectClrLst/>
+    <dgm:txLinClrLst/>
+    <dgm:txFillClrLst/>
+    <dgm:txEffectClrLst/>
+  </dgm:styleLbl>
+  <dgm:styleLbl name="asst2">
+    <dgm:fillClrLst>
+      <a:schemeClr val="accent4"/>
     </dgm:fillClrLst>
     <dgm:linClrLst meth="repeat">
       <a:schemeClr val="lt1"/>
@@ -368,9 +407,9 @@
     <dgm:txFillClrLst/>
     <dgm:txEffectClrLst/>
   </dgm:styleLbl>
-  <dgm:styleLbl name="asst1">
-    <dgm:fillClrLst meth="repeat">
-      <a:schemeClr val="accent1"/>
+  <dgm:styleLbl name="asst3">
+    <dgm:fillClrLst>
+      <a:schemeClr val="accent5"/>
     </dgm:fillClrLst>
     <dgm:linClrLst meth="repeat">
       <a:schemeClr val="lt1"/>
@@ -380,9 +419,9 @@
     <dgm:txFillClrLst/>
     <dgm:txEffectClrLst/>
   </dgm:styleLbl>
-  <dgm:styleLbl name="asst2">
-    <dgm:fillClrLst meth="repeat">
-      <a:schemeClr val="accent1"/>
+  <dgm:styleLbl name="asst4">
+    <dgm:fillClrLst>
+      <a:schemeClr val="accent6"/>
     </dgm:fillClrLst>
     <dgm:linClrLst meth="repeat">
       <a:schemeClr val="lt1"/>
@@ -392,9 +431,23 @@
     <dgm:txFillClrLst/>
     <dgm:txEffectClrLst/>
   </dgm:styleLbl>
-  <dgm:styleLbl name="asst3">
+  <dgm:styleLbl name="parChTrans2D1">
     <dgm:fillClrLst meth="repeat">
-      <a:schemeClr val="accent1"/>
+      <a:schemeClr val="accent2"/>
+    </dgm:fillClrLst>
+    <dgm:linClrLst meth="repeat">
+      <a:schemeClr val="lt1"/>
+    </dgm:linClrLst>
+    <dgm:effectClrLst/>
+    <dgm:txLinClrLst/>
+    <dgm:txFillClrLst meth="repeat">
+      <a:schemeClr val="lt1"/>
+    </dgm:txFillClrLst>
+    <dgm:txEffectClrLst/>
+  </dgm:styleLbl>
+  <dgm:styleLbl name="parChTrans2D2">
+    <dgm:fillClrLst meth="repeat">
+      <a:schemeClr val="accent3"/>
     </dgm:fillClrLst>
     <dgm:linClrLst meth="repeat">
       <a:schemeClr val="lt1"/>
@@ -404,9 +457,9 @@
     <dgm:txFillClrLst/>
     <dgm:txEffectClrLst/>
   </dgm:styleLbl>
-  <dgm:styleLbl name="asst4">
+  <dgm:styleLbl name="parChTrans2D3">
     <dgm:fillClrLst meth="repeat">
-      <a:schemeClr val="accent1"/>
+      <a:schemeClr val="accent4"/>
     </dgm:fillClrLst>
     <dgm:linClrLst meth="repeat">
       <a:schemeClr val="lt1"/>
@@ -416,16 +469,12 @@
     <dgm:txFillClrLst/>
     <dgm:txEffectClrLst/>
   </dgm:styleLbl>
-  <dgm:styleLbl name="parChTrans2D1">
+  <dgm:styleLbl name="parChTrans2D4">
     <dgm:fillClrLst meth="repeat">
-      <a:schemeClr val="accent1">
-        <a:tint val="60000"/>
-      </a:schemeClr>
+      <a:schemeClr val="accent5"/>
     </dgm:fillClrLst>
     <dgm:linClrLst meth="repeat">
-      <a:schemeClr val="accent1">
-        <a:tint val="60000"/>
-      </a:schemeClr>
+      <a:schemeClr val="lt1"/>
     </dgm:linClrLst>
     <dgm:effectClrLst/>
     <dgm:txLinClrLst/>
@@ -434,56 +483,12 @@
     </dgm:txFillClrLst>
     <dgm:txEffectClrLst/>
   </dgm:styleLbl>
-  <dgm:styleLbl name="parChTrans2D2">
+  <dgm:styleLbl name="parChTrans1D1">
     <dgm:fillClrLst meth="repeat">
-      <a:schemeClr val="accent1"/>
+      <a:schemeClr val="accent2"/>
     </dgm:fillClrLst>
     <dgm:linClrLst meth="repeat">
-      <a:schemeClr val="accent1"/>
-    </dgm:linClrLst>
-    <dgm:effectClrLst/>
-    <dgm:txLinClrLst/>
-    <dgm:txFillClrLst meth="repeat">
-      <a:schemeClr val="lt1"/>
-    </dgm:txFillClrLst>
-    <dgm:txEffectClrLst/>
-  </dgm:styleLbl>
-  <dgm:styleLbl name="parChTrans2D3">
-    <dgm:fillClrLst meth="repeat">
-      <a:schemeClr val="accent1"/>
-    </dgm:fillClrLst>
-    <dgm:linClrLst meth="repeat">
-      <a:schemeClr val="accent1"/>
-    </dgm:linClrLst>
-    <dgm:effectClrLst/>
-    <dgm:txLinClrLst/>
-    <dgm:txFillClrLst meth="repeat">
-      <a:schemeClr val="lt1"/>
-    </dgm:txFillClrLst>
-    <dgm:txEffectClrLst/>
-  </dgm:styleLbl>
-  <dgm:styleLbl name="parChTrans2D4">
-    <dgm:fillClrLst meth="repeat">
-      <a:schemeClr val="accent1"/>
-    </dgm:fillClrLst>
-    <dgm:linClrLst meth="repeat">
-      <a:schemeClr val="accent1"/>
-    </dgm:linClrLst>
-    <dgm:effectClrLst/>
-    <dgm:txLinClrLst/>
-    <dgm:txFillClrLst meth="repeat">
-      <a:schemeClr val="lt1"/>
-    </dgm:txFillClrLst>
-    <dgm:txEffectClrLst/>
-  </dgm:styleLbl>
-  <dgm:styleLbl name="parChTrans1D1">
-    <dgm:fillClrLst meth="repeat">
-      <a:schemeClr val="accent1"/>
-    </dgm:fillClrLst>
-    <dgm:linClrLst meth="repeat">
-      <a:schemeClr val="accent1">
-        <a:shade val="60000"/>
-      </a:schemeClr>
+      <a:schemeClr val="accent2"/>
     </dgm:linClrLst>
     <dgm:effectClrLst/>
     <dgm:txLinClrLst/>
@@ -494,12 +499,12 @@
   </dgm:styleLbl>
   <dgm:styleLbl name="parChTrans1D2">
     <dgm:fillClrLst meth="repeat">
-      <a:schemeClr val="accent1"/>
+      <a:schemeClr val="accent2">
+        <a:tint val="90000"/>
+      </a:schemeClr>
     </dgm:fillClrLst>
     <dgm:linClrLst meth="repeat">
-      <a:schemeClr val="accent1">
-        <a:shade val="60000"/>
-      </a:schemeClr>
+      <a:schemeClr val="accent3"/>
     </dgm:linClrLst>
     <dgm:effectClrLst/>
     <dgm:txLinClrLst/>
@@ -510,12 +515,12 @@
   </dgm:styleLbl>
   <dgm:styleLbl name="parChTrans1D3">
     <dgm:fillClrLst meth="repeat">
-      <a:schemeClr val="accent1"/>
+      <a:schemeClr val="accent2">
+        <a:tint val="70000"/>
+      </a:schemeClr>
     </dgm:fillClrLst>
     <dgm:linClrLst meth="repeat">
-      <a:schemeClr val="accent1">
-        <a:shade val="80000"/>
-      </a:schemeClr>
+      <a:schemeClr val="accent4"/>
     </dgm:linClrLst>
     <dgm:effectClrLst/>
     <dgm:txLinClrLst/>
@@ -526,12 +531,12 @@
   </dgm:styleLbl>
   <dgm:styleLbl name="parChTrans1D4">
     <dgm:fillClrLst meth="repeat">
-      <a:schemeClr val="accent1"/>
+      <a:schemeClr val="accent2">
+        <a:tint val="50000"/>
+      </a:schemeClr>
     </dgm:fillClrLst>
     <dgm:linClrLst meth="repeat">
-      <a:schemeClr val="accent1">
-        <a:shade val="80000"/>
-      </a:schemeClr>
+      <a:schemeClr val="accent5"/>
     </dgm:linClrLst>
     <dgm:effectClrLst/>
     <dgm:txLinClrLst/>
@@ -546,7 +551,220 @@
         <a:alpha val="90000"/>
       </a:schemeClr>
     </dgm:fillClrLst>
+    <dgm:linClrLst>
+      <a:schemeClr val="accent2"/>
+      <a:schemeClr val="accent3"/>
+    </dgm:linClrLst>
+    <dgm:effectClrLst/>
+    <dgm:txLinClrLst/>
+    <dgm:txFillClrLst meth="repeat">
+      <a:schemeClr val="dk1"/>
+    </dgm:txFillClrLst>
+    <dgm:txEffectClrLst/>
+  </dgm:styleLbl>
+  <dgm:styleLbl name="conFgAcc1">
+    <dgm:fillClrLst meth="repeat">
+      <a:schemeClr val="lt1">
+        <a:alpha val="90000"/>
+      </a:schemeClr>
+    </dgm:fillClrLst>
+    <dgm:linClrLst>
+      <a:schemeClr val="accent2"/>
+      <a:schemeClr val="accent3"/>
+    </dgm:linClrLst>
+    <dgm:effectClrLst/>
+    <dgm:txLinClrLst/>
+    <dgm:txFillClrLst meth="repeat">
+      <a:schemeClr val="dk1"/>
+    </dgm:txFillClrLst>
+    <dgm:txEffectClrLst/>
+  </dgm:styleLbl>
+  <dgm:styleLbl name="alignAcc1">
+    <dgm:fillClrLst meth="repeat">
+      <a:schemeClr val="lt1">
+        <a:alpha val="90000"/>
+      </a:schemeClr>
+    </dgm:fillClrLst>
+    <dgm:linClrLst>
+      <a:schemeClr val="accent2"/>
+      <a:schemeClr val="accent3"/>
+    </dgm:linClrLst>
+    <dgm:effectClrLst/>
+    <dgm:txLinClrLst/>
+    <dgm:txFillClrLst meth="repeat">
+      <a:schemeClr val="dk1"/>
+    </dgm:txFillClrLst>
+    <dgm:txEffectClrLst/>
+  </dgm:styleLbl>
+  <dgm:styleLbl name="trAlignAcc1">
+    <dgm:fillClrLst meth="repeat">
+      <a:schemeClr val="lt1">
+        <a:alpha val="40000"/>
+      </a:schemeClr>
+    </dgm:fillClrLst>
     <dgm:linClrLst meth="repeat">
+      <a:schemeClr val="accent2"/>
+    </dgm:linClrLst>
+    <dgm:effectClrLst/>
+    <dgm:txLinClrLst/>
+    <dgm:txFillClrLst meth="repeat">
+      <a:schemeClr val="dk1"/>
+    </dgm:txFillClrLst>
+    <dgm:txEffectClrLst/>
+  </dgm:styleLbl>
+  <dgm:styleLbl name="bgAcc1">
+    <dgm:fillClrLst meth="repeat">
+      <a:schemeClr val="lt1">
+        <a:alpha val="90000"/>
+      </a:schemeClr>
+    </dgm:fillClrLst>
+    <dgm:linClrLst>
+      <a:schemeClr val="accent2"/>
+      <a:schemeClr val="accent3"/>
+    </dgm:linClrLst>
+    <dgm:effectClrLst/>
+    <dgm:txLinClrLst/>
+    <dgm:txFillClrLst meth="repeat">
+      <a:schemeClr val="dk1"/>
+    </dgm:txFillClrLst>
+    <dgm:txEffectClrLst/>
+  </dgm:styleLbl>
+  <dgm:styleLbl name="solidFgAcc1">
+    <dgm:fillClrLst meth="repeat">
+      <a:schemeClr val="lt1"/>
+    </dgm:fillClrLst>
+    <dgm:linClrLst>
+      <a:schemeClr val="accent2"/>
+      <a:schemeClr val="accent3"/>
+    </dgm:linClrLst>
+    <dgm:effectClrLst/>
+    <dgm:txLinClrLst/>
+    <dgm:txFillClrLst meth="repeat">
+      <a:schemeClr val="dk1"/>
+    </dgm:txFillClrLst>
+    <dgm:txEffectClrLst/>
+  </dgm:styleLbl>
+  <dgm:styleLbl name="solidAlignAcc1">
+    <dgm:fillClrLst meth="repeat">
+      <a:schemeClr val="lt1"/>
+    </dgm:fillClrLst>
+    <dgm:linClrLst>
+      <a:schemeClr val="accent2"/>
+      <a:schemeClr val="accent3"/>
+    </dgm:linClrLst>
+    <dgm:effectClrLst/>
+    <dgm:txLinClrLst/>
+    <dgm:txFillClrLst meth="repeat">
+      <a:schemeClr val="dk1"/>
+    </dgm:txFillClrLst>
+    <dgm:txEffectClrLst/>
+  </dgm:styleLbl>
+  <dgm:styleLbl name="solidBgAcc1">
+    <dgm:fillClrLst meth="repeat">
+      <a:schemeClr val="lt1"/>
+    </dgm:fillClrLst>
+    <dgm:linClrLst>
+      <a:schemeClr val="accent2"/>
+      <a:schemeClr val="accent3"/>
+    </dgm:linClrLst>
+    <dgm:effectClrLst/>
+    <dgm:txLinClrLst/>
+    <dgm:txFillClrLst meth="repeat">
+      <a:schemeClr val="dk1"/>
+    </dgm:txFillClrLst>
+    <dgm:txEffectClrLst/>
+  </dgm:styleLbl>
+  <dgm:styleLbl name="fgAccFollowNode1">
+    <dgm:fillClrLst>
+      <a:schemeClr val="accent2">
+        <a:tint val="40000"/>
+        <a:alpha val="90000"/>
+      </a:schemeClr>
+      <a:schemeClr val="accent3">
+        <a:tint val="40000"/>
+        <a:alpha val="90000"/>
+      </a:schemeClr>
+    </dgm:fillClrLst>
+    <dgm:linClrLst>
+      <a:schemeClr val="accent2">
+        <a:tint val="40000"/>
+        <a:alpha val="90000"/>
+      </a:schemeClr>
+      <a:schemeClr val="accent3">
+        <a:tint val="40000"/>
+        <a:alpha val="90000"/>
+      </a:schemeClr>
+    </dgm:linClrLst>
+    <dgm:effectClrLst/>
+    <dgm:txLinClrLst/>
+    <dgm:txFillClrLst meth="repeat">
+      <a:schemeClr val="dk1"/>
+    </dgm:txFillClrLst>
+    <dgm:txEffectClrLst/>
+  </dgm:styleLbl>
+  <dgm:styleLbl name="alignAccFollowNode1">
+    <dgm:fillClrLst>
+      <a:schemeClr val="accent2">
+        <a:tint val="40000"/>
+        <a:alpha val="90000"/>
+      </a:schemeClr>
+      <a:schemeClr val="accent3">
+        <a:tint val="40000"/>
+        <a:alpha val="90000"/>
+      </a:schemeClr>
+    </dgm:fillClrLst>
+    <dgm:linClrLst>
+      <a:schemeClr val="accent2">
+        <a:tint val="40000"/>
+        <a:alpha val="90000"/>
+      </a:schemeClr>
+      <a:schemeClr val="accent3">
+        <a:tint val="40000"/>
+        <a:alpha val="90000"/>
+      </a:schemeClr>
+    </dgm:linClrLst>
+    <dgm:effectClrLst/>
+    <dgm:txLinClrLst/>
+    <dgm:txFillClrLst meth="repeat">
+      <a:schemeClr val="dk1"/>
+    </dgm:txFillClrLst>
+    <dgm:txEffectClrLst/>
+  </dgm:styleLbl>
+  <dgm:styleLbl name="bgAccFollowNode1">
+    <dgm:fillClrLst>
+      <a:schemeClr val="accent2">
+        <a:tint val="40000"/>
+        <a:alpha val="90000"/>
+      </a:schemeClr>
+      <a:schemeClr val="accent3">
+        <a:tint val="40000"/>
+        <a:alpha val="90000"/>
+      </a:schemeClr>
+    </dgm:fillClrLst>
+    <dgm:linClrLst>
+      <a:schemeClr val="accent2">
+        <a:tint val="40000"/>
+        <a:alpha val="90000"/>
+      </a:schemeClr>
+      <a:schemeClr val="accent3">
+        <a:tint val="40000"/>
+        <a:alpha val="90000"/>
+      </a:schemeClr>
+    </dgm:linClrLst>
+    <dgm:effectClrLst/>
+    <dgm:txLinClrLst/>
+    <dgm:txFillClrLst meth="repeat">
+      <a:schemeClr val="dk1"/>
+    </dgm:txFillClrLst>
+    <dgm:txEffectClrLst/>
+  </dgm:styleLbl>
+  <dgm:styleLbl name="fgAcc0">
+    <dgm:fillClrLst meth="repeat">
+      <a:schemeClr val="lt1">
+        <a:alpha val="90000"/>
+      </a:schemeClr>
+    </dgm:fillClrLst>
+    <dgm:linClrLst>
       <a:schemeClr val="accent1"/>
     </dgm:linClrLst>
     <dgm:effectClrLst/>
@@ -556,14 +774,14 @@
     </dgm:txFillClrLst>
     <dgm:txEffectClrLst/>
   </dgm:styleLbl>
-  <dgm:styleLbl name="conFgAcc1">
+  <dgm:styleLbl name="fgAcc2">
     <dgm:fillClrLst meth="repeat">
       <a:schemeClr val="lt1">
         <a:alpha val="90000"/>
       </a:schemeClr>
     </dgm:fillClrLst>
-    <dgm:linClrLst meth="repeat">
-      <a:schemeClr val="accent1"/>
+    <dgm:linClrLst>
+      <a:schemeClr val="accent3"/>
     </dgm:linClrLst>
     <dgm:effectClrLst/>
     <dgm:txLinClrLst/>
@@ -572,14 +790,14 @@
     </dgm:txFillClrLst>
     <dgm:txEffectClrLst/>
   </dgm:styleLbl>
-  <dgm:styleLbl name="alignAcc1">
+  <dgm:styleLbl name="fgAcc3">
     <dgm:fillClrLst meth="repeat">
       <a:schemeClr val="lt1">
         <a:alpha val="90000"/>
       </a:schemeClr>
     </dgm:fillClrLst>
-    <dgm:linClrLst meth="repeat">
-      <a:schemeClr val="accent1"/>
+    <dgm:linClrLst>
+      <a:schemeClr val="accent4"/>
     </dgm:linClrLst>
     <dgm:effectClrLst/>
     <dgm:txLinClrLst/>
@@ -588,14 +806,14 @@
     </dgm:txFillClrLst>
     <dgm:txEffectClrLst/>
   </dgm:styleLbl>
-  <dgm:styleLbl name="trAlignAcc1">
+  <dgm:styleLbl name="fgAcc4">
     <dgm:fillClrLst meth="repeat">
       <a:schemeClr val="lt1">
-        <a:alpha val="40000"/>
+        <a:alpha val="90000"/>
       </a:schemeClr>
     </dgm:fillClrLst>
-    <dgm:linClrLst meth="repeat">
-      <a:schemeClr val="accent1"/>
+    <dgm:linClrLst>
+      <a:schemeClr val="accent5"/>
     </dgm:linClrLst>
     <dgm:effectClrLst/>
     <dgm:txLinClrLst/>
@@ -604,14 +822,14 @@
     </dgm:txFillClrLst>
     <dgm:txEffectClrLst/>
   </dgm:styleLbl>
-  <dgm:styleLbl name="bgAcc1">
+  <dgm:styleLbl name="bgShp">
     <dgm:fillClrLst meth="repeat">
-      <a:schemeClr val="lt1">
-        <a:alpha val="90000"/>
+      <a:schemeClr val="accent2">
+        <a:tint val="40000"/>
       </a:schemeClr>
     </dgm:fillClrLst>
     <dgm:linClrLst meth="repeat">
-      <a:schemeClr val="accent1"/>
+      <a:schemeClr val="dk1"/>
     </dgm:linClrLst>
     <dgm:effectClrLst/>
     <dgm:txLinClrLst/>
@@ -620,196 +838,14 @@
     </dgm:txFillClrLst>
     <dgm:txEffectClrLst/>
   </dgm:styleLbl>
-  <dgm:styleLbl name="solidFgAcc1">
+  <dgm:styleLbl name="dkBgShp">
     <dgm:fillClrLst meth="repeat">
-      <a:schemeClr val="lt1"/>
-    </dgm:fillClrLst>
-    <dgm:linClrLst meth="repeat">
-      <a:schemeClr val="accent1"/>
-    </dgm:linClrLst>
-    <dgm:effectClrLst/>
-    <dgm:txLinClrLst/>
-    <dgm:txFillClrLst meth="repeat">
-      <a:schemeClr val="dk1"/>
-    </dgm:txFillClrLst>
-    <dgm:txEffectClrLst/>
-  </dgm:styleLbl>
-  <dgm:styleLbl name="solidAlignAcc1">
-    <dgm:fillClrLst meth="repeat">
-      <a:schemeClr val="lt1"/>
-    </dgm:fillClrLst>
-    <dgm:linClrLst meth="repeat">
-      <a:schemeClr val="accent1"/>
-    </dgm:linClrLst>
-    <dgm:effectClrLst/>
-    <dgm:txLinClrLst/>
-    <dgm:txFillClrLst meth="repeat">
-      <a:schemeClr val="dk1"/>
-    </dgm:txFillClrLst>
-    <dgm:txEffectClrLst/>
-  </dgm:styleLbl>
-  <dgm:styleLbl name="solidBgAcc1">
-    <dgm:fillClrLst meth="repeat">
-      <a:schemeClr val="lt1"/>
-    </dgm:fillClrLst>
-    <dgm:linClrLst meth="repeat">
-      <a:schemeClr val="accent1"/>
-    </dgm:linClrLst>
-    <dgm:effectClrLst/>
-    <dgm:txLinClrLst/>
-    <dgm:txFillClrLst meth="repeat">
-      <a:schemeClr val="dk1"/>
-    </dgm:txFillClrLst>
-    <dgm:txEffectClrLst/>
-  </dgm:styleLbl>
-  <dgm:styleLbl name="fgAccFollowNode1">
-    <dgm:fillClrLst meth="repeat">
-      <a:schemeClr val="accent1">
-        <a:alpha val="90000"/>
-        <a:tint val="40000"/>
+      <a:schemeClr val="accent2">
+        <a:shade val="90000"/>
       </a:schemeClr>
     </dgm:fillClrLst>
     <dgm:linClrLst meth="repeat">
-      <a:schemeClr val="accent1">
-        <a:alpha val="90000"/>
-        <a:tint val="40000"/>
-      </a:schemeClr>
-    </dgm:linClrLst>
-    <dgm:effectClrLst/>
-    <dgm:txLinClrLst/>
-    <dgm:txFillClrLst meth="repeat">
       <a:schemeClr val="dk1"/>
-    </dgm:txFillClrLst>
-    <dgm:txEffectClrLst/>
-  </dgm:styleLbl>
-  <dgm:styleLbl name="alignAccFollowNode1">
-    <dgm:fillClrLst meth="repeat">
-      <a:schemeClr val="accent1">
-        <a:alpha val="90000"/>
-        <a:tint val="40000"/>
-      </a:schemeClr>
-    </dgm:fillClrLst>
-    <dgm:linClrLst meth="repeat">
-      <a:schemeClr val="accent1">
-        <a:alpha val="90000"/>
-        <a:tint val="40000"/>
-      </a:schemeClr>
-    </dgm:linClrLst>
-    <dgm:effectClrLst/>
-    <dgm:txLinClrLst/>
-    <dgm:txFillClrLst meth="repeat">
-      <a:schemeClr val="dk1"/>
-    </dgm:txFillClrLst>
-    <dgm:txEffectClrLst/>
-  </dgm:styleLbl>
-  <dgm:styleLbl name="bgAccFollowNode1">
-    <dgm:fillClrLst meth="repeat">
-      <a:schemeClr val="accent1">
-        <a:alpha val="90000"/>
-        <a:tint val="40000"/>
-      </a:schemeClr>
-    </dgm:fillClrLst>
-    <dgm:linClrLst meth="repeat">
-      <a:schemeClr val="accent1">
-        <a:alpha val="90000"/>
-        <a:tint val="40000"/>
-      </a:schemeClr>
-    </dgm:linClrLst>
-    <dgm:effectClrLst/>
-    <dgm:txLinClrLst/>
-    <dgm:txFillClrLst meth="repeat">
-      <a:schemeClr val="dk1"/>
-    </dgm:txFillClrLst>
-    <dgm:txEffectClrLst/>
-  </dgm:styleLbl>
-  <dgm:styleLbl name="fgAcc0">
-    <dgm:fillClrLst meth="repeat">
-      <a:schemeClr val="lt1">
-        <a:alpha val="90000"/>
-      </a:schemeClr>
-    </dgm:fillClrLst>
-    <dgm:linClrLst meth="repeat">
-      <a:schemeClr val="accent1"/>
-    </dgm:linClrLst>
-    <dgm:effectClrLst/>
-    <dgm:txLinClrLst/>
-    <dgm:txFillClrLst meth="repeat">
-      <a:schemeClr val="dk1"/>
-    </dgm:txFillClrLst>
-    <dgm:txEffectClrLst/>
-  </dgm:styleLbl>
-  <dgm:styleLbl name="fgAcc2">
-    <dgm:fillClrLst meth="repeat">
-      <a:schemeClr val="lt1">
-        <a:alpha val="90000"/>
-      </a:schemeClr>
-    </dgm:fillClrLst>
-    <dgm:linClrLst meth="repeat">
-      <a:schemeClr val="accent1"/>
-    </dgm:linClrLst>
-    <dgm:effectClrLst/>
-    <dgm:txLinClrLst/>
-    <dgm:txFillClrLst meth="repeat">
-      <a:schemeClr val="dk1"/>
-    </dgm:txFillClrLst>
-    <dgm:txEffectClrLst/>
-  </dgm:styleLbl>
-  <dgm:styleLbl name="fgAcc3">
-    <dgm:fillClrLst meth="repeat">
-      <a:schemeClr val="lt1">
-        <a:alpha val="90000"/>
-      </a:schemeClr>
-    </dgm:fillClrLst>
-    <dgm:linClrLst meth="repeat">
-      <a:schemeClr val="accent1"/>
-    </dgm:linClrLst>
-    <dgm:effectClrLst/>
-    <dgm:txLinClrLst/>
-    <dgm:txFillClrLst meth="repeat">
-      <a:schemeClr val="dk1"/>
-    </dgm:txFillClrLst>
-    <dgm:txEffectClrLst/>
-  </dgm:styleLbl>
-  <dgm:styleLbl name="fgAcc4">
-    <dgm:fillClrLst meth="repeat">
-      <a:schemeClr val="lt1">
-        <a:alpha val="90000"/>
-      </a:schemeClr>
-    </dgm:fillClrLst>
-    <dgm:linClrLst meth="repeat">
-      <a:schemeClr val="accent1"/>
-    </dgm:linClrLst>
-    <dgm:effectClrLst/>
-    <dgm:txLinClrLst/>
-    <dgm:txFillClrLst meth="repeat">
-      <a:schemeClr val="dk1"/>
-    </dgm:txFillClrLst>
-    <dgm:txEffectClrLst/>
-  </dgm:styleLbl>
-  <dgm:styleLbl name="bgShp">
-    <dgm:fillClrLst meth="repeat">
-      <a:schemeClr val="accent1">
-        <a:tint val="40000"/>
-      </a:schemeClr>
-    </dgm:fillClrLst>
-    <dgm:linClrLst meth="repeat">
-      <a:schemeClr val="accent1"/>
-    </dgm:linClrLst>
-    <dgm:effectClrLst/>
-    <dgm:txLinClrLst/>
-    <dgm:txFillClrLst meth="repeat">
-      <a:schemeClr val="dk1"/>
-    </dgm:txFillClrLst>
-    <dgm:txEffectClrLst/>
-  </dgm:styleLbl>
-  <dgm:styleLbl name="dkBgShp">
-    <dgm:fillClrLst meth="repeat">
-      <a:schemeClr val="accent1">
-        <a:shade val="80000"/>
-      </a:schemeClr>
-    </dgm:fillClrLst>
-    <dgm:linClrLst meth="repeat">
-      <a:schemeClr val="accent1"/>
     </dgm:linClrLst>
     <dgm:effectClrLst/>
     <dgm:txLinClrLst/>
@@ -820,13 +856,13 @@
   </dgm:styleLbl>
   <dgm:styleLbl name="trBgShp">
     <dgm:fillClrLst meth="repeat">
-      <a:schemeClr val="accent1">
+      <a:schemeClr val="accent2">
         <a:tint val="50000"/>
         <a:alpha val="40000"/>
       </a:schemeClr>
     </dgm:fillClrLst>
     <dgm:linClrLst meth="repeat">
-      <a:schemeClr val="accent1"/>
+      <a:schemeClr val="accent2"/>
     </dgm:linClrLst>
     <dgm:effectClrLst/>
     <dgm:txLinClrLst/>
@@ -837,8 +873,8 @@
   </dgm:styleLbl>
   <dgm:styleLbl name="fgShp">
     <dgm:fillClrLst meth="repeat">
-      <a:schemeClr val="accent1">
-        <a:tint val="60000"/>
+      <a:schemeClr val="accent2">
+        <a:tint val="40000"/>
       </a:schemeClr>
     </dgm:fillClrLst>
     <dgm:linClrLst meth="repeat">
@@ -1795,7 +1831,7 @@
 <dgm:dataModel xmlns:dgm="http://schemas.openxmlformats.org/drawingml/2006/diagram" xmlns:a="http://schemas.openxmlformats.org/drawingml/2006/main">
   <dgm:ptLst>
     <dgm:pt modelId="{6B2A22D3-FE59-4FFA-89F8-CC8CCF710A45}" type="doc">
-      <dgm:prSet loTypeId="urn:microsoft.com/office/officeart/2008/layout/LinedList" loCatId="list" qsTypeId="urn:microsoft.com/office/officeart/2005/8/quickstyle/simple2" qsCatId="simple" csTypeId="urn:microsoft.com/office/officeart/2005/8/colors/accent1_2" csCatId="accent1"/>
+      <dgm:prSet loTypeId="urn:microsoft.com/office/officeart/2008/layout/LinedList" loCatId="list" qsTypeId="urn:microsoft.com/office/officeart/2005/8/quickstyle/simple4" qsCatId="simple" csTypeId="urn:microsoft.com/office/officeart/2005/8/colors/colorful2" csCatId="colorful"/>
       <dgm:spPr/>
       <dgm:t>
         <a:bodyPr/>
@@ -2201,7 +2237,7 @@
         </a:p>
       </dgm:t>
     </dgm:pt>
-    <dgm:pt modelId="{B0C990DB-E5C8-41A5-AEC0-4168B9B33676}" type="pres">
+    <dgm:pt modelId="{13D3CA98-3A1A-4231-8FA8-AFB8EA99FE7B}" type="pres">
       <dgm:prSet presAssocID="{6B2A22D3-FE59-4FFA-89F8-CC8CCF710A45}" presName="vert0" presStyleCnt="0">
         <dgm:presLayoutVars>
           <dgm:dir/>
@@ -2211,251 +2247,251 @@
       </dgm:prSet>
       <dgm:spPr/>
     </dgm:pt>
-    <dgm:pt modelId="{9C9397AF-9607-4223-B77E-98CD877F37F4}" type="pres">
+    <dgm:pt modelId="{A7CB411C-2FB3-459C-BC45-BA0B97A1AC3A}" type="pres">
       <dgm:prSet presAssocID="{2A81A14B-7062-4FED-BD70-8C7ED516BD95}" presName="thickLine" presStyleLbl="alignNode1" presStyleIdx="0" presStyleCnt="11"/>
       <dgm:spPr/>
     </dgm:pt>
-    <dgm:pt modelId="{914BCF8D-4FF2-44D1-9710-315B82456521}" type="pres">
+    <dgm:pt modelId="{26A66081-0D96-44AF-82D2-A0EE8C49D0E6}" type="pres">
       <dgm:prSet presAssocID="{2A81A14B-7062-4FED-BD70-8C7ED516BD95}" presName="horz1" presStyleCnt="0"/>
       <dgm:spPr/>
     </dgm:pt>
-    <dgm:pt modelId="{D828109D-0A1E-43BF-82B2-EF3E25607856}" type="pres">
+    <dgm:pt modelId="{84706E19-1587-4374-8632-8C90741F51B6}" type="pres">
       <dgm:prSet presAssocID="{2A81A14B-7062-4FED-BD70-8C7ED516BD95}" presName="tx1" presStyleLbl="revTx" presStyleIdx="0" presStyleCnt="11"/>
       <dgm:spPr/>
     </dgm:pt>
-    <dgm:pt modelId="{698FC688-B868-4674-8142-0EF44E791AB0}" type="pres">
+    <dgm:pt modelId="{17CD7394-32CB-475E-936D-D604D2FB4F1D}" type="pres">
       <dgm:prSet presAssocID="{2A81A14B-7062-4FED-BD70-8C7ED516BD95}" presName="vert1" presStyleCnt="0"/>
       <dgm:spPr/>
     </dgm:pt>
-    <dgm:pt modelId="{EA5B6C39-3A21-4D58-BACA-F70755D16C22}" type="pres">
+    <dgm:pt modelId="{401D2D4C-7F31-477B-A9C8-A3671D712C33}" type="pres">
       <dgm:prSet presAssocID="{ECC538E9-9F29-4521-B5D1-17A9B2A3EC83}" presName="thickLine" presStyleLbl="alignNode1" presStyleIdx="1" presStyleCnt="11"/>
       <dgm:spPr/>
     </dgm:pt>
-    <dgm:pt modelId="{FAFA33B0-C1E5-4B05-A951-7E0E135B8CD4}" type="pres">
+    <dgm:pt modelId="{42EF963F-39E4-4998-B787-9E6D3E78A133}" type="pres">
       <dgm:prSet presAssocID="{ECC538E9-9F29-4521-B5D1-17A9B2A3EC83}" presName="horz1" presStyleCnt="0"/>
       <dgm:spPr/>
     </dgm:pt>
-    <dgm:pt modelId="{0A832B16-A47A-4B21-B37F-06722932084A}" type="pres">
+    <dgm:pt modelId="{FE25F505-2401-401A-AE2C-8102B695BC00}" type="pres">
       <dgm:prSet presAssocID="{ECC538E9-9F29-4521-B5D1-17A9B2A3EC83}" presName="tx1" presStyleLbl="revTx" presStyleIdx="1" presStyleCnt="11"/>
       <dgm:spPr/>
     </dgm:pt>
-    <dgm:pt modelId="{9131A93C-F361-4DAB-A7F9-D3C9361D30CD}" type="pres">
+    <dgm:pt modelId="{5FAF38A4-93FB-4C38-A9E4-8A8B297C0845}" type="pres">
       <dgm:prSet presAssocID="{ECC538E9-9F29-4521-B5D1-17A9B2A3EC83}" presName="vert1" presStyleCnt="0"/>
       <dgm:spPr/>
     </dgm:pt>
-    <dgm:pt modelId="{7E717C3A-D603-4542-9810-6A2E94E168F7}" type="pres">
+    <dgm:pt modelId="{E5F55AD7-8E04-4768-AD96-7A57B79844E1}" type="pres">
       <dgm:prSet presAssocID="{4707CE10-B57B-4862-A224-DAC28E7C2D56}" presName="thickLine" presStyleLbl="alignNode1" presStyleIdx="2" presStyleCnt="11"/>
       <dgm:spPr/>
     </dgm:pt>
-    <dgm:pt modelId="{92C32E67-28A8-449D-9000-45C95BD4E374}" type="pres">
+    <dgm:pt modelId="{A2BD0CFD-7A0B-4C89-8D3E-075EFB85C5BE}" type="pres">
       <dgm:prSet presAssocID="{4707CE10-B57B-4862-A224-DAC28E7C2D56}" presName="horz1" presStyleCnt="0"/>
       <dgm:spPr/>
     </dgm:pt>
-    <dgm:pt modelId="{E3453451-6D8D-4477-9100-E93684886FE0}" type="pres">
+    <dgm:pt modelId="{92572AA9-CE03-44B7-98A9-8A9FBD81DB91}" type="pres">
       <dgm:prSet presAssocID="{4707CE10-B57B-4862-A224-DAC28E7C2D56}" presName="tx1" presStyleLbl="revTx" presStyleIdx="2" presStyleCnt="11"/>
       <dgm:spPr/>
     </dgm:pt>
-    <dgm:pt modelId="{46DD7537-3ED5-4F19-886A-D39A4D7345EA}" type="pres">
+    <dgm:pt modelId="{69D243A3-3BD8-474A-B361-57FA2398D447}" type="pres">
       <dgm:prSet presAssocID="{4707CE10-B57B-4862-A224-DAC28E7C2D56}" presName="vert1" presStyleCnt="0"/>
       <dgm:spPr/>
     </dgm:pt>
-    <dgm:pt modelId="{DFF2CB88-09E7-4C34-9054-663D46A28E8D}" type="pres">
+    <dgm:pt modelId="{CA33BEB4-696F-4348-8FBF-7B696E96869E}" type="pres">
       <dgm:prSet presAssocID="{7DC322CE-9942-4BEF-A3DC-7EFC0B65536B}" presName="thickLine" presStyleLbl="alignNode1" presStyleIdx="3" presStyleCnt="11"/>
       <dgm:spPr/>
     </dgm:pt>
-    <dgm:pt modelId="{2A617785-EE29-4568-A0E5-8AB8C5C10B26}" type="pres">
+    <dgm:pt modelId="{DE42CA26-8D7E-44F5-8D6E-7969B21EAE8D}" type="pres">
       <dgm:prSet presAssocID="{7DC322CE-9942-4BEF-A3DC-7EFC0B65536B}" presName="horz1" presStyleCnt="0"/>
       <dgm:spPr/>
     </dgm:pt>
-    <dgm:pt modelId="{7D7BB0D0-A9CC-4C71-9687-CEEA1651FA21}" type="pres">
+    <dgm:pt modelId="{0F93BA47-E8AF-450F-8AB4-B4FE250FEA3F}" type="pres">
       <dgm:prSet presAssocID="{7DC322CE-9942-4BEF-A3DC-7EFC0B65536B}" presName="tx1" presStyleLbl="revTx" presStyleIdx="3" presStyleCnt="11"/>
       <dgm:spPr/>
     </dgm:pt>
-    <dgm:pt modelId="{19539655-E6D4-4C11-82F0-67B8A98C0027}" type="pres">
+    <dgm:pt modelId="{804504EC-AAEA-40EF-8AE6-5211E1595F2A}" type="pres">
       <dgm:prSet presAssocID="{7DC322CE-9942-4BEF-A3DC-7EFC0B65536B}" presName="vert1" presStyleCnt="0"/>
       <dgm:spPr/>
     </dgm:pt>
-    <dgm:pt modelId="{9010900E-BE11-4037-9A81-C3C5C7FAE5C9}" type="pres">
+    <dgm:pt modelId="{B1BC364F-412D-446F-96A1-24ED771979FF}" type="pres">
       <dgm:prSet presAssocID="{C33D6500-E193-4961-82B0-8BB15C2248DB}" presName="thickLine" presStyleLbl="alignNode1" presStyleIdx="4" presStyleCnt="11"/>
       <dgm:spPr/>
     </dgm:pt>
-    <dgm:pt modelId="{65600452-EE57-4DE8-8E95-BB1DB2507F7E}" type="pres">
+    <dgm:pt modelId="{AD2D61D9-4A3A-45F8-9B87-4C3DE4FED7C7}" type="pres">
       <dgm:prSet presAssocID="{C33D6500-E193-4961-82B0-8BB15C2248DB}" presName="horz1" presStyleCnt="0"/>
       <dgm:spPr/>
     </dgm:pt>
-    <dgm:pt modelId="{8485559A-9C93-4B06-B33B-D42842F5D6FB}" type="pres">
+    <dgm:pt modelId="{31A4463F-C0F7-4070-B72D-C242E586BD78}" type="pres">
       <dgm:prSet presAssocID="{C33D6500-E193-4961-82B0-8BB15C2248DB}" presName="tx1" presStyleLbl="revTx" presStyleIdx="4" presStyleCnt="11"/>
       <dgm:spPr/>
     </dgm:pt>
-    <dgm:pt modelId="{FF8D3D23-D9A8-4A5C-8054-E19C3FCD5EBA}" type="pres">
+    <dgm:pt modelId="{09558064-8CB1-4D78-949A-541F848BF33E}" type="pres">
       <dgm:prSet presAssocID="{C33D6500-E193-4961-82B0-8BB15C2248DB}" presName="vert1" presStyleCnt="0"/>
       <dgm:spPr/>
     </dgm:pt>
-    <dgm:pt modelId="{02A67B17-36DA-4A7B-A3A6-7CC8FD5EAA81}" type="pres">
+    <dgm:pt modelId="{994BAB52-B6EE-400B-8E1F-8CE328BB812E}" type="pres">
       <dgm:prSet presAssocID="{299FA604-AC47-4F49-8072-3972A7AFC1CD}" presName="thickLine" presStyleLbl="alignNode1" presStyleIdx="5" presStyleCnt="11"/>
       <dgm:spPr/>
     </dgm:pt>
-    <dgm:pt modelId="{2507E456-3210-4F9E-B670-F7B1F582E9D9}" type="pres">
+    <dgm:pt modelId="{85019105-F019-44A1-AA6A-C767E0F198A7}" type="pres">
       <dgm:prSet presAssocID="{299FA604-AC47-4F49-8072-3972A7AFC1CD}" presName="horz1" presStyleCnt="0"/>
       <dgm:spPr/>
     </dgm:pt>
-    <dgm:pt modelId="{DE690805-0479-44DB-B7DA-AFCEF300D58E}" type="pres">
+    <dgm:pt modelId="{F67EE4D0-88A7-4218-9399-DB7008A07E1A}" type="pres">
       <dgm:prSet presAssocID="{299FA604-AC47-4F49-8072-3972A7AFC1CD}" presName="tx1" presStyleLbl="revTx" presStyleIdx="5" presStyleCnt="11"/>
       <dgm:spPr/>
     </dgm:pt>
-    <dgm:pt modelId="{631E9B8A-D67D-4078-9D77-8CC96DECC543}" type="pres">
+    <dgm:pt modelId="{10786298-9C11-4EE5-BF01-AACDB4D3247E}" type="pres">
       <dgm:prSet presAssocID="{299FA604-AC47-4F49-8072-3972A7AFC1CD}" presName="vert1" presStyleCnt="0"/>
       <dgm:spPr/>
     </dgm:pt>
-    <dgm:pt modelId="{C469E1EC-D4A7-4B17-B031-8540B310C5DE}" type="pres">
+    <dgm:pt modelId="{12EBED62-4CEC-4E5F-9009-F7BAF8F19494}" type="pres">
       <dgm:prSet presAssocID="{3A26A580-C0FF-4C7E-B635-15F2DE56B35D}" presName="thickLine" presStyleLbl="alignNode1" presStyleIdx="6" presStyleCnt="11"/>
       <dgm:spPr/>
     </dgm:pt>
-    <dgm:pt modelId="{80E4D8BB-CEB2-4B4A-A0A1-7F1CBFA2E69B}" type="pres">
+    <dgm:pt modelId="{2BF56DE7-1292-4685-A3B8-9661F120BEDC}" type="pres">
       <dgm:prSet presAssocID="{3A26A580-C0FF-4C7E-B635-15F2DE56B35D}" presName="horz1" presStyleCnt="0"/>
       <dgm:spPr/>
     </dgm:pt>
-    <dgm:pt modelId="{7E80F188-48AE-4699-BCCE-B060CA87B1E0}" type="pres">
+    <dgm:pt modelId="{520F300C-9694-49D2-B150-E94866C7C046}" type="pres">
       <dgm:prSet presAssocID="{3A26A580-C0FF-4C7E-B635-15F2DE56B35D}" presName="tx1" presStyleLbl="revTx" presStyleIdx="6" presStyleCnt="11"/>
       <dgm:spPr/>
     </dgm:pt>
-    <dgm:pt modelId="{1B98950A-681E-46CE-9167-09960C35E032}" type="pres">
+    <dgm:pt modelId="{E774A862-83DF-4A9D-96B2-9B56BF95EA9E}" type="pres">
       <dgm:prSet presAssocID="{3A26A580-C0FF-4C7E-B635-15F2DE56B35D}" presName="vert1" presStyleCnt="0"/>
       <dgm:spPr/>
     </dgm:pt>
-    <dgm:pt modelId="{70EE2D5B-8B5C-4606-B01E-82C17D3429DB}" type="pres">
+    <dgm:pt modelId="{78ED2CB2-2240-430C-BE00-8A1B51A66824}" type="pres">
       <dgm:prSet presAssocID="{6ED9D8E2-6A9B-4AB1-9174-1CD28013077D}" presName="thickLine" presStyleLbl="alignNode1" presStyleIdx="7" presStyleCnt="11"/>
       <dgm:spPr/>
     </dgm:pt>
-    <dgm:pt modelId="{0D69810B-9548-485A-951A-8DD4D8920329}" type="pres">
+    <dgm:pt modelId="{4EAA92A2-9A83-4CE6-8E00-509F524FA41A}" type="pres">
       <dgm:prSet presAssocID="{6ED9D8E2-6A9B-4AB1-9174-1CD28013077D}" presName="horz1" presStyleCnt="0"/>
       <dgm:spPr/>
     </dgm:pt>
-    <dgm:pt modelId="{11BE1967-5EA6-4B2E-9E9A-2C11E5169D2B}" type="pres">
+    <dgm:pt modelId="{A6475A21-A0B6-4246-AAF5-5AFCDD3AE439}" type="pres">
       <dgm:prSet presAssocID="{6ED9D8E2-6A9B-4AB1-9174-1CD28013077D}" presName="tx1" presStyleLbl="revTx" presStyleIdx="7" presStyleCnt="11"/>
       <dgm:spPr/>
     </dgm:pt>
-    <dgm:pt modelId="{890A01B5-8E75-44F7-9C88-4425DF5A91B6}" type="pres">
+    <dgm:pt modelId="{9AE87449-95AA-4A0B-B18A-955EFD775133}" type="pres">
       <dgm:prSet presAssocID="{6ED9D8E2-6A9B-4AB1-9174-1CD28013077D}" presName="vert1" presStyleCnt="0"/>
       <dgm:spPr/>
     </dgm:pt>
-    <dgm:pt modelId="{281F12AE-F6C4-407F-B60F-D01E811156BF}" type="pres">
+    <dgm:pt modelId="{C8248AB1-27B1-4A4E-9F18-6CB0F7583F7E}" type="pres">
       <dgm:prSet presAssocID="{C8F24157-335F-4C34-8B7E-43F4B79F12B6}" presName="thickLine" presStyleLbl="alignNode1" presStyleIdx="8" presStyleCnt="11"/>
       <dgm:spPr/>
     </dgm:pt>
-    <dgm:pt modelId="{6D5DBE01-D46A-4F55-9936-A2E429589864}" type="pres">
+    <dgm:pt modelId="{147B70E6-C85B-4494-AEEE-8CEB5A8AC1C4}" type="pres">
       <dgm:prSet presAssocID="{C8F24157-335F-4C34-8B7E-43F4B79F12B6}" presName="horz1" presStyleCnt="0"/>
       <dgm:spPr/>
     </dgm:pt>
-    <dgm:pt modelId="{7D0BBA13-3608-4232-9BBB-E9B121DBC000}" type="pres">
+    <dgm:pt modelId="{907219E2-91DE-4FFF-8240-B8DDA8E22B62}" type="pres">
       <dgm:prSet presAssocID="{C8F24157-335F-4C34-8B7E-43F4B79F12B6}" presName="tx1" presStyleLbl="revTx" presStyleIdx="8" presStyleCnt="11"/>
       <dgm:spPr/>
     </dgm:pt>
-    <dgm:pt modelId="{8FF5BDA2-AA96-4755-B0DB-D84FF6600109}" type="pres">
+    <dgm:pt modelId="{33A7F1E0-82EB-4CCD-9F1B-EE844325BDDF}" type="pres">
       <dgm:prSet presAssocID="{C8F24157-335F-4C34-8B7E-43F4B79F12B6}" presName="vert1" presStyleCnt="0"/>
       <dgm:spPr/>
     </dgm:pt>
-    <dgm:pt modelId="{B2AF46F2-B81C-4AB3-BADA-22AD45D94732}" type="pres">
+    <dgm:pt modelId="{AD9A0D1F-8F80-44A6-AA40-E1753AB9E7DA}" type="pres">
       <dgm:prSet presAssocID="{C1273208-1F9E-4068-9B95-C247F9D6345E}" presName="thickLine" presStyleLbl="alignNode1" presStyleIdx="9" presStyleCnt="11"/>
       <dgm:spPr/>
     </dgm:pt>
-    <dgm:pt modelId="{6EF0E11C-742E-4B7B-8D9D-E343C287048B}" type="pres">
+    <dgm:pt modelId="{CC370A3E-C13A-47BF-BF81-8317CC1B22E5}" type="pres">
       <dgm:prSet presAssocID="{C1273208-1F9E-4068-9B95-C247F9D6345E}" presName="horz1" presStyleCnt="0"/>
       <dgm:spPr/>
     </dgm:pt>
-    <dgm:pt modelId="{C83F7274-C25D-4301-B56B-DE5C1CA8F612}" type="pres">
+    <dgm:pt modelId="{4936F773-CC18-4F0E-AA7D-645EE735707B}" type="pres">
       <dgm:prSet presAssocID="{C1273208-1F9E-4068-9B95-C247F9D6345E}" presName="tx1" presStyleLbl="revTx" presStyleIdx="9" presStyleCnt="11"/>
       <dgm:spPr/>
     </dgm:pt>
-    <dgm:pt modelId="{2A076001-4973-49F2-9BE8-4E3EDAC14D83}" type="pres">
+    <dgm:pt modelId="{CAB5A380-00F7-42DA-833B-20D0DAD916C7}" type="pres">
       <dgm:prSet presAssocID="{C1273208-1F9E-4068-9B95-C247F9D6345E}" presName="vert1" presStyleCnt="0"/>
       <dgm:spPr/>
     </dgm:pt>
-    <dgm:pt modelId="{3CFA7879-DCA1-44E6-8142-62F2F2F4C25B}" type="pres">
+    <dgm:pt modelId="{50B6BDA2-F8DB-481F-B3DA-34E6542440E1}" type="pres">
       <dgm:prSet presAssocID="{878A06C2-BC53-40A8-93D5-185F0220A882}" presName="thickLine" presStyleLbl="alignNode1" presStyleIdx="10" presStyleCnt="11"/>
       <dgm:spPr/>
     </dgm:pt>
-    <dgm:pt modelId="{6C28F160-E9AF-444D-ABE8-F08A254463BE}" type="pres">
+    <dgm:pt modelId="{D5102471-2ED1-448E-A307-4703309EEF98}" type="pres">
       <dgm:prSet presAssocID="{878A06C2-BC53-40A8-93D5-185F0220A882}" presName="horz1" presStyleCnt="0"/>
       <dgm:spPr/>
     </dgm:pt>
-    <dgm:pt modelId="{19CE2D8C-1E30-4FF9-BDBF-51DC5797CD92}" type="pres">
+    <dgm:pt modelId="{AB1FFAE1-FC19-4BF2-8C31-2FF5B0FAA78C}" type="pres">
       <dgm:prSet presAssocID="{878A06C2-BC53-40A8-93D5-185F0220A882}" presName="tx1" presStyleLbl="revTx" presStyleIdx="10" presStyleCnt="11"/>
       <dgm:spPr/>
     </dgm:pt>
-    <dgm:pt modelId="{26C4E9D0-90DE-45D3-BBD6-D9BF517FEF36}" type="pres">
+    <dgm:pt modelId="{7567DCED-7CDB-4A84-8F86-5DBB11030C8E}" type="pres">
       <dgm:prSet presAssocID="{878A06C2-BC53-40A8-93D5-185F0220A882}" presName="vert1" presStyleCnt="0"/>
       <dgm:spPr/>
     </dgm:pt>
   </dgm:ptLst>
   <dgm:cxnLst>
+    <dgm:cxn modelId="{84AF2906-6D01-4CB6-94C2-B4E0C746EFA2}" type="presOf" srcId="{299FA604-AC47-4F49-8072-3972A7AFC1CD}" destId="{F67EE4D0-88A7-4218-9399-DB7008A07E1A}" srcOrd="0" destOrd="0" presId="urn:microsoft.com/office/officeart/2008/layout/LinedList"/>
+    <dgm:cxn modelId="{A222A30C-B9E7-4420-95D7-C8F608770E24}" type="presOf" srcId="{3A26A580-C0FF-4C7E-B635-15F2DE56B35D}" destId="{520F300C-9694-49D2-B150-E94866C7C046}" srcOrd="0" destOrd="0" presId="urn:microsoft.com/office/officeart/2008/layout/LinedList"/>
     <dgm:cxn modelId="{AED2A80F-86B2-449A-9DAF-FFED074A2036}" srcId="{6B2A22D3-FE59-4FFA-89F8-CC8CCF710A45}" destId="{3A26A580-C0FF-4C7E-B635-15F2DE56B35D}" srcOrd="6" destOrd="0" parTransId="{86076EAF-67E6-4BD4-BBC0-AE9655C1AB5F}" sibTransId="{2C96D93D-05A2-4FBE-AA8C-1472803738FF}"/>
-    <dgm:cxn modelId="{0D502016-55BB-4188-A57A-6E2F0B4ABE9B}" type="presOf" srcId="{6B2A22D3-FE59-4FFA-89F8-CC8CCF710A45}" destId="{B0C990DB-E5C8-41A5-AEC0-4168B9B33676}" srcOrd="0" destOrd="0" presId="urn:microsoft.com/office/officeart/2008/layout/LinedList"/>
-    <dgm:cxn modelId="{90603D2C-9CB3-43B9-860A-E6662221E9BF}" type="presOf" srcId="{299FA604-AC47-4F49-8072-3972A7AFC1CD}" destId="{DE690805-0479-44DB-B7DA-AFCEF300D58E}" srcOrd="0" destOrd="0" presId="urn:microsoft.com/office/officeart/2008/layout/LinedList"/>
-    <dgm:cxn modelId="{7C0F4A36-1D06-400A-BB32-5BBC0945619B}" type="presOf" srcId="{ECC538E9-9F29-4521-B5D1-17A9B2A3EC83}" destId="{0A832B16-A47A-4B21-B37F-06722932084A}" srcOrd="0" destOrd="0" presId="urn:microsoft.com/office/officeart/2008/layout/LinedList"/>
+    <dgm:cxn modelId="{0890D00F-2A5E-4776-9FB2-6B31E89819B7}" type="presOf" srcId="{6B2A22D3-FE59-4FFA-89F8-CC8CCF710A45}" destId="{13D3CA98-3A1A-4231-8FA8-AFB8EA99FE7B}" srcOrd="0" destOrd="0" presId="urn:microsoft.com/office/officeart/2008/layout/LinedList"/>
+    <dgm:cxn modelId="{0E549A25-0FAD-4A42-A8AB-C075881D064E}" type="presOf" srcId="{C1273208-1F9E-4068-9B95-C247F9D6345E}" destId="{4936F773-CC18-4F0E-AA7D-645EE735707B}" srcOrd="0" destOrd="0" presId="urn:microsoft.com/office/officeart/2008/layout/LinedList"/>
+    <dgm:cxn modelId="{6DC0545B-708B-4159-AD5D-45EE29138202}" type="presOf" srcId="{878A06C2-BC53-40A8-93D5-185F0220A882}" destId="{AB1FFAE1-FC19-4BF2-8C31-2FF5B0FAA78C}" srcOrd="0" destOrd="0" presId="urn:microsoft.com/office/officeart/2008/layout/LinedList"/>
     <dgm:cxn modelId="{86790E66-BDEE-4CFB-969B-C396B3C1232D}" srcId="{6B2A22D3-FE59-4FFA-89F8-CC8CCF710A45}" destId="{C1273208-1F9E-4068-9B95-C247F9D6345E}" srcOrd="9" destOrd="0" parTransId="{D719ADE7-1E29-4B40-B25D-2DB0728E01D2}" sibTransId="{D8E61A05-74E1-4465-B778-326AA9EDEC58}"/>
+    <dgm:cxn modelId="{28563B59-22E3-4743-9828-CCB1B8D8F136}" type="presOf" srcId="{2A81A14B-7062-4FED-BD70-8C7ED516BD95}" destId="{84706E19-1587-4374-8632-8C90741F51B6}" srcOrd="0" destOrd="0" presId="urn:microsoft.com/office/officeart/2008/layout/LinedList"/>
+    <dgm:cxn modelId="{6990B579-1071-4FBE-A956-26C764A06158}" type="presOf" srcId="{7DC322CE-9942-4BEF-A3DC-7EFC0B65536B}" destId="{0F93BA47-E8AF-450F-8AB4-B4FE250FEA3F}" srcOrd="0" destOrd="0" presId="urn:microsoft.com/office/officeart/2008/layout/LinedList"/>
     <dgm:cxn modelId="{7BE16685-18E3-4B2F-AFD0-938371EE1009}" srcId="{6B2A22D3-FE59-4FFA-89F8-CC8CCF710A45}" destId="{6ED9D8E2-6A9B-4AB1-9174-1CD28013077D}" srcOrd="7" destOrd="0" parTransId="{2636E680-BEAD-455B-8845-0D1D434BEAEF}" sibTransId="{C213F8AF-DB3F-4087-B89C-503E14C14C10}"/>
+    <dgm:cxn modelId="{3371D486-6396-48C4-9D89-100A0466DBE4}" type="presOf" srcId="{C8F24157-335F-4C34-8B7E-43F4B79F12B6}" destId="{907219E2-91DE-4FFF-8240-B8DDA8E22B62}" srcOrd="0" destOrd="0" presId="urn:microsoft.com/office/officeart/2008/layout/LinedList"/>
     <dgm:cxn modelId="{4F02EB87-CCE4-4CAD-A71E-5ADA810552AD}" srcId="{6B2A22D3-FE59-4FFA-89F8-CC8CCF710A45}" destId="{7DC322CE-9942-4BEF-A3DC-7EFC0B65536B}" srcOrd="3" destOrd="0" parTransId="{7FB853D0-77F3-42B1-88D1-2DC68A1447C7}" sibTransId="{8461B217-F558-4C95-B80C-83C051EEB5AC}"/>
-    <dgm:cxn modelId="{8574998E-C2D3-4BA0-ABF8-1AB7BAFB5E54}" type="presOf" srcId="{7DC322CE-9942-4BEF-A3DC-7EFC0B65536B}" destId="{7D7BB0D0-A9CC-4C71-9687-CEEA1651FA21}" srcOrd="0" destOrd="0" presId="urn:microsoft.com/office/officeart/2008/layout/LinedList"/>
+    <dgm:cxn modelId="{C57BA48D-3B04-4865-ABAD-EB5BFC03A7FD}" type="presOf" srcId="{6ED9D8E2-6A9B-4AB1-9174-1CD28013077D}" destId="{A6475A21-A0B6-4246-AAF5-5AFCDD3AE439}" srcOrd="0" destOrd="0" presId="urn:microsoft.com/office/officeart/2008/layout/LinedList"/>
     <dgm:cxn modelId="{E24CFB8E-BA07-4FF3-86D3-1108F3F89218}" srcId="{6B2A22D3-FE59-4FFA-89F8-CC8CCF710A45}" destId="{C33D6500-E193-4961-82B0-8BB15C2248DB}" srcOrd="4" destOrd="0" parTransId="{2640481D-19F8-440E-85C9-180C5352918C}" sibTransId="{F654F377-12C1-49E0-B767-87654F1CDB9D}"/>
-    <dgm:cxn modelId="{FA3A888F-17C7-4F2C-A411-01A3A6E64148}" type="presOf" srcId="{C33D6500-E193-4961-82B0-8BB15C2248DB}" destId="{8485559A-9C93-4B06-B33B-D42842F5D6FB}" srcOrd="0" destOrd="0" presId="urn:microsoft.com/office/officeart/2008/layout/LinedList"/>
-    <dgm:cxn modelId="{54F29790-FDB8-4184-995B-7F235BECD607}" type="presOf" srcId="{C1273208-1F9E-4068-9B95-C247F9D6345E}" destId="{C83F7274-C25D-4301-B56B-DE5C1CA8F612}" srcOrd="0" destOrd="0" presId="urn:microsoft.com/office/officeart/2008/layout/LinedList"/>
     <dgm:cxn modelId="{4301A0A7-DC07-403E-8BF9-8D261E8175DD}" srcId="{6B2A22D3-FE59-4FFA-89F8-CC8CCF710A45}" destId="{ECC538E9-9F29-4521-B5D1-17A9B2A3EC83}" srcOrd="1" destOrd="0" parTransId="{A334B40F-3FFC-44BA-8AC7-E9BAE862476A}" sibTransId="{8FB21A1D-6812-4527-BDCB-BBB27F54F8CE}"/>
     <dgm:cxn modelId="{EBB9AEA8-BB57-42E0-B4CC-B24F02F881E8}" srcId="{6B2A22D3-FE59-4FFA-89F8-CC8CCF710A45}" destId="{2A81A14B-7062-4FED-BD70-8C7ED516BD95}" srcOrd="0" destOrd="0" parTransId="{ECE2EB70-4B5A-46ED-B4F7-656F510A99C2}" sibTransId="{4996D489-26FB-44D6-86A3-DBBD59206BE2}"/>
+    <dgm:cxn modelId="{6716C6AD-4D28-4AF1-BDBD-2903E574B7ED}" type="presOf" srcId="{C33D6500-E193-4961-82B0-8BB15C2248DB}" destId="{31A4463F-C0F7-4070-B72D-C242E586BD78}" srcOrd="0" destOrd="0" presId="urn:microsoft.com/office/officeart/2008/layout/LinedList"/>
     <dgm:cxn modelId="{B9DFE0B2-0129-4A20-9298-0A48F62D4381}" srcId="{6B2A22D3-FE59-4FFA-89F8-CC8CCF710A45}" destId="{4707CE10-B57B-4862-A224-DAC28E7C2D56}" srcOrd="2" destOrd="0" parTransId="{0119EF0F-6D06-4261-9AAA-F2263C1E9BF3}" sibTransId="{D741E752-175C-4162-B1F0-704E52E4F116}"/>
-    <dgm:cxn modelId="{98C9B6B4-85E1-43DB-B921-B32A04A40F38}" type="presOf" srcId="{C8F24157-335F-4C34-8B7E-43F4B79F12B6}" destId="{7D0BBA13-3608-4232-9BBB-E9B121DBC000}" srcOrd="0" destOrd="0" presId="urn:microsoft.com/office/officeart/2008/layout/LinedList"/>
-    <dgm:cxn modelId="{C962F1B9-7DBC-4EB8-B16A-1B7EFF987E02}" type="presOf" srcId="{6ED9D8E2-6A9B-4AB1-9174-1CD28013077D}" destId="{11BE1967-5EA6-4B2E-9E9A-2C11E5169D2B}" srcOrd="0" destOrd="0" presId="urn:microsoft.com/office/officeart/2008/layout/LinedList"/>
     <dgm:cxn modelId="{8DB820BE-AAF4-4239-B883-8E77007E0EFE}" srcId="{6B2A22D3-FE59-4FFA-89F8-CC8CCF710A45}" destId="{299FA604-AC47-4F49-8072-3972A7AFC1CD}" srcOrd="5" destOrd="0" parTransId="{DCF1DD83-3B4C-4EBA-978F-C2234C98B699}" sibTransId="{02393663-5D57-45CF-9E99-69FA11D8056E}"/>
-    <dgm:cxn modelId="{8B521BE0-C3E0-44F9-8F60-D04A436E3330}" type="presOf" srcId="{878A06C2-BC53-40A8-93D5-185F0220A882}" destId="{19CE2D8C-1E30-4FF9-BDBF-51DC5797CD92}" srcOrd="0" destOrd="0" presId="urn:microsoft.com/office/officeart/2008/layout/LinedList"/>
-    <dgm:cxn modelId="{D382BBE0-4F04-492D-80DF-6969ADE692F9}" type="presOf" srcId="{2A81A14B-7062-4FED-BD70-8C7ED516BD95}" destId="{D828109D-0A1E-43BF-82B2-EF3E25607856}" srcOrd="0" destOrd="0" presId="urn:microsoft.com/office/officeart/2008/layout/LinedList"/>
+    <dgm:cxn modelId="{803BD8CC-E7EB-4AEC-BDB4-CD4B7B0335E3}" type="presOf" srcId="{4707CE10-B57B-4862-A224-DAC28E7C2D56}" destId="{92572AA9-CE03-44B7-98A9-8A9FBD81DB91}" srcOrd="0" destOrd="0" presId="urn:microsoft.com/office/officeart/2008/layout/LinedList"/>
+    <dgm:cxn modelId="{10F9E0D2-FF52-45B1-B521-DE3FE6505B83}" type="presOf" srcId="{ECC538E9-9F29-4521-B5D1-17A9B2A3EC83}" destId="{FE25F505-2401-401A-AE2C-8102B695BC00}" srcOrd="0" destOrd="0" presId="urn:microsoft.com/office/officeart/2008/layout/LinedList"/>
     <dgm:cxn modelId="{A863D2E0-DA2E-4918-9006-D11897748C72}" srcId="{6B2A22D3-FE59-4FFA-89F8-CC8CCF710A45}" destId="{878A06C2-BC53-40A8-93D5-185F0220A882}" srcOrd="10" destOrd="0" parTransId="{97257B4A-3E7D-4514-8950-966BC89B7C31}" sibTransId="{CFAFF3CA-FB73-4F69-8799-A42A21CB7526}"/>
-    <dgm:cxn modelId="{95E456EB-319A-4B63-80EA-832F2D93DD08}" type="presOf" srcId="{3A26A580-C0FF-4C7E-B635-15F2DE56B35D}" destId="{7E80F188-48AE-4699-BCCE-B060CA87B1E0}" srcOrd="0" destOrd="0" presId="urn:microsoft.com/office/officeart/2008/layout/LinedList"/>
     <dgm:cxn modelId="{092651FC-3C13-4B64-A1E7-2F85518BC245}" srcId="{6B2A22D3-FE59-4FFA-89F8-CC8CCF710A45}" destId="{C8F24157-335F-4C34-8B7E-43F4B79F12B6}" srcOrd="8" destOrd="0" parTransId="{341E13CB-8C9B-4F3D-8A4C-EFACEAE2BC52}" sibTransId="{77931D14-D99D-439F-BA68-19FB33C7855A}"/>
-    <dgm:cxn modelId="{9B0C58FF-1CF7-4D78-A0FE-4C4D3363B626}" type="presOf" srcId="{4707CE10-B57B-4862-A224-DAC28E7C2D56}" destId="{E3453451-6D8D-4477-9100-E93684886FE0}" srcOrd="0" destOrd="0" presId="urn:microsoft.com/office/officeart/2008/layout/LinedList"/>
-    <dgm:cxn modelId="{E3819C29-DF25-49F8-A650-58F2A2750F26}" type="presParOf" srcId="{B0C990DB-E5C8-41A5-AEC0-4168B9B33676}" destId="{9C9397AF-9607-4223-B77E-98CD877F37F4}" srcOrd="0" destOrd="0" presId="urn:microsoft.com/office/officeart/2008/layout/LinedList"/>
-    <dgm:cxn modelId="{EA63A64E-41E3-4ADA-9974-172474B0156D}" type="presParOf" srcId="{B0C990DB-E5C8-41A5-AEC0-4168B9B33676}" destId="{914BCF8D-4FF2-44D1-9710-315B82456521}" srcOrd="1" destOrd="0" presId="urn:microsoft.com/office/officeart/2008/layout/LinedList"/>
-    <dgm:cxn modelId="{FF8D679E-41EC-436F-8D55-F22CA94EA412}" type="presParOf" srcId="{914BCF8D-4FF2-44D1-9710-315B82456521}" destId="{D828109D-0A1E-43BF-82B2-EF3E25607856}" srcOrd="0" destOrd="0" presId="urn:microsoft.com/office/officeart/2008/layout/LinedList"/>
-    <dgm:cxn modelId="{3B208AD4-7E8C-41B2-BFCC-C97954BAEBBE}" type="presParOf" srcId="{914BCF8D-4FF2-44D1-9710-315B82456521}" destId="{698FC688-B868-4674-8142-0EF44E791AB0}" srcOrd="1" destOrd="0" presId="urn:microsoft.com/office/officeart/2008/layout/LinedList"/>
-    <dgm:cxn modelId="{8657C120-1B35-4CC4-8939-81041DE4D37D}" type="presParOf" srcId="{B0C990DB-E5C8-41A5-AEC0-4168B9B33676}" destId="{EA5B6C39-3A21-4D58-BACA-F70755D16C22}" srcOrd="2" destOrd="0" presId="urn:microsoft.com/office/officeart/2008/layout/LinedList"/>
-    <dgm:cxn modelId="{41933E72-1AE5-4248-9071-ACCCFACAC302}" type="presParOf" srcId="{B0C990DB-E5C8-41A5-AEC0-4168B9B33676}" destId="{FAFA33B0-C1E5-4B05-A951-7E0E135B8CD4}" srcOrd="3" destOrd="0" presId="urn:microsoft.com/office/officeart/2008/layout/LinedList"/>
-    <dgm:cxn modelId="{9B9F7CB6-97AD-4B02-B910-B94EFA71A70E}" type="presParOf" srcId="{FAFA33B0-C1E5-4B05-A951-7E0E135B8CD4}" destId="{0A832B16-A47A-4B21-B37F-06722932084A}" srcOrd="0" destOrd="0" presId="urn:microsoft.com/office/officeart/2008/layout/LinedList"/>
-    <dgm:cxn modelId="{D36BA11E-16F5-4177-87F5-CAE807FD1F22}" type="presParOf" srcId="{FAFA33B0-C1E5-4B05-A951-7E0E135B8CD4}" destId="{9131A93C-F361-4DAB-A7F9-D3C9361D30CD}" srcOrd="1" destOrd="0" presId="urn:microsoft.com/office/officeart/2008/layout/LinedList"/>
-    <dgm:cxn modelId="{CDF6325A-4B63-4A00-9413-9BBAAE1FDFCE}" type="presParOf" srcId="{B0C990DB-E5C8-41A5-AEC0-4168B9B33676}" destId="{7E717C3A-D603-4542-9810-6A2E94E168F7}" srcOrd="4" destOrd="0" presId="urn:microsoft.com/office/officeart/2008/layout/LinedList"/>
-    <dgm:cxn modelId="{83236985-9B02-43A1-A2EC-2946A5BF56AC}" type="presParOf" srcId="{B0C990DB-E5C8-41A5-AEC0-4168B9B33676}" destId="{92C32E67-28A8-449D-9000-45C95BD4E374}" srcOrd="5" destOrd="0" presId="urn:microsoft.com/office/officeart/2008/layout/LinedList"/>
-    <dgm:cxn modelId="{05B69F84-EE86-40C6-A822-B9FB92F9165A}" type="presParOf" srcId="{92C32E67-28A8-449D-9000-45C95BD4E374}" destId="{E3453451-6D8D-4477-9100-E93684886FE0}" srcOrd="0" destOrd="0" presId="urn:microsoft.com/office/officeart/2008/layout/LinedList"/>
-    <dgm:cxn modelId="{8B686F14-327B-40E5-8CA3-332BFA56FC8E}" type="presParOf" srcId="{92C32E67-28A8-449D-9000-45C95BD4E374}" destId="{46DD7537-3ED5-4F19-886A-D39A4D7345EA}" srcOrd="1" destOrd="0" presId="urn:microsoft.com/office/officeart/2008/layout/LinedList"/>
-    <dgm:cxn modelId="{01B80EF6-230C-4517-8E6E-903113409A50}" type="presParOf" srcId="{B0C990DB-E5C8-41A5-AEC0-4168B9B33676}" destId="{DFF2CB88-09E7-4C34-9054-663D46A28E8D}" srcOrd="6" destOrd="0" presId="urn:microsoft.com/office/officeart/2008/layout/LinedList"/>
-    <dgm:cxn modelId="{7654D0E6-2853-4E98-9B88-520AD630C715}" type="presParOf" srcId="{B0C990DB-E5C8-41A5-AEC0-4168B9B33676}" destId="{2A617785-EE29-4568-A0E5-8AB8C5C10B26}" srcOrd="7" destOrd="0" presId="urn:microsoft.com/office/officeart/2008/layout/LinedList"/>
-    <dgm:cxn modelId="{B7B7DF02-6663-47A2-B8D7-30A8A3E2EA13}" type="presParOf" srcId="{2A617785-EE29-4568-A0E5-8AB8C5C10B26}" destId="{7D7BB0D0-A9CC-4C71-9687-CEEA1651FA21}" srcOrd="0" destOrd="0" presId="urn:microsoft.com/office/officeart/2008/layout/LinedList"/>
-    <dgm:cxn modelId="{6FA918EC-99B6-4997-97B4-CB84F839D4C4}" type="presParOf" srcId="{2A617785-EE29-4568-A0E5-8AB8C5C10B26}" destId="{19539655-E6D4-4C11-82F0-67B8A98C0027}" srcOrd="1" destOrd="0" presId="urn:microsoft.com/office/officeart/2008/layout/LinedList"/>
-    <dgm:cxn modelId="{F5C4F198-1FC3-4217-8F66-CEDC9060BC60}" type="presParOf" srcId="{B0C990DB-E5C8-41A5-AEC0-4168B9B33676}" destId="{9010900E-BE11-4037-9A81-C3C5C7FAE5C9}" srcOrd="8" destOrd="0" presId="urn:microsoft.com/office/officeart/2008/layout/LinedList"/>
-    <dgm:cxn modelId="{028C9DC9-2F28-499B-9F23-132A8D228EE9}" type="presParOf" srcId="{B0C990DB-E5C8-41A5-AEC0-4168B9B33676}" destId="{65600452-EE57-4DE8-8E95-BB1DB2507F7E}" srcOrd="9" destOrd="0" presId="urn:microsoft.com/office/officeart/2008/layout/LinedList"/>
-    <dgm:cxn modelId="{4FC1DDE5-8D3D-434A-A55A-4CB9E0E6FBA7}" type="presParOf" srcId="{65600452-EE57-4DE8-8E95-BB1DB2507F7E}" destId="{8485559A-9C93-4B06-B33B-D42842F5D6FB}" srcOrd="0" destOrd="0" presId="urn:microsoft.com/office/officeart/2008/layout/LinedList"/>
-    <dgm:cxn modelId="{A12155C9-0AD3-4940-9BE0-B1978DA8D8EA}" type="presParOf" srcId="{65600452-EE57-4DE8-8E95-BB1DB2507F7E}" destId="{FF8D3D23-D9A8-4A5C-8054-E19C3FCD5EBA}" srcOrd="1" destOrd="0" presId="urn:microsoft.com/office/officeart/2008/layout/LinedList"/>
-    <dgm:cxn modelId="{7FF1237A-B0FC-41D6-B48F-F2592CF78CC1}" type="presParOf" srcId="{B0C990DB-E5C8-41A5-AEC0-4168B9B33676}" destId="{02A67B17-36DA-4A7B-A3A6-7CC8FD5EAA81}" srcOrd="10" destOrd="0" presId="urn:microsoft.com/office/officeart/2008/layout/LinedList"/>
-    <dgm:cxn modelId="{859C5C24-9C7C-4103-A33E-B7F5591FBF95}" type="presParOf" srcId="{B0C990DB-E5C8-41A5-AEC0-4168B9B33676}" destId="{2507E456-3210-4F9E-B670-F7B1F582E9D9}" srcOrd="11" destOrd="0" presId="urn:microsoft.com/office/officeart/2008/layout/LinedList"/>
-    <dgm:cxn modelId="{79EC686B-62A9-48E1-9B0A-0217F85479D8}" type="presParOf" srcId="{2507E456-3210-4F9E-B670-F7B1F582E9D9}" destId="{DE690805-0479-44DB-B7DA-AFCEF300D58E}" srcOrd="0" destOrd="0" presId="urn:microsoft.com/office/officeart/2008/layout/LinedList"/>
-    <dgm:cxn modelId="{0ACC2E8F-A355-4E58-BBBD-97B09B7A2F66}" type="presParOf" srcId="{2507E456-3210-4F9E-B670-F7B1F582E9D9}" destId="{631E9B8A-D67D-4078-9D77-8CC96DECC543}" srcOrd="1" destOrd="0" presId="urn:microsoft.com/office/officeart/2008/layout/LinedList"/>
-    <dgm:cxn modelId="{48BE02DE-266D-41A1-A0AF-D3F96CD57F90}" type="presParOf" srcId="{B0C990DB-E5C8-41A5-AEC0-4168B9B33676}" destId="{C469E1EC-D4A7-4B17-B031-8540B310C5DE}" srcOrd="12" destOrd="0" presId="urn:microsoft.com/office/officeart/2008/layout/LinedList"/>
-    <dgm:cxn modelId="{C5733F20-420B-44D1-9573-16AB45E88DA4}" type="presParOf" srcId="{B0C990DB-E5C8-41A5-AEC0-4168B9B33676}" destId="{80E4D8BB-CEB2-4B4A-A0A1-7F1CBFA2E69B}" srcOrd="13" destOrd="0" presId="urn:microsoft.com/office/officeart/2008/layout/LinedList"/>
-    <dgm:cxn modelId="{528A6E92-58EA-4D97-9818-EA1A14DE7311}" type="presParOf" srcId="{80E4D8BB-CEB2-4B4A-A0A1-7F1CBFA2E69B}" destId="{7E80F188-48AE-4699-BCCE-B060CA87B1E0}" srcOrd="0" destOrd="0" presId="urn:microsoft.com/office/officeart/2008/layout/LinedList"/>
-    <dgm:cxn modelId="{82CEB16B-2A60-410B-AE6C-07066B8D3A68}" type="presParOf" srcId="{80E4D8BB-CEB2-4B4A-A0A1-7F1CBFA2E69B}" destId="{1B98950A-681E-46CE-9167-09960C35E032}" srcOrd="1" destOrd="0" presId="urn:microsoft.com/office/officeart/2008/layout/LinedList"/>
-    <dgm:cxn modelId="{AF027C06-67FB-4181-81AE-544BB882BB19}" type="presParOf" srcId="{B0C990DB-E5C8-41A5-AEC0-4168B9B33676}" destId="{70EE2D5B-8B5C-4606-B01E-82C17D3429DB}" srcOrd="14" destOrd="0" presId="urn:microsoft.com/office/officeart/2008/layout/LinedList"/>
-    <dgm:cxn modelId="{E5302CD0-5D6D-4F6E-9EAE-9D0E2815B660}" type="presParOf" srcId="{B0C990DB-E5C8-41A5-AEC0-4168B9B33676}" destId="{0D69810B-9548-485A-951A-8DD4D8920329}" srcOrd="15" destOrd="0" presId="urn:microsoft.com/office/officeart/2008/layout/LinedList"/>
-    <dgm:cxn modelId="{CBDA5DC6-F314-495A-A0E0-6444B6AC35C1}" type="presParOf" srcId="{0D69810B-9548-485A-951A-8DD4D8920329}" destId="{11BE1967-5EA6-4B2E-9E9A-2C11E5169D2B}" srcOrd="0" destOrd="0" presId="urn:microsoft.com/office/officeart/2008/layout/LinedList"/>
-    <dgm:cxn modelId="{303AEC83-4422-48DA-829E-14C4B8C6F5D0}" type="presParOf" srcId="{0D69810B-9548-485A-951A-8DD4D8920329}" destId="{890A01B5-8E75-44F7-9C88-4425DF5A91B6}" srcOrd="1" destOrd="0" presId="urn:microsoft.com/office/officeart/2008/layout/LinedList"/>
-    <dgm:cxn modelId="{BB885B40-B8C4-40A3-97CC-8C8866A840A0}" type="presParOf" srcId="{B0C990DB-E5C8-41A5-AEC0-4168B9B33676}" destId="{281F12AE-F6C4-407F-B60F-D01E811156BF}" srcOrd="16" destOrd="0" presId="urn:microsoft.com/office/officeart/2008/layout/LinedList"/>
-    <dgm:cxn modelId="{098D21EA-29B6-4643-8459-D07803108468}" type="presParOf" srcId="{B0C990DB-E5C8-41A5-AEC0-4168B9B33676}" destId="{6D5DBE01-D46A-4F55-9936-A2E429589864}" srcOrd="17" destOrd="0" presId="urn:microsoft.com/office/officeart/2008/layout/LinedList"/>
-    <dgm:cxn modelId="{34A8CEA3-8B57-4FFB-970B-32D30453418D}" type="presParOf" srcId="{6D5DBE01-D46A-4F55-9936-A2E429589864}" destId="{7D0BBA13-3608-4232-9BBB-E9B121DBC000}" srcOrd="0" destOrd="0" presId="urn:microsoft.com/office/officeart/2008/layout/LinedList"/>
-    <dgm:cxn modelId="{98965705-A9BF-402C-B5C7-3AF9A3C1F4BD}" type="presParOf" srcId="{6D5DBE01-D46A-4F55-9936-A2E429589864}" destId="{8FF5BDA2-AA96-4755-B0DB-D84FF6600109}" srcOrd="1" destOrd="0" presId="urn:microsoft.com/office/officeart/2008/layout/LinedList"/>
-    <dgm:cxn modelId="{500D60ED-B241-47FE-AA7C-986ED6DA7541}" type="presParOf" srcId="{B0C990DB-E5C8-41A5-AEC0-4168B9B33676}" destId="{B2AF46F2-B81C-4AB3-BADA-22AD45D94732}" srcOrd="18" destOrd="0" presId="urn:microsoft.com/office/officeart/2008/layout/LinedList"/>
-    <dgm:cxn modelId="{EE4C22B6-A317-407C-8C46-FB2A1A0CC868}" type="presParOf" srcId="{B0C990DB-E5C8-41A5-AEC0-4168B9B33676}" destId="{6EF0E11C-742E-4B7B-8D9D-E343C287048B}" srcOrd="19" destOrd="0" presId="urn:microsoft.com/office/officeart/2008/layout/LinedList"/>
-    <dgm:cxn modelId="{4B1EAB9A-71E2-47DA-8988-DF9357D0B072}" type="presParOf" srcId="{6EF0E11C-742E-4B7B-8D9D-E343C287048B}" destId="{C83F7274-C25D-4301-B56B-DE5C1CA8F612}" srcOrd="0" destOrd="0" presId="urn:microsoft.com/office/officeart/2008/layout/LinedList"/>
-    <dgm:cxn modelId="{357DB0BA-4FFA-4C98-BE94-C613E655C247}" type="presParOf" srcId="{6EF0E11C-742E-4B7B-8D9D-E343C287048B}" destId="{2A076001-4973-49F2-9BE8-4E3EDAC14D83}" srcOrd="1" destOrd="0" presId="urn:microsoft.com/office/officeart/2008/layout/LinedList"/>
-    <dgm:cxn modelId="{F161F8C2-1493-4E51-92CA-F0B651531839}" type="presParOf" srcId="{B0C990DB-E5C8-41A5-AEC0-4168B9B33676}" destId="{3CFA7879-DCA1-44E6-8142-62F2F2F4C25B}" srcOrd="20" destOrd="0" presId="urn:microsoft.com/office/officeart/2008/layout/LinedList"/>
-    <dgm:cxn modelId="{1867AD81-FC8F-42B6-93A5-C3B84577B611}" type="presParOf" srcId="{B0C990DB-E5C8-41A5-AEC0-4168B9B33676}" destId="{6C28F160-E9AF-444D-ABE8-F08A254463BE}" srcOrd="21" destOrd="0" presId="urn:microsoft.com/office/officeart/2008/layout/LinedList"/>
-    <dgm:cxn modelId="{8514DFCA-7799-48F9-9256-0819DEE7763E}" type="presParOf" srcId="{6C28F160-E9AF-444D-ABE8-F08A254463BE}" destId="{19CE2D8C-1E30-4FF9-BDBF-51DC5797CD92}" srcOrd="0" destOrd="0" presId="urn:microsoft.com/office/officeart/2008/layout/LinedList"/>
-    <dgm:cxn modelId="{EC16077A-3CAB-4D89-AC7A-30605A825814}" type="presParOf" srcId="{6C28F160-E9AF-444D-ABE8-F08A254463BE}" destId="{26C4E9D0-90DE-45D3-BBD6-D9BF517FEF36}" srcOrd="1" destOrd="0" presId="urn:microsoft.com/office/officeart/2008/layout/LinedList"/>
+    <dgm:cxn modelId="{9402EC1A-6E58-4590-A0CF-03AC1F2A5A03}" type="presParOf" srcId="{13D3CA98-3A1A-4231-8FA8-AFB8EA99FE7B}" destId="{A7CB411C-2FB3-459C-BC45-BA0B97A1AC3A}" srcOrd="0" destOrd="0" presId="urn:microsoft.com/office/officeart/2008/layout/LinedList"/>
+    <dgm:cxn modelId="{B506A9EE-A3BB-4DEE-8D05-0B0D78D16278}" type="presParOf" srcId="{13D3CA98-3A1A-4231-8FA8-AFB8EA99FE7B}" destId="{26A66081-0D96-44AF-82D2-A0EE8C49D0E6}" srcOrd="1" destOrd="0" presId="urn:microsoft.com/office/officeart/2008/layout/LinedList"/>
+    <dgm:cxn modelId="{C7948EAD-D4D2-4FA1-ACD7-20254C6F3B8D}" type="presParOf" srcId="{26A66081-0D96-44AF-82D2-A0EE8C49D0E6}" destId="{84706E19-1587-4374-8632-8C90741F51B6}" srcOrd="0" destOrd="0" presId="urn:microsoft.com/office/officeart/2008/layout/LinedList"/>
+    <dgm:cxn modelId="{39E00DD8-E971-4723-AEDE-08466DE1DF04}" type="presParOf" srcId="{26A66081-0D96-44AF-82D2-A0EE8C49D0E6}" destId="{17CD7394-32CB-475E-936D-D604D2FB4F1D}" srcOrd="1" destOrd="0" presId="urn:microsoft.com/office/officeart/2008/layout/LinedList"/>
+    <dgm:cxn modelId="{237D7261-44D5-406A-AAE3-7FC0EDD51CCC}" type="presParOf" srcId="{13D3CA98-3A1A-4231-8FA8-AFB8EA99FE7B}" destId="{401D2D4C-7F31-477B-A9C8-A3671D712C33}" srcOrd="2" destOrd="0" presId="urn:microsoft.com/office/officeart/2008/layout/LinedList"/>
+    <dgm:cxn modelId="{88434CF5-7ACE-4917-BF1F-AFCF8B21D0D9}" type="presParOf" srcId="{13D3CA98-3A1A-4231-8FA8-AFB8EA99FE7B}" destId="{42EF963F-39E4-4998-B787-9E6D3E78A133}" srcOrd="3" destOrd="0" presId="urn:microsoft.com/office/officeart/2008/layout/LinedList"/>
+    <dgm:cxn modelId="{12BBEEF9-727E-4BD2-861D-5A535E48884A}" type="presParOf" srcId="{42EF963F-39E4-4998-B787-9E6D3E78A133}" destId="{FE25F505-2401-401A-AE2C-8102B695BC00}" srcOrd="0" destOrd="0" presId="urn:microsoft.com/office/officeart/2008/layout/LinedList"/>
+    <dgm:cxn modelId="{38219835-32C9-41AC-8125-A555DE0FA523}" type="presParOf" srcId="{42EF963F-39E4-4998-B787-9E6D3E78A133}" destId="{5FAF38A4-93FB-4C38-A9E4-8A8B297C0845}" srcOrd="1" destOrd="0" presId="urn:microsoft.com/office/officeart/2008/layout/LinedList"/>
+    <dgm:cxn modelId="{7411E13F-8FA5-4F53-B4AE-661D82898197}" type="presParOf" srcId="{13D3CA98-3A1A-4231-8FA8-AFB8EA99FE7B}" destId="{E5F55AD7-8E04-4768-AD96-7A57B79844E1}" srcOrd="4" destOrd="0" presId="urn:microsoft.com/office/officeart/2008/layout/LinedList"/>
+    <dgm:cxn modelId="{397F1DB3-4749-464B-A344-ECAC63130FFE}" type="presParOf" srcId="{13D3CA98-3A1A-4231-8FA8-AFB8EA99FE7B}" destId="{A2BD0CFD-7A0B-4C89-8D3E-075EFB85C5BE}" srcOrd="5" destOrd="0" presId="urn:microsoft.com/office/officeart/2008/layout/LinedList"/>
+    <dgm:cxn modelId="{5E973EA8-A9B8-4CDD-BA8B-4754683B30B0}" type="presParOf" srcId="{A2BD0CFD-7A0B-4C89-8D3E-075EFB85C5BE}" destId="{92572AA9-CE03-44B7-98A9-8A9FBD81DB91}" srcOrd="0" destOrd="0" presId="urn:microsoft.com/office/officeart/2008/layout/LinedList"/>
+    <dgm:cxn modelId="{E952F51B-4071-40F8-8994-033CB3E2F8D4}" type="presParOf" srcId="{A2BD0CFD-7A0B-4C89-8D3E-075EFB85C5BE}" destId="{69D243A3-3BD8-474A-B361-57FA2398D447}" srcOrd="1" destOrd="0" presId="urn:microsoft.com/office/officeart/2008/layout/LinedList"/>
+    <dgm:cxn modelId="{B7E1A103-D903-47E5-8AD5-209CE3E99ECB}" type="presParOf" srcId="{13D3CA98-3A1A-4231-8FA8-AFB8EA99FE7B}" destId="{CA33BEB4-696F-4348-8FBF-7B696E96869E}" srcOrd="6" destOrd="0" presId="urn:microsoft.com/office/officeart/2008/layout/LinedList"/>
+    <dgm:cxn modelId="{06BDA581-3ACF-4C3A-A705-F83AF434514A}" type="presParOf" srcId="{13D3CA98-3A1A-4231-8FA8-AFB8EA99FE7B}" destId="{DE42CA26-8D7E-44F5-8D6E-7969B21EAE8D}" srcOrd="7" destOrd="0" presId="urn:microsoft.com/office/officeart/2008/layout/LinedList"/>
+    <dgm:cxn modelId="{C20F33B9-CC55-41A3-BE7C-9311460EBAB4}" type="presParOf" srcId="{DE42CA26-8D7E-44F5-8D6E-7969B21EAE8D}" destId="{0F93BA47-E8AF-450F-8AB4-B4FE250FEA3F}" srcOrd="0" destOrd="0" presId="urn:microsoft.com/office/officeart/2008/layout/LinedList"/>
+    <dgm:cxn modelId="{F79BF028-990C-4D0A-B6FE-6FBB369DECF0}" type="presParOf" srcId="{DE42CA26-8D7E-44F5-8D6E-7969B21EAE8D}" destId="{804504EC-AAEA-40EF-8AE6-5211E1595F2A}" srcOrd="1" destOrd="0" presId="urn:microsoft.com/office/officeart/2008/layout/LinedList"/>
+    <dgm:cxn modelId="{4E8D5E1B-BDA7-4F4F-917A-069AE60C78E9}" type="presParOf" srcId="{13D3CA98-3A1A-4231-8FA8-AFB8EA99FE7B}" destId="{B1BC364F-412D-446F-96A1-24ED771979FF}" srcOrd="8" destOrd="0" presId="urn:microsoft.com/office/officeart/2008/layout/LinedList"/>
+    <dgm:cxn modelId="{E4A87B0E-2E8A-41D1-A289-73A24198C8F3}" type="presParOf" srcId="{13D3CA98-3A1A-4231-8FA8-AFB8EA99FE7B}" destId="{AD2D61D9-4A3A-45F8-9B87-4C3DE4FED7C7}" srcOrd="9" destOrd="0" presId="urn:microsoft.com/office/officeart/2008/layout/LinedList"/>
+    <dgm:cxn modelId="{BC892792-21CB-4F77-BB40-94505DF27C62}" type="presParOf" srcId="{AD2D61D9-4A3A-45F8-9B87-4C3DE4FED7C7}" destId="{31A4463F-C0F7-4070-B72D-C242E586BD78}" srcOrd="0" destOrd="0" presId="urn:microsoft.com/office/officeart/2008/layout/LinedList"/>
+    <dgm:cxn modelId="{789312A8-8836-4440-B0B5-2F72460D1804}" type="presParOf" srcId="{AD2D61D9-4A3A-45F8-9B87-4C3DE4FED7C7}" destId="{09558064-8CB1-4D78-949A-541F848BF33E}" srcOrd="1" destOrd="0" presId="urn:microsoft.com/office/officeart/2008/layout/LinedList"/>
+    <dgm:cxn modelId="{5B97B307-BAAF-414D-8922-6AEB0F4BA652}" type="presParOf" srcId="{13D3CA98-3A1A-4231-8FA8-AFB8EA99FE7B}" destId="{994BAB52-B6EE-400B-8E1F-8CE328BB812E}" srcOrd="10" destOrd="0" presId="urn:microsoft.com/office/officeart/2008/layout/LinedList"/>
+    <dgm:cxn modelId="{421431A2-236A-4909-BF38-D591C4D928A3}" type="presParOf" srcId="{13D3CA98-3A1A-4231-8FA8-AFB8EA99FE7B}" destId="{85019105-F019-44A1-AA6A-C767E0F198A7}" srcOrd="11" destOrd="0" presId="urn:microsoft.com/office/officeart/2008/layout/LinedList"/>
+    <dgm:cxn modelId="{F9FCA6A7-EE1F-4BA4-B8AC-2C061E93A76E}" type="presParOf" srcId="{85019105-F019-44A1-AA6A-C767E0F198A7}" destId="{F67EE4D0-88A7-4218-9399-DB7008A07E1A}" srcOrd="0" destOrd="0" presId="urn:microsoft.com/office/officeart/2008/layout/LinedList"/>
+    <dgm:cxn modelId="{85A6FF28-38F8-41D4-897C-BACE10E1E04A}" type="presParOf" srcId="{85019105-F019-44A1-AA6A-C767E0F198A7}" destId="{10786298-9C11-4EE5-BF01-AACDB4D3247E}" srcOrd="1" destOrd="0" presId="urn:microsoft.com/office/officeart/2008/layout/LinedList"/>
+    <dgm:cxn modelId="{0B6EB23D-018E-4630-AB95-61FA29DB78EB}" type="presParOf" srcId="{13D3CA98-3A1A-4231-8FA8-AFB8EA99FE7B}" destId="{12EBED62-4CEC-4E5F-9009-F7BAF8F19494}" srcOrd="12" destOrd="0" presId="urn:microsoft.com/office/officeart/2008/layout/LinedList"/>
+    <dgm:cxn modelId="{A63E3A56-9FB3-4CC3-BF4E-53B9479F1B06}" type="presParOf" srcId="{13D3CA98-3A1A-4231-8FA8-AFB8EA99FE7B}" destId="{2BF56DE7-1292-4685-A3B8-9661F120BEDC}" srcOrd="13" destOrd="0" presId="urn:microsoft.com/office/officeart/2008/layout/LinedList"/>
+    <dgm:cxn modelId="{14D9368D-2EFF-4BB2-BF0C-4C892DE62D1B}" type="presParOf" srcId="{2BF56DE7-1292-4685-A3B8-9661F120BEDC}" destId="{520F300C-9694-49D2-B150-E94866C7C046}" srcOrd="0" destOrd="0" presId="urn:microsoft.com/office/officeart/2008/layout/LinedList"/>
+    <dgm:cxn modelId="{2F66A241-3C48-44DE-AF1D-602866E01272}" type="presParOf" srcId="{2BF56DE7-1292-4685-A3B8-9661F120BEDC}" destId="{E774A862-83DF-4A9D-96B2-9B56BF95EA9E}" srcOrd="1" destOrd="0" presId="urn:microsoft.com/office/officeart/2008/layout/LinedList"/>
+    <dgm:cxn modelId="{656CDEA9-FCA6-4CAB-ADDB-164CC3BE9C51}" type="presParOf" srcId="{13D3CA98-3A1A-4231-8FA8-AFB8EA99FE7B}" destId="{78ED2CB2-2240-430C-BE00-8A1B51A66824}" srcOrd="14" destOrd="0" presId="urn:microsoft.com/office/officeart/2008/layout/LinedList"/>
+    <dgm:cxn modelId="{002DD653-6CDD-4EF3-A043-5662AA762451}" type="presParOf" srcId="{13D3CA98-3A1A-4231-8FA8-AFB8EA99FE7B}" destId="{4EAA92A2-9A83-4CE6-8E00-509F524FA41A}" srcOrd="15" destOrd="0" presId="urn:microsoft.com/office/officeart/2008/layout/LinedList"/>
+    <dgm:cxn modelId="{1AD6231C-C6F6-4B94-BD5A-62D103A0BDE2}" type="presParOf" srcId="{4EAA92A2-9A83-4CE6-8E00-509F524FA41A}" destId="{A6475A21-A0B6-4246-AAF5-5AFCDD3AE439}" srcOrd="0" destOrd="0" presId="urn:microsoft.com/office/officeart/2008/layout/LinedList"/>
+    <dgm:cxn modelId="{F4D03BF5-8591-4738-841F-A4EA6A2CFD12}" type="presParOf" srcId="{4EAA92A2-9A83-4CE6-8E00-509F524FA41A}" destId="{9AE87449-95AA-4A0B-B18A-955EFD775133}" srcOrd="1" destOrd="0" presId="urn:microsoft.com/office/officeart/2008/layout/LinedList"/>
+    <dgm:cxn modelId="{DDD22BA9-B469-438D-9805-8B397B3D0C79}" type="presParOf" srcId="{13D3CA98-3A1A-4231-8FA8-AFB8EA99FE7B}" destId="{C8248AB1-27B1-4A4E-9F18-6CB0F7583F7E}" srcOrd="16" destOrd="0" presId="urn:microsoft.com/office/officeart/2008/layout/LinedList"/>
+    <dgm:cxn modelId="{511F162A-B683-4CCA-A884-A315587E0806}" type="presParOf" srcId="{13D3CA98-3A1A-4231-8FA8-AFB8EA99FE7B}" destId="{147B70E6-C85B-4494-AEEE-8CEB5A8AC1C4}" srcOrd="17" destOrd="0" presId="urn:microsoft.com/office/officeart/2008/layout/LinedList"/>
+    <dgm:cxn modelId="{1E043D5E-FA41-4539-B7C2-2D0C2C839D52}" type="presParOf" srcId="{147B70E6-C85B-4494-AEEE-8CEB5A8AC1C4}" destId="{907219E2-91DE-4FFF-8240-B8DDA8E22B62}" srcOrd="0" destOrd="0" presId="urn:microsoft.com/office/officeart/2008/layout/LinedList"/>
+    <dgm:cxn modelId="{5C1D2854-4AA4-4641-B787-2DF7A4820BD6}" type="presParOf" srcId="{147B70E6-C85B-4494-AEEE-8CEB5A8AC1C4}" destId="{33A7F1E0-82EB-4CCD-9F1B-EE844325BDDF}" srcOrd="1" destOrd="0" presId="urn:microsoft.com/office/officeart/2008/layout/LinedList"/>
+    <dgm:cxn modelId="{6BBA8BDD-F0C4-4638-B619-B0DCA1D5A6A4}" type="presParOf" srcId="{13D3CA98-3A1A-4231-8FA8-AFB8EA99FE7B}" destId="{AD9A0D1F-8F80-44A6-AA40-E1753AB9E7DA}" srcOrd="18" destOrd="0" presId="urn:microsoft.com/office/officeart/2008/layout/LinedList"/>
+    <dgm:cxn modelId="{86982B9F-CD55-4439-974F-83DA2F21B745}" type="presParOf" srcId="{13D3CA98-3A1A-4231-8FA8-AFB8EA99FE7B}" destId="{CC370A3E-C13A-47BF-BF81-8317CC1B22E5}" srcOrd="19" destOrd="0" presId="urn:microsoft.com/office/officeart/2008/layout/LinedList"/>
+    <dgm:cxn modelId="{E59E7AC4-B801-4E84-B4DC-02B1FC44F665}" type="presParOf" srcId="{CC370A3E-C13A-47BF-BF81-8317CC1B22E5}" destId="{4936F773-CC18-4F0E-AA7D-645EE735707B}" srcOrd="0" destOrd="0" presId="urn:microsoft.com/office/officeart/2008/layout/LinedList"/>
+    <dgm:cxn modelId="{D0CF1ECC-4C3D-4D5F-BAB5-5FE80EC62B7C}" type="presParOf" srcId="{CC370A3E-C13A-47BF-BF81-8317CC1B22E5}" destId="{CAB5A380-00F7-42DA-833B-20D0DAD916C7}" srcOrd="1" destOrd="0" presId="urn:microsoft.com/office/officeart/2008/layout/LinedList"/>
+    <dgm:cxn modelId="{7AF4AA59-A34C-4F2A-8A1A-422630649519}" type="presParOf" srcId="{13D3CA98-3A1A-4231-8FA8-AFB8EA99FE7B}" destId="{50B6BDA2-F8DB-481F-B3DA-34E6542440E1}" srcOrd="20" destOrd="0" presId="urn:microsoft.com/office/officeart/2008/layout/LinedList"/>
+    <dgm:cxn modelId="{20F4D562-2C90-46E4-8975-92D44C28D39C}" type="presParOf" srcId="{13D3CA98-3A1A-4231-8FA8-AFB8EA99FE7B}" destId="{D5102471-2ED1-448E-A307-4703309EEF98}" srcOrd="21" destOrd="0" presId="urn:microsoft.com/office/officeart/2008/layout/LinedList"/>
+    <dgm:cxn modelId="{E6F9915E-FF3A-4869-A49E-5C569106AF96}" type="presParOf" srcId="{D5102471-2ED1-448E-A307-4703309EEF98}" destId="{AB1FFAE1-FC19-4BF2-8C31-2FF5B0FAA78C}" srcOrd="0" destOrd="0" presId="urn:microsoft.com/office/officeart/2008/layout/LinedList"/>
+    <dgm:cxn modelId="{155957C0-D73D-4C0F-8118-C24FC1D0A1CC}" type="presParOf" srcId="{D5102471-2ED1-448E-A307-4703309EEF98}" destId="{7567DCED-7CDB-4A84-8F86-5DBB11030C8E}" srcOrd="1" destOrd="0" presId="urn:microsoft.com/office/officeart/2008/layout/LinedList"/>
   </dgm:cxnLst>
   <dgm:bg/>
   <dgm:whole/>
@@ -3079,30 +3115,60 @@
       <dsp:cNvGrpSpPr/>
     </dsp:nvGrpSpPr>
     <dsp:grpSpPr/>
-    <dsp:sp modelId="{9C9397AF-9607-4223-B77E-98CD877F37F4}">
+    <dsp:sp modelId="{A7CB411C-2FB3-459C-BC45-BA0B97A1AC3A}">
       <dsp:nvSpPr>
         <dsp:cNvPr id="0" name=""/>
         <dsp:cNvSpPr/>
       </dsp:nvSpPr>
       <dsp:spPr>
         <a:xfrm>
-          <a:off x="0" y="2145"/>
-          <a:ext cx="6891188" cy="0"/>
+          <a:off x="0" y="2124"/>
+          <a:ext cx="5387501" cy="0"/>
         </a:xfrm>
         <a:prstGeom prst="line">
           <a:avLst/>
         </a:prstGeom>
-        <a:solidFill>
-          <a:schemeClr val="accent1">
-            <a:hueOff val="0"/>
-            <a:satOff val="0"/>
-            <a:lumOff val="0"/>
-            <a:alphaOff val="0"/>
-          </a:schemeClr>
-        </a:solidFill>
-        <a:ln w="12700" cap="flat" cmpd="sng" algn="ctr">
+        <a:gradFill rotWithShape="0">
+          <a:gsLst>
+            <a:gs pos="0">
+              <a:schemeClr val="accent2">
+                <a:hueOff val="0"/>
+                <a:satOff val="0"/>
+                <a:lumOff val="0"/>
+                <a:alphaOff val="0"/>
+                <a:satMod val="103000"/>
+                <a:lumMod val="102000"/>
+                <a:tint val="94000"/>
+              </a:schemeClr>
+            </a:gs>
+            <a:gs pos="50000">
+              <a:schemeClr val="accent2">
+                <a:hueOff val="0"/>
+                <a:satOff val="0"/>
+                <a:lumOff val="0"/>
+                <a:alphaOff val="0"/>
+                <a:satMod val="110000"/>
+                <a:lumMod val="100000"/>
+                <a:shade val="100000"/>
+              </a:schemeClr>
+            </a:gs>
+            <a:gs pos="100000">
+              <a:schemeClr val="accent2">
+                <a:hueOff val="0"/>
+                <a:satOff val="0"/>
+                <a:lumOff val="0"/>
+                <a:alphaOff val="0"/>
+                <a:lumMod val="99000"/>
+                <a:satMod val="120000"/>
+                <a:shade val="78000"/>
+              </a:schemeClr>
+            </a:gs>
+          </a:gsLst>
+          <a:lin ang="5400000" scaled="0"/>
+        </a:gradFill>
+        <a:ln w="6350" cap="flat" cmpd="sng" algn="ctr">
           <a:solidFill>
-            <a:schemeClr val="accent1">
+            <a:schemeClr val="accent2">
               <a:hueOff val="0"/>
               <a:satOff val="0"/>
               <a:lumOff val="0"/>
@@ -3115,13 +3181,13 @@
         <a:effectLst/>
       </dsp:spPr>
       <dsp:style>
-        <a:lnRef idx="2">
+        <a:lnRef idx="1">
           <a:scrgbClr r="0" g="0" b="0"/>
         </a:lnRef>
-        <a:fillRef idx="1">
+        <a:fillRef idx="3">
           <a:scrgbClr r="0" g="0" b="0"/>
         </a:fillRef>
-        <a:effectRef idx="1">
+        <a:effectRef idx="2">
           <a:scrgbClr r="0" g="0" b="0"/>
         </a:effectRef>
         <a:fontRef idx="minor">
@@ -3129,15 +3195,15 @@
         </a:fontRef>
       </dsp:style>
     </dsp:sp>
-    <dsp:sp modelId="{D828109D-0A1E-43BF-82B2-EF3E25607856}">
+    <dsp:sp modelId="{84706E19-1587-4374-8632-8C90741F51B6}">
       <dsp:nvSpPr>
         <dsp:cNvPr id="0" name=""/>
         <dsp:cNvSpPr/>
       </dsp:nvSpPr>
       <dsp:spPr>
         <a:xfrm>
-          <a:off x="0" y="2145"/>
-          <a:ext cx="6891188" cy="399062"/>
+          <a:off x="0" y="2124"/>
+          <a:ext cx="5387501" cy="395189"/>
         </a:xfrm>
         <a:prstGeom prst="rect">
           <a:avLst/>
@@ -3185,37 +3251,67 @@
         </a:p>
       </dsp:txBody>
       <dsp:txXfrm>
-        <a:off x="0" y="2145"/>
-        <a:ext cx="6891188" cy="399062"/>
+        <a:off x="0" y="2124"/>
+        <a:ext cx="5387501" cy="395189"/>
       </dsp:txXfrm>
     </dsp:sp>
-    <dsp:sp modelId="{EA5B6C39-3A21-4D58-BACA-F70755D16C22}">
+    <dsp:sp modelId="{401D2D4C-7F31-477B-A9C8-A3671D712C33}">
       <dsp:nvSpPr>
         <dsp:cNvPr id="0" name=""/>
         <dsp:cNvSpPr/>
       </dsp:nvSpPr>
       <dsp:spPr>
         <a:xfrm>
-          <a:off x="0" y="401208"/>
-          <a:ext cx="6891188" cy="0"/>
+          <a:off x="0" y="397314"/>
+          <a:ext cx="5387501" cy="0"/>
         </a:xfrm>
         <a:prstGeom prst="line">
           <a:avLst/>
         </a:prstGeom>
-        <a:solidFill>
-          <a:schemeClr val="accent1">
-            <a:hueOff val="0"/>
-            <a:satOff val="0"/>
-            <a:lumOff val="0"/>
-            <a:alphaOff val="0"/>
-          </a:schemeClr>
-        </a:solidFill>
-        <a:ln w="12700" cap="flat" cmpd="sng" algn="ctr">
+        <a:gradFill rotWithShape="0">
+          <a:gsLst>
+            <a:gs pos="0">
+              <a:schemeClr val="accent2">
+                <a:hueOff val="-145536"/>
+                <a:satOff val="-8393"/>
+                <a:lumOff val="863"/>
+                <a:alphaOff val="0"/>
+                <a:satMod val="103000"/>
+                <a:lumMod val="102000"/>
+                <a:tint val="94000"/>
+              </a:schemeClr>
+            </a:gs>
+            <a:gs pos="50000">
+              <a:schemeClr val="accent2">
+                <a:hueOff val="-145536"/>
+                <a:satOff val="-8393"/>
+                <a:lumOff val="863"/>
+                <a:alphaOff val="0"/>
+                <a:satMod val="110000"/>
+                <a:lumMod val="100000"/>
+                <a:shade val="100000"/>
+              </a:schemeClr>
+            </a:gs>
+            <a:gs pos="100000">
+              <a:schemeClr val="accent2">
+                <a:hueOff val="-145536"/>
+                <a:satOff val="-8393"/>
+                <a:lumOff val="863"/>
+                <a:alphaOff val="0"/>
+                <a:lumMod val="99000"/>
+                <a:satMod val="120000"/>
+                <a:shade val="78000"/>
+              </a:schemeClr>
+            </a:gs>
+          </a:gsLst>
+          <a:lin ang="5400000" scaled="0"/>
+        </a:gradFill>
+        <a:ln w="6350" cap="flat" cmpd="sng" algn="ctr">
           <a:solidFill>
-            <a:schemeClr val="accent1">
-              <a:hueOff val="0"/>
-              <a:satOff val="0"/>
-              <a:lumOff val="0"/>
+            <a:schemeClr val="accent2">
+              <a:hueOff val="-145536"/>
+              <a:satOff val="-8393"/>
+              <a:lumOff val="863"/>
               <a:alphaOff val="0"/>
             </a:schemeClr>
           </a:solidFill>
@@ -3225,13 +3321,13 @@
         <a:effectLst/>
       </dsp:spPr>
       <dsp:style>
-        <a:lnRef idx="2">
+        <a:lnRef idx="1">
           <a:scrgbClr r="0" g="0" b="0"/>
         </a:lnRef>
-        <a:fillRef idx="1">
+        <a:fillRef idx="3">
           <a:scrgbClr r="0" g="0" b="0"/>
         </a:fillRef>
-        <a:effectRef idx="1">
+        <a:effectRef idx="2">
           <a:scrgbClr r="0" g="0" b="0"/>
         </a:effectRef>
         <a:fontRef idx="minor">
@@ -3239,15 +3335,15 @@
         </a:fontRef>
       </dsp:style>
     </dsp:sp>
-    <dsp:sp modelId="{0A832B16-A47A-4B21-B37F-06722932084A}">
+    <dsp:sp modelId="{FE25F505-2401-401A-AE2C-8102B695BC00}">
       <dsp:nvSpPr>
         <dsp:cNvPr id="0" name=""/>
         <dsp:cNvSpPr/>
       </dsp:nvSpPr>
       <dsp:spPr>
         <a:xfrm>
-          <a:off x="0" y="401208"/>
-          <a:ext cx="6891188" cy="399062"/>
+          <a:off x="0" y="397314"/>
+          <a:ext cx="5387501" cy="395189"/>
         </a:xfrm>
         <a:prstGeom prst="rect">
           <a:avLst/>
@@ -3295,37 +3391,67 @@
         </a:p>
       </dsp:txBody>
       <dsp:txXfrm>
-        <a:off x="0" y="401208"/>
-        <a:ext cx="6891188" cy="399062"/>
+        <a:off x="0" y="397314"/>
+        <a:ext cx="5387501" cy="395189"/>
       </dsp:txXfrm>
     </dsp:sp>
-    <dsp:sp modelId="{7E717C3A-D603-4542-9810-6A2E94E168F7}">
+    <dsp:sp modelId="{E5F55AD7-8E04-4768-AD96-7A57B79844E1}">
       <dsp:nvSpPr>
         <dsp:cNvPr id="0" name=""/>
         <dsp:cNvSpPr/>
       </dsp:nvSpPr>
       <dsp:spPr>
         <a:xfrm>
-          <a:off x="0" y="800271"/>
-          <a:ext cx="6891188" cy="0"/>
+          <a:off x="0" y="792504"/>
+          <a:ext cx="5387501" cy="0"/>
         </a:xfrm>
         <a:prstGeom prst="line">
           <a:avLst/>
         </a:prstGeom>
-        <a:solidFill>
-          <a:schemeClr val="accent1">
-            <a:hueOff val="0"/>
-            <a:satOff val="0"/>
-            <a:lumOff val="0"/>
-            <a:alphaOff val="0"/>
-          </a:schemeClr>
-        </a:solidFill>
-        <a:ln w="12700" cap="flat" cmpd="sng" algn="ctr">
+        <a:gradFill rotWithShape="0">
+          <a:gsLst>
+            <a:gs pos="0">
+              <a:schemeClr val="accent2">
+                <a:hueOff val="-291073"/>
+                <a:satOff val="-16786"/>
+                <a:lumOff val="1726"/>
+                <a:alphaOff val="0"/>
+                <a:satMod val="103000"/>
+                <a:lumMod val="102000"/>
+                <a:tint val="94000"/>
+              </a:schemeClr>
+            </a:gs>
+            <a:gs pos="50000">
+              <a:schemeClr val="accent2">
+                <a:hueOff val="-291073"/>
+                <a:satOff val="-16786"/>
+                <a:lumOff val="1726"/>
+                <a:alphaOff val="0"/>
+                <a:satMod val="110000"/>
+                <a:lumMod val="100000"/>
+                <a:shade val="100000"/>
+              </a:schemeClr>
+            </a:gs>
+            <a:gs pos="100000">
+              <a:schemeClr val="accent2">
+                <a:hueOff val="-291073"/>
+                <a:satOff val="-16786"/>
+                <a:lumOff val="1726"/>
+                <a:alphaOff val="0"/>
+                <a:lumMod val="99000"/>
+                <a:satMod val="120000"/>
+                <a:shade val="78000"/>
+              </a:schemeClr>
+            </a:gs>
+          </a:gsLst>
+          <a:lin ang="5400000" scaled="0"/>
+        </a:gradFill>
+        <a:ln w="6350" cap="flat" cmpd="sng" algn="ctr">
           <a:solidFill>
-            <a:schemeClr val="accent1">
-              <a:hueOff val="0"/>
-              <a:satOff val="0"/>
-              <a:lumOff val="0"/>
+            <a:schemeClr val="accent2">
+              <a:hueOff val="-291073"/>
+              <a:satOff val="-16786"/>
+              <a:lumOff val="1726"/>
               <a:alphaOff val="0"/>
             </a:schemeClr>
           </a:solidFill>
@@ -3335,13 +3461,13 @@
         <a:effectLst/>
       </dsp:spPr>
       <dsp:style>
-        <a:lnRef idx="2">
+        <a:lnRef idx="1">
           <a:scrgbClr r="0" g="0" b="0"/>
         </a:lnRef>
-        <a:fillRef idx="1">
+        <a:fillRef idx="3">
           <a:scrgbClr r="0" g="0" b="0"/>
         </a:fillRef>
-        <a:effectRef idx="1">
+        <a:effectRef idx="2">
           <a:scrgbClr r="0" g="0" b="0"/>
         </a:effectRef>
         <a:fontRef idx="minor">
@@ -3349,15 +3475,15 @@
         </a:fontRef>
       </dsp:style>
     </dsp:sp>
-    <dsp:sp modelId="{E3453451-6D8D-4477-9100-E93684886FE0}">
+    <dsp:sp modelId="{92572AA9-CE03-44B7-98A9-8A9FBD81DB91}">
       <dsp:nvSpPr>
         <dsp:cNvPr id="0" name=""/>
         <dsp:cNvSpPr/>
       </dsp:nvSpPr>
       <dsp:spPr>
         <a:xfrm>
-          <a:off x="0" y="800271"/>
-          <a:ext cx="6891188" cy="399062"/>
+          <a:off x="0" y="792504"/>
+          <a:ext cx="5387501" cy="395189"/>
         </a:xfrm>
         <a:prstGeom prst="rect">
           <a:avLst/>
@@ -3405,37 +3531,67 @@
         </a:p>
       </dsp:txBody>
       <dsp:txXfrm>
-        <a:off x="0" y="800271"/>
-        <a:ext cx="6891188" cy="399062"/>
+        <a:off x="0" y="792504"/>
+        <a:ext cx="5387501" cy="395189"/>
       </dsp:txXfrm>
     </dsp:sp>
-    <dsp:sp modelId="{DFF2CB88-09E7-4C34-9054-663D46A28E8D}">
+    <dsp:sp modelId="{CA33BEB4-696F-4348-8FBF-7B696E96869E}">
       <dsp:nvSpPr>
         <dsp:cNvPr id="0" name=""/>
         <dsp:cNvSpPr/>
       </dsp:nvSpPr>
       <dsp:spPr>
         <a:xfrm>
-          <a:off x="0" y="1199333"/>
-          <a:ext cx="6891188" cy="0"/>
+          <a:off x="0" y="1187694"/>
+          <a:ext cx="5387501" cy="0"/>
         </a:xfrm>
         <a:prstGeom prst="line">
           <a:avLst/>
         </a:prstGeom>
-        <a:solidFill>
-          <a:schemeClr val="accent1">
-            <a:hueOff val="0"/>
-            <a:satOff val="0"/>
-            <a:lumOff val="0"/>
-            <a:alphaOff val="0"/>
-          </a:schemeClr>
-        </a:solidFill>
-        <a:ln w="12700" cap="flat" cmpd="sng" algn="ctr">
+        <a:gradFill rotWithShape="0">
+          <a:gsLst>
+            <a:gs pos="0">
+              <a:schemeClr val="accent2">
+                <a:hueOff val="-436609"/>
+                <a:satOff val="-25178"/>
+                <a:lumOff val="2588"/>
+                <a:alphaOff val="0"/>
+                <a:satMod val="103000"/>
+                <a:lumMod val="102000"/>
+                <a:tint val="94000"/>
+              </a:schemeClr>
+            </a:gs>
+            <a:gs pos="50000">
+              <a:schemeClr val="accent2">
+                <a:hueOff val="-436609"/>
+                <a:satOff val="-25178"/>
+                <a:lumOff val="2588"/>
+                <a:alphaOff val="0"/>
+                <a:satMod val="110000"/>
+                <a:lumMod val="100000"/>
+                <a:shade val="100000"/>
+              </a:schemeClr>
+            </a:gs>
+            <a:gs pos="100000">
+              <a:schemeClr val="accent2">
+                <a:hueOff val="-436609"/>
+                <a:satOff val="-25178"/>
+                <a:lumOff val="2588"/>
+                <a:alphaOff val="0"/>
+                <a:lumMod val="99000"/>
+                <a:satMod val="120000"/>
+                <a:shade val="78000"/>
+              </a:schemeClr>
+            </a:gs>
+          </a:gsLst>
+          <a:lin ang="5400000" scaled="0"/>
+        </a:gradFill>
+        <a:ln w="6350" cap="flat" cmpd="sng" algn="ctr">
           <a:solidFill>
-            <a:schemeClr val="accent1">
-              <a:hueOff val="0"/>
-              <a:satOff val="0"/>
-              <a:lumOff val="0"/>
+            <a:schemeClr val="accent2">
+              <a:hueOff val="-436609"/>
+              <a:satOff val="-25178"/>
+              <a:lumOff val="2588"/>
               <a:alphaOff val="0"/>
             </a:schemeClr>
           </a:solidFill>
@@ -3445,13 +3601,13 @@
         <a:effectLst/>
       </dsp:spPr>
       <dsp:style>
-        <a:lnRef idx="2">
+        <a:lnRef idx="1">
           <a:scrgbClr r="0" g="0" b="0"/>
         </a:lnRef>
-        <a:fillRef idx="1">
+        <a:fillRef idx="3">
           <a:scrgbClr r="0" g="0" b="0"/>
         </a:fillRef>
-        <a:effectRef idx="1">
+        <a:effectRef idx="2">
           <a:scrgbClr r="0" g="0" b="0"/>
         </a:effectRef>
         <a:fontRef idx="minor">
@@ -3459,15 +3615,15 @@
         </a:fontRef>
       </dsp:style>
     </dsp:sp>
-    <dsp:sp modelId="{7D7BB0D0-A9CC-4C71-9687-CEEA1651FA21}">
+    <dsp:sp modelId="{0F93BA47-E8AF-450F-8AB4-B4FE250FEA3F}">
       <dsp:nvSpPr>
         <dsp:cNvPr id="0" name=""/>
         <dsp:cNvSpPr/>
       </dsp:nvSpPr>
       <dsp:spPr>
         <a:xfrm>
-          <a:off x="0" y="1199333"/>
-          <a:ext cx="6891188" cy="399062"/>
+          <a:off x="0" y="1187694"/>
+          <a:ext cx="5387501" cy="395189"/>
         </a:xfrm>
         <a:prstGeom prst="rect">
           <a:avLst/>
@@ -3515,37 +3671,67 @@
         </a:p>
       </dsp:txBody>
       <dsp:txXfrm>
-        <a:off x="0" y="1199333"/>
-        <a:ext cx="6891188" cy="399062"/>
+        <a:off x="0" y="1187694"/>
+        <a:ext cx="5387501" cy="395189"/>
       </dsp:txXfrm>
     </dsp:sp>
-    <dsp:sp modelId="{9010900E-BE11-4037-9A81-C3C5C7FAE5C9}">
+    <dsp:sp modelId="{B1BC364F-412D-446F-96A1-24ED771979FF}">
       <dsp:nvSpPr>
         <dsp:cNvPr id="0" name=""/>
         <dsp:cNvSpPr/>
       </dsp:nvSpPr>
       <dsp:spPr>
         <a:xfrm>
-          <a:off x="0" y="1598396"/>
-          <a:ext cx="6891188" cy="0"/>
+          <a:off x="0" y="1582884"/>
+          <a:ext cx="5387501" cy="0"/>
         </a:xfrm>
         <a:prstGeom prst="line">
           <a:avLst/>
         </a:prstGeom>
-        <a:solidFill>
-          <a:schemeClr val="accent1">
-            <a:hueOff val="0"/>
-            <a:satOff val="0"/>
-            <a:lumOff val="0"/>
-            <a:alphaOff val="0"/>
-          </a:schemeClr>
-        </a:solidFill>
-        <a:ln w="12700" cap="flat" cmpd="sng" algn="ctr">
+        <a:gradFill rotWithShape="0">
+          <a:gsLst>
+            <a:gs pos="0">
+              <a:schemeClr val="accent2">
+                <a:hueOff val="-582145"/>
+                <a:satOff val="-33571"/>
+                <a:lumOff val="3451"/>
+                <a:alphaOff val="0"/>
+                <a:satMod val="103000"/>
+                <a:lumMod val="102000"/>
+                <a:tint val="94000"/>
+              </a:schemeClr>
+            </a:gs>
+            <a:gs pos="50000">
+              <a:schemeClr val="accent2">
+                <a:hueOff val="-582145"/>
+                <a:satOff val="-33571"/>
+                <a:lumOff val="3451"/>
+                <a:alphaOff val="0"/>
+                <a:satMod val="110000"/>
+                <a:lumMod val="100000"/>
+                <a:shade val="100000"/>
+              </a:schemeClr>
+            </a:gs>
+            <a:gs pos="100000">
+              <a:schemeClr val="accent2">
+                <a:hueOff val="-582145"/>
+                <a:satOff val="-33571"/>
+                <a:lumOff val="3451"/>
+                <a:alphaOff val="0"/>
+                <a:lumMod val="99000"/>
+                <a:satMod val="120000"/>
+                <a:shade val="78000"/>
+              </a:schemeClr>
+            </a:gs>
+          </a:gsLst>
+          <a:lin ang="5400000" scaled="0"/>
+        </a:gradFill>
+        <a:ln w="6350" cap="flat" cmpd="sng" algn="ctr">
           <a:solidFill>
-            <a:schemeClr val="accent1">
-              <a:hueOff val="0"/>
-              <a:satOff val="0"/>
-              <a:lumOff val="0"/>
+            <a:schemeClr val="accent2">
+              <a:hueOff val="-582145"/>
+              <a:satOff val="-33571"/>
+              <a:lumOff val="3451"/>
               <a:alphaOff val="0"/>
             </a:schemeClr>
           </a:solidFill>
@@ -3555,13 +3741,13 @@
         <a:effectLst/>
       </dsp:spPr>
       <dsp:style>
-        <a:lnRef idx="2">
+        <a:lnRef idx="1">
           <a:scrgbClr r="0" g="0" b="0"/>
         </a:lnRef>
-        <a:fillRef idx="1">
+        <a:fillRef idx="3">
           <a:scrgbClr r="0" g="0" b="0"/>
         </a:fillRef>
-        <a:effectRef idx="1">
+        <a:effectRef idx="2">
           <a:scrgbClr r="0" g="0" b="0"/>
         </a:effectRef>
         <a:fontRef idx="minor">
@@ -3569,15 +3755,15 @@
         </a:fontRef>
       </dsp:style>
     </dsp:sp>
-    <dsp:sp modelId="{8485559A-9C93-4B06-B33B-D42842F5D6FB}">
+    <dsp:sp modelId="{31A4463F-C0F7-4070-B72D-C242E586BD78}">
       <dsp:nvSpPr>
         <dsp:cNvPr id="0" name=""/>
         <dsp:cNvSpPr/>
       </dsp:nvSpPr>
       <dsp:spPr>
         <a:xfrm>
-          <a:off x="0" y="1598396"/>
-          <a:ext cx="6891188" cy="399062"/>
+          <a:off x="0" y="1582884"/>
+          <a:ext cx="5387501" cy="395189"/>
         </a:xfrm>
         <a:prstGeom prst="rect">
           <a:avLst/>
@@ -3625,37 +3811,67 @@
         </a:p>
       </dsp:txBody>
       <dsp:txXfrm>
-        <a:off x="0" y="1598396"/>
-        <a:ext cx="6891188" cy="399062"/>
+        <a:off x="0" y="1582884"/>
+        <a:ext cx="5387501" cy="395189"/>
       </dsp:txXfrm>
     </dsp:sp>
-    <dsp:sp modelId="{02A67B17-36DA-4A7B-A3A6-7CC8FD5EAA81}">
+    <dsp:sp modelId="{994BAB52-B6EE-400B-8E1F-8CE328BB812E}">
       <dsp:nvSpPr>
         <dsp:cNvPr id="0" name=""/>
         <dsp:cNvSpPr/>
       </dsp:nvSpPr>
       <dsp:spPr>
         <a:xfrm>
-          <a:off x="0" y="1997459"/>
-          <a:ext cx="6891188" cy="0"/>
+          <a:off x="0" y="1978074"/>
+          <a:ext cx="5387501" cy="0"/>
         </a:xfrm>
         <a:prstGeom prst="line">
           <a:avLst/>
         </a:prstGeom>
-        <a:solidFill>
-          <a:schemeClr val="accent1">
-            <a:hueOff val="0"/>
-            <a:satOff val="0"/>
-            <a:lumOff val="0"/>
-            <a:alphaOff val="0"/>
-          </a:schemeClr>
-        </a:solidFill>
-        <a:ln w="12700" cap="flat" cmpd="sng" algn="ctr">
+        <a:gradFill rotWithShape="0">
+          <a:gsLst>
+            <a:gs pos="0">
+              <a:schemeClr val="accent2">
+                <a:hueOff val="-727682"/>
+                <a:satOff val="-41964"/>
+                <a:lumOff val="4314"/>
+                <a:alphaOff val="0"/>
+                <a:satMod val="103000"/>
+                <a:lumMod val="102000"/>
+                <a:tint val="94000"/>
+              </a:schemeClr>
+            </a:gs>
+            <a:gs pos="50000">
+              <a:schemeClr val="accent2">
+                <a:hueOff val="-727682"/>
+                <a:satOff val="-41964"/>
+                <a:lumOff val="4314"/>
+                <a:alphaOff val="0"/>
+                <a:satMod val="110000"/>
+                <a:lumMod val="100000"/>
+                <a:shade val="100000"/>
+              </a:schemeClr>
+            </a:gs>
+            <a:gs pos="100000">
+              <a:schemeClr val="accent2">
+                <a:hueOff val="-727682"/>
+                <a:satOff val="-41964"/>
+                <a:lumOff val="4314"/>
+                <a:alphaOff val="0"/>
+                <a:lumMod val="99000"/>
+                <a:satMod val="120000"/>
+                <a:shade val="78000"/>
+              </a:schemeClr>
+            </a:gs>
+          </a:gsLst>
+          <a:lin ang="5400000" scaled="0"/>
+        </a:gradFill>
+        <a:ln w="6350" cap="flat" cmpd="sng" algn="ctr">
           <a:solidFill>
-            <a:schemeClr val="accent1">
-              <a:hueOff val="0"/>
-              <a:satOff val="0"/>
-              <a:lumOff val="0"/>
+            <a:schemeClr val="accent2">
+              <a:hueOff val="-727682"/>
+              <a:satOff val="-41964"/>
+              <a:lumOff val="4314"/>
               <a:alphaOff val="0"/>
             </a:schemeClr>
           </a:solidFill>
@@ -3665,13 +3881,13 @@
         <a:effectLst/>
       </dsp:spPr>
       <dsp:style>
-        <a:lnRef idx="2">
+        <a:lnRef idx="1">
           <a:scrgbClr r="0" g="0" b="0"/>
         </a:lnRef>
-        <a:fillRef idx="1">
+        <a:fillRef idx="3">
           <a:scrgbClr r="0" g="0" b="0"/>
         </a:fillRef>
-        <a:effectRef idx="1">
+        <a:effectRef idx="2">
           <a:scrgbClr r="0" g="0" b="0"/>
         </a:effectRef>
         <a:fontRef idx="minor">
@@ -3679,15 +3895,15 @@
         </a:fontRef>
       </dsp:style>
     </dsp:sp>
-    <dsp:sp modelId="{DE690805-0479-44DB-B7DA-AFCEF300D58E}">
+    <dsp:sp modelId="{F67EE4D0-88A7-4218-9399-DB7008A07E1A}">
       <dsp:nvSpPr>
         <dsp:cNvPr id="0" name=""/>
         <dsp:cNvSpPr/>
       </dsp:nvSpPr>
       <dsp:spPr>
         <a:xfrm>
-          <a:off x="0" y="1997459"/>
-          <a:ext cx="6891188" cy="399062"/>
+          <a:off x="0" y="1978074"/>
+          <a:ext cx="5387501" cy="395189"/>
         </a:xfrm>
         <a:prstGeom prst="rect">
           <a:avLst/>
@@ -3735,37 +3951,67 @@
         </a:p>
       </dsp:txBody>
       <dsp:txXfrm>
-        <a:off x="0" y="1997459"/>
-        <a:ext cx="6891188" cy="399062"/>
+        <a:off x="0" y="1978074"/>
+        <a:ext cx="5387501" cy="395189"/>
       </dsp:txXfrm>
     </dsp:sp>
-    <dsp:sp modelId="{C469E1EC-D4A7-4B17-B031-8540B310C5DE}">
+    <dsp:sp modelId="{12EBED62-4CEC-4E5F-9009-F7BAF8F19494}">
       <dsp:nvSpPr>
         <dsp:cNvPr id="0" name=""/>
         <dsp:cNvSpPr/>
       </dsp:nvSpPr>
       <dsp:spPr>
         <a:xfrm>
-          <a:off x="0" y="2396522"/>
-          <a:ext cx="6891188" cy="0"/>
+          <a:off x="0" y="2373263"/>
+          <a:ext cx="5387501" cy="0"/>
         </a:xfrm>
         <a:prstGeom prst="line">
           <a:avLst/>
         </a:prstGeom>
-        <a:solidFill>
-          <a:schemeClr val="accent1">
-            <a:hueOff val="0"/>
-            <a:satOff val="0"/>
-            <a:lumOff val="0"/>
-            <a:alphaOff val="0"/>
-          </a:schemeClr>
-        </a:solidFill>
-        <a:ln w="12700" cap="flat" cmpd="sng" algn="ctr">
+        <a:gradFill rotWithShape="0">
+          <a:gsLst>
+            <a:gs pos="0">
+              <a:schemeClr val="accent2">
+                <a:hueOff val="-873218"/>
+                <a:satOff val="-50357"/>
+                <a:lumOff val="5177"/>
+                <a:alphaOff val="0"/>
+                <a:satMod val="103000"/>
+                <a:lumMod val="102000"/>
+                <a:tint val="94000"/>
+              </a:schemeClr>
+            </a:gs>
+            <a:gs pos="50000">
+              <a:schemeClr val="accent2">
+                <a:hueOff val="-873218"/>
+                <a:satOff val="-50357"/>
+                <a:lumOff val="5177"/>
+                <a:alphaOff val="0"/>
+                <a:satMod val="110000"/>
+                <a:lumMod val="100000"/>
+                <a:shade val="100000"/>
+              </a:schemeClr>
+            </a:gs>
+            <a:gs pos="100000">
+              <a:schemeClr val="accent2">
+                <a:hueOff val="-873218"/>
+                <a:satOff val="-50357"/>
+                <a:lumOff val="5177"/>
+                <a:alphaOff val="0"/>
+                <a:lumMod val="99000"/>
+                <a:satMod val="120000"/>
+                <a:shade val="78000"/>
+              </a:schemeClr>
+            </a:gs>
+          </a:gsLst>
+          <a:lin ang="5400000" scaled="0"/>
+        </a:gradFill>
+        <a:ln w="6350" cap="flat" cmpd="sng" algn="ctr">
           <a:solidFill>
-            <a:schemeClr val="accent1">
-              <a:hueOff val="0"/>
-              <a:satOff val="0"/>
-              <a:lumOff val="0"/>
+            <a:schemeClr val="accent2">
+              <a:hueOff val="-873218"/>
+              <a:satOff val="-50357"/>
+              <a:lumOff val="5177"/>
               <a:alphaOff val="0"/>
             </a:schemeClr>
           </a:solidFill>
@@ -3775,13 +4021,13 @@
         <a:effectLst/>
       </dsp:spPr>
       <dsp:style>
-        <a:lnRef idx="2">
+        <a:lnRef idx="1">
           <a:scrgbClr r="0" g="0" b="0"/>
         </a:lnRef>
-        <a:fillRef idx="1">
+        <a:fillRef idx="3">
           <a:scrgbClr r="0" g="0" b="0"/>
         </a:fillRef>
-        <a:effectRef idx="1">
+        <a:effectRef idx="2">
           <a:scrgbClr r="0" g="0" b="0"/>
         </a:effectRef>
         <a:fontRef idx="minor">
@@ -3789,15 +4035,15 @@
         </a:fontRef>
       </dsp:style>
     </dsp:sp>
-    <dsp:sp modelId="{7E80F188-48AE-4699-BCCE-B060CA87B1E0}">
+    <dsp:sp modelId="{520F300C-9694-49D2-B150-E94866C7C046}">
       <dsp:nvSpPr>
         <dsp:cNvPr id="0" name=""/>
         <dsp:cNvSpPr/>
       </dsp:nvSpPr>
       <dsp:spPr>
         <a:xfrm>
-          <a:off x="0" y="2396522"/>
-          <a:ext cx="6891188" cy="399062"/>
+          <a:off x="0" y="2373263"/>
+          <a:ext cx="5387501" cy="395189"/>
         </a:xfrm>
         <a:prstGeom prst="rect">
           <a:avLst/>
@@ -3845,37 +4091,67 @@
         </a:p>
       </dsp:txBody>
       <dsp:txXfrm>
-        <a:off x="0" y="2396522"/>
-        <a:ext cx="6891188" cy="399062"/>
+        <a:off x="0" y="2373263"/>
+        <a:ext cx="5387501" cy="395189"/>
       </dsp:txXfrm>
     </dsp:sp>
-    <dsp:sp modelId="{70EE2D5B-8B5C-4606-B01E-82C17D3429DB}">
+    <dsp:sp modelId="{78ED2CB2-2240-430C-BE00-8A1B51A66824}">
       <dsp:nvSpPr>
         <dsp:cNvPr id="0" name=""/>
         <dsp:cNvSpPr/>
       </dsp:nvSpPr>
       <dsp:spPr>
         <a:xfrm>
-          <a:off x="0" y="2795585"/>
-          <a:ext cx="6891188" cy="0"/>
+          <a:off x="0" y="2768453"/>
+          <a:ext cx="5387501" cy="0"/>
         </a:xfrm>
         <a:prstGeom prst="line">
           <a:avLst/>
         </a:prstGeom>
-        <a:solidFill>
-          <a:schemeClr val="accent1">
-            <a:hueOff val="0"/>
-            <a:satOff val="0"/>
-            <a:lumOff val="0"/>
-            <a:alphaOff val="0"/>
-          </a:schemeClr>
-        </a:solidFill>
-        <a:ln w="12700" cap="flat" cmpd="sng" algn="ctr">
+        <a:gradFill rotWithShape="0">
+          <a:gsLst>
+            <a:gs pos="0">
+              <a:schemeClr val="accent2">
+                <a:hueOff val="-1018754"/>
+                <a:satOff val="-58750"/>
+                <a:lumOff val="6040"/>
+                <a:alphaOff val="0"/>
+                <a:satMod val="103000"/>
+                <a:lumMod val="102000"/>
+                <a:tint val="94000"/>
+              </a:schemeClr>
+            </a:gs>
+            <a:gs pos="50000">
+              <a:schemeClr val="accent2">
+                <a:hueOff val="-1018754"/>
+                <a:satOff val="-58750"/>
+                <a:lumOff val="6040"/>
+                <a:alphaOff val="0"/>
+                <a:satMod val="110000"/>
+                <a:lumMod val="100000"/>
+                <a:shade val="100000"/>
+              </a:schemeClr>
+            </a:gs>
+            <a:gs pos="100000">
+              <a:schemeClr val="accent2">
+                <a:hueOff val="-1018754"/>
+                <a:satOff val="-58750"/>
+                <a:lumOff val="6040"/>
+                <a:alphaOff val="0"/>
+                <a:lumMod val="99000"/>
+                <a:satMod val="120000"/>
+                <a:shade val="78000"/>
+              </a:schemeClr>
+            </a:gs>
+          </a:gsLst>
+          <a:lin ang="5400000" scaled="0"/>
+        </a:gradFill>
+        <a:ln w="6350" cap="flat" cmpd="sng" algn="ctr">
           <a:solidFill>
-            <a:schemeClr val="accent1">
-              <a:hueOff val="0"/>
-              <a:satOff val="0"/>
-              <a:lumOff val="0"/>
+            <a:schemeClr val="accent2">
+              <a:hueOff val="-1018754"/>
+              <a:satOff val="-58750"/>
+              <a:lumOff val="6040"/>
               <a:alphaOff val="0"/>
             </a:schemeClr>
           </a:solidFill>
@@ -3885,13 +4161,13 @@
         <a:effectLst/>
       </dsp:spPr>
       <dsp:style>
-        <a:lnRef idx="2">
+        <a:lnRef idx="1">
           <a:scrgbClr r="0" g="0" b="0"/>
         </a:lnRef>
-        <a:fillRef idx="1">
+        <a:fillRef idx="3">
           <a:scrgbClr r="0" g="0" b="0"/>
         </a:fillRef>
-        <a:effectRef idx="1">
+        <a:effectRef idx="2">
           <a:scrgbClr r="0" g="0" b="0"/>
         </a:effectRef>
         <a:fontRef idx="minor">
@@ -3899,15 +4175,15 @@
         </a:fontRef>
       </dsp:style>
     </dsp:sp>
-    <dsp:sp modelId="{11BE1967-5EA6-4B2E-9E9A-2C11E5169D2B}">
+    <dsp:sp modelId="{A6475A21-A0B6-4246-AAF5-5AFCDD3AE439}">
       <dsp:nvSpPr>
         <dsp:cNvPr id="0" name=""/>
         <dsp:cNvSpPr/>
       </dsp:nvSpPr>
       <dsp:spPr>
         <a:xfrm>
-          <a:off x="0" y="2795585"/>
-          <a:ext cx="6891188" cy="399062"/>
+          <a:off x="0" y="2768453"/>
+          <a:ext cx="5387501" cy="395189"/>
         </a:xfrm>
         <a:prstGeom prst="rect">
           <a:avLst/>
@@ -3955,37 +4231,67 @@
         </a:p>
       </dsp:txBody>
       <dsp:txXfrm>
-        <a:off x="0" y="2795585"/>
-        <a:ext cx="6891188" cy="399062"/>
+        <a:off x="0" y="2768453"/>
+        <a:ext cx="5387501" cy="395189"/>
       </dsp:txXfrm>
     </dsp:sp>
-    <dsp:sp modelId="{281F12AE-F6C4-407F-B60F-D01E811156BF}">
+    <dsp:sp modelId="{C8248AB1-27B1-4A4E-9F18-6CB0F7583F7E}">
       <dsp:nvSpPr>
         <dsp:cNvPr id="0" name=""/>
         <dsp:cNvSpPr/>
       </dsp:nvSpPr>
       <dsp:spPr>
         <a:xfrm>
-          <a:off x="0" y="3194648"/>
-          <a:ext cx="6891188" cy="0"/>
+          <a:off x="0" y="3163643"/>
+          <a:ext cx="5387501" cy="0"/>
         </a:xfrm>
         <a:prstGeom prst="line">
           <a:avLst/>
         </a:prstGeom>
-        <a:solidFill>
-          <a:schemeClr val="accent1">
-            <a:hueOff val="0"/>
-            <a:satOff val="0"/>
-            <a:lumOff val="0"/>
-            <a:alphaOff val="0"/>
-          </a:schemeClr>
-        </a:solidFill>
-        <a:ln w="12700" cap="flat" cmpd="sng" algn="ctr">
+        <a:gradFill rotWithShape="0">
+          <a:gsLst>
+            <a:gs pos="0">
+              <a:schemeClr val="accent2">
+                <a:hueOff val="-1164290"/>
+                <a:satOff val="-67142"/>
+                <a:lumOff val="6902"/>
+                <a:alphaOff val="0"/>
+                <a:satMod val="103000"/>
+                <a:lumMod val="102000"/>
+                <a:tint val="94000"/>
+              </a:schemeClr>
+            </a:gs>
+            <a:gs pos="50000">
+              <a:schemeClr val="accent2">
+                <a:hueOff val="-1164290"/>
+                <a:satOff val="-67142"/>
+                <a:lumOff val="6902"/>
+                <a:alphaOff val="0"/>
+                <a:satMod val="110000"/>
+                <a:lumMod val="100000"/>
+                <a:shade val="100000"/>
+              </a:schemeClr>
+            </a:gs>
+            <a:gs pos="100000">
+              <a:schemeClr val="accent2">
+                <a:hueOff val="-1164290"/>
+                <a:satOff val="-67142"/>
+                <a:lumOff val="6902"/>
+                <a:alphaOff val="0"/>
+                <a:lumMod val="99000"/>
+                <a:satMod val="120000"/>
+                <a:shade val="78000"/>
+              </a:schemeClr>
+            </a:gs>
+          </a:gsLst>
+          <a:lin ang="5400000" scaled="0"/>
+        </a:gradFill>
+        <a:ln w="6350" cap="flat" cmpd="sng" algn="ctr">
           <a:solidFill>
-            <a:schemeClr val="accent1">
-              <a:hueOff val="0"/>
-              <a:satOff val="0"/>
-              <a:lumOff val="0"/>
+            <a:schemeClr val="accent2">
+              <a:hueOff val="-1164290"/>
+              <a:satOff val="-67142"/>
+              <a:lumOff val="6902"/>
               <a:alphaOff val="0"/>
             </a:schemeClr>
           </a:solidFill>
@@ -3995,13 +4301,13 @@
         <a:effectLst/>
       </dsp:spPr>
       <dsp:style>
-        <a:lnRef idx="2">
+        <a:lnRef idx="1">
           <a:scrgbClr r="0" g="0" b="0"/>
         </a:lnRef>
-        <a:fillRef idx="1">
+        <a:fillRef idx="3">
           <a:scrgbClr r="0" g="0" b="0"/>
         </a:fillRef>
-        <a:effectRef idx="1">
+        <a:effectRef idx="2">
           <a:scrgbClr r="0" g="0" b="0"/>
         </a:effectRef>
         <a:fontRef idx="minor">
@@ -4009,15 +4315,15 @@
         </a:fontRef>
       </dsp:style>
     </dsp:sp>
-    <dsp:sp modelId="{7D0BBA13-3608-4232-9BBB-E9B121DBC000}">
+    <dsp:sp modelId="{907219E2-91DE-4FFF-8240-B8DDA8E22B62}">
       <dsp:nvSpPr>
         <dsp:cNvPr id="0" name=""/>
         <dsp:cNvSpPr/>
       </dsp:nvSpPr>
       <dsp:spPr>
         <a:xfrm>
-          <a:off x="0" y="3194648"/>
-          <a:ext cx="6891188" cy="399062"/>
+          <a:off x="0" y="3163643"/>
+          <a:ext cx="5387501" cy="395189"/>
         </a:xfrm>
         <a:prstGeom prst="rect">
           <a:avLst/>
@@ -4065,37 +4371,67 @@
         </a:p>
       </dsp:txBody>
       <dsp:txXfrm>
-        <a:off x="0" y="3194648"/>
-        <a:ext cx="6891188" cy="399062"/>
+        <a:off x="0" y="3163643"/>
+        <a:ext cx="5387501" cy="395189"/>
       </dsp:txXfrm>
     </dsp:sp>
-    <dsp:sp modelId="{B2AF46F2-B81C-4AB3-BADA-22AD45D94732}">
+    <dsp:sp modelId="{AD9A0D1F-8F80-44A6-AA40-E1753AB9E7DA}">
       <dsp:nvSpPr>
         <dsp:cNvPr id="0" name=""/>
         <dsp:cNvSpPr/>
       </dsp:nvSpPr>
       <dsp:spPr>
         <a:xfrm>
-          <a:off x="0" y="3593710"/>
-          <a:ext cx="6891188" cy="0"/>
+          <a:off x="0" y="3558833"/>
+          <a:ext cx="5387501" cy="0"/>
         </a:xfrm>
         <a:prstGeom prst="line">
           <a:avLst/>
         </a:prstGeom>
-        <a:solidFill>
-          <a:schemeClr val="accent1">
-            <a:hueOff val="0"/>
-            <a:satOff val="0"/>
-            <a:lumOff val="0"/>
-            <a:alphaOff val="0"/>
-          </a:schemeClr>
-        </a:solidFill>
-        <a:ln w="12700" cap="flat" cmpd="sng" algn="ctr">
+        <a:gradFill rotWithShape="0">
+          <a:gsLst>
+            <a:gs pos="0">
+              <a:schemeClr val="accent2">
+                <a:hueOff val="-1309827"/>
+                <a:satOff val="-75535"/>
+                <a:lumOff val="7765"/>
+                <a:alphaOff val="0"/>
+                <a:satMod val="103000"/>
+                <a:lumMod val="102000"/>
+                <a:tint val="94000"/>
+              </a:schemeClr>
+            </a:gs>
+            <a:gs pos="50000">
+              <a:schemeClr val="accent2">
+                <a:hueOff val="-1309827"/>
+                <a:satOff val="-75535"/>
+                <a:lumOff val="7765"/>
+                <a:alphaOff val="0"/>
+                <a:satMod val="110000"/>
+                <a:lumMod val="100000"/>
+                <a:shade val="100000"/>
+              </a:schemeClr>
+            </a:gs>
+            <a:gs pos="100000">
+              <a:schemeClr val="accent2">
+                <a:hueOff val="-1309827"/>
+                <a:satOff val="-75535"/>
+                <a:lumOff val="7765"/>
+                <a:alphaOff val="0"/>
+                <a:lumMod val="99000"/>
+                <a:satMod val="120000"/>
+                <a:shade val="78000"/>
+              </a:schemeClr>
+            </a:gs>
+          </a:gsLst>
+          <a:lin ang="5400000" scaled="0"/>
+        </a:gradFill>
+        <a:ln w="6350" cap="flat" cmpd="sng" algn="ctr">
           <a:solidFill>
-            <a:schemeClr val="accent1">
-              <a:hueOff val="0"/>
-              <a:satOff val="0"/>
-              <a:lumOff val="0"/>
+            <a:schemeClr val="accent2">
+              <a:hueOff val="-1309827"/>
+              <a:satOff val="-75535"/>
+              <a:lumOff val="7765"/>
               <a:alphaOff val="0"/>
             </a:schemeClr>
           </a:solidFill>
@@ -4105,13 +4441,13 @@
         <a:effectLst/>
       </dsp:spPr>
       <dsp:style>
-        <a:lnRef idx="2">
+        <a:lnRef idx="1">
           <a:scrgbClr r="0" g="0" b="0"/>
         </a:lnRef>
-        <a:fillRef idx="1">
+        <a:fillRef idx="3">
           <a:scrgbClr r="0" g="0" b="0"/>
         </a:fillRef>
-        <a:effectRef idx="1">
+        <a:effectRef idx="2">
           <a:scrgbClr r="0" g="0" b="0"/>
         </a:effectRef>
         <a:fontRef idx="minor">
@@ -4119,15 +4455,15 @@
         </a:fontRef>
       </dsp:style>
     </dsp:sp>
-    <dsp:sp modelId="{C83F7274-C25D-4301-B56B-DE5C1CA8F612}">
+    <dsp:sp modelId="{4936F773-CC18-4F0E-AA7D-645EE735707B}">
       <dsp:nvSpPr>
         <dsp:cNvPr id="0" name=""/>
         <dsp:cNvSpPr/>
       </dsp:nvSpPr>
       <dsp:spPr>
         <a:xfrm>
-          <a:off x="0" y="3593710"/>
-          <a:ext cx="6891188" cy="399062"/>
+          <a:off x="0" y="3558833"/>
+          <a:ext cx="5387501" cy="395189"/>
         </a:xfrm>
         <a:prstGeom prst="rect">
           <a:avLst/>
@@ -4175,37 +4511,67 @@
         </a:p>
       </dsp:txBody>
       <dsp:txXfrm>
-        <a:off x="0" y="3593710"/>
-        <a:ext cx="6891188" cy="399062"/>
+        <a:off x="0" y="3558833"/>
+        <a:ext cx="5387501" cy="395189"/>
       </dsp:txXfrm>
     </dsp:sp>
-    <dsp:sp modelId="{3CFA7879-DCA1-44E6-8142-62F2F2F4C25B}">
+    <dsp:sp modelId="{50B6BDA2-F8DB-481F-B3DA-34E6542440E1}">
       <dsp:nvSpPr>
         <dsp:cNvPr id="0" name=""/>
         <dsp:cNvSpPr/>
       </dsp:nvSpPr>
       <dsp:spPr>
         <a:xfrm>
-          <a:off x="0" y="3992773"/>
-          <a:ext cx="6891188" cy="0"/>
+          <a:off x="0" y="3954023"/>
+          <a:ext cx="5387501" cy="0"/>
         </a:xfrm>
         <a:prstGeom prst="line">
           <a:avLst/>
         </a:prstGeom>
-        <a:solidFill>
-          <a:schemeClr val="accent1">
-            <a:hueOff val="0"/>
-            <a:satOff val="0"/>
-            <a:lumOff val="0"/>
-            <a:alphaOff val="0"/>
-          </a:schemeClr>
-        </a:solidFill>
-        <a:ln w="12700" cap="flat" cmpd="sng" algn="ctr">
+        <a:gradFill rotWithShape="0">
+          <a:gsLst>
+            <a:gs pos="0">
+              <a:schemeClr val="accent2">
+                <a:hueOff val="-1455363"/>
+                <a:satOff val="-83928"/>
+                <a:lumOff val="8628"/>
+                <a:alphaOff val="0"/>
+                <a:satMod val="103000"/>
+                <a:lumMod val="102000"/>
+                <a:tint val="94000"/>
+              </a:schemeClr>
+            </a:gs>
+            <a:gs pos="50000">
+              <a:schemeClr val="accent2">
+                <a:hueOff val="-1455363"/>
+                <a:satOff val="-83928"/>
+                <a:lumOff val="8628"/>
+                <a:alphaOff val="0"/>
+                <a:satMod val="110000"/>
+                <a:lumMod val="100000"/>
+                <a:shade val="100000"/>
+              </a:schemeClr>
+            </a:gs>
+            <a:gs pos="100000">
+              <a:schemeClr val="accent2">
+                <a:hueOff val="-1455363"/>
+                <a:satOff val="-83928"/>
+                <a:lumOff val="8628"/>
+                <a:alphaOff val="0"/>
+                <a:lumMod val="99000"/>
+                <a:satMod val="120000"/>
+                <a:shade val="78000"/>
+              </a:schemeClr>
+            </a:gs>
+          </a:gsLst>
+          <a:lin ang="5400000" scaled="0"/>
+        </a:gradFill>
+        <a:ln w="6350" cap="flat" cmpd="sng" algn="ctr">
           <a:solidFill>
-            <a:schemeClr val="accent1">
-              <a:hueOff val="0"/>
-              <a:satOff val="0"/>
-              <a:lumOff val="0"/>
+            <a:schemeClr val="accent2">
+              <a:hueOff val="-1455363"/>
+              <a:satOff val="-83928"/>
+              <a:lumOff val="8628"/>
               <a:alphaOff val="0"/>
             </a:schemeClr>
           </a:solidFill>
@@ -4215,13 +4581,13 @@
         <a:effectLst/>
       </dsp:spPr>
       <dsp:style>
-        <a:lnRef idx="2">
+        <a:lnRef idx="1">
           <a:scrgbClr r="0" g="0" b="0"/>
         </a:lnRef>
-        <a:fillRef idx="1">
+        <a:fillRef idx="3">
           <a:scrgbClr r="0" g="0" b="0"/>
         </a:fillRef>
-        <a:effectRef idx="1">
+        <a:effectRef idx="2">
           <a:scrgbClr r="0" g="0" b="0"/>
         </a:effectRef>
         <a:fontRef idx="minor">
@@ -4229,15 +4595,15 @@
         </a:fontRef>
       </dsp:style>
     </dsp:sp>
-    <dsp:sp modelId="{19CE2D8C-1E30-4FF9-BDBF-51DC5797CD92}">
+    <dsp:sp modelId="{AB1FFAE1-FC19-4BF2-8C31-2FF5B0FAA78C}">
       <dsp:nvSpPr>
         <dsp:cNvPr id="0" name=""/>
         <dsp:cNvSpPr/>
       </dsp:nvSpPr>
       <dsp:spPr>
         <a:xfrm>
-          <a:off x="0" y="3992773"/>
-          <a:ext cx="6891188" cy="399062"/>
+          <a:off x="0" y="3954023"/>
+          <a:ext cx="5387501" cy="395189"/>
         </a:xfrm>
         <a:prstGeom prst="rect">
           <a:avLst/>
@@ -4285,8 +4651,8 @@
         </a:p>
       </dsp:txBody>
       <dsp:txXfrm>
-        <a:off x="0" y="3992773"/>
-        <a:ext cx="6891188" cy="399062"/>
+        <a:off x="0" y="3954023"/>
+        <a:ext cx="5387501" cy="395189"/>
       </dsp:txXfrm>
     </dsp:sp>
   </dsp:spTree>
@@ -5777,11 +6143,11 @@
 </file>
 
 <file path=ppt/diagrams/quickStyle1.xml><?xml version="1.0" encoding="utf-8"?>
-<dgm:styleDef xmlns:dgm="http://schemas.openxmlformats.org/drawingml/2006/diagram" xmlns:a="http://schemas.openxmlformats.org/drawingml/2006/main" uniqueId="urn:microsoft.com/office/officeart/2005/8/quickstyle/simple2">
+<dgm:styleDef xmlns:dgm="http://schemas.openxmlformats.org/drawingml/2006/diagram" xmlns:a="http://schemas.openxmlformats.org/drawingml/2006/main" uniqueId="urn:microsoft.com/office/officeart/2005/8/quickstyle/simple4">
   <dgm:title val=""/>
   <dgm:desc val=""/>
   <dgm:catLst>
-    <dgm:cat type="simple" pri="10200"/>
+    <dgm:cat type="simple" pri="10400"/>
   </dgm:catLst>
   <dgm:scene3d>
     <a:camera prst="orthographicFront"/>
@@ -5795,13 +6161,13 @@
     <dgm:sp3d/>
     <dgm:txPr/>
     <dgm:style>
-      <a:lnRef idx="3">
+      <a:lnRef idx="0">
         <a:scrgbClr r="0" g="0" b="0"/>
       </a:lnRef>
-      <a:fillRef idx="1">
+      <a:fillRef idx="3">
         <a:scrgbClr r="0" g="0" b="0"/>
       </a:fillRef>
-      <a:effectRef idx="1">
+      <a:effectRef idx="2">
         <a:scrgbClr r="0" g="0" b="0"/>
       </a:effectRef>
       <a:fontRef idx="minor">
@@ -5817,13 +6183,13 @@
     <dgm:sp3d/>
     <dgm:txPr/>
     <dgm:style>
-      <a:lnRef idx="3">
+      <a:lnRef idx="1">
         <a:scrgbClr r="0" g="0" b="0"/>
       </a:lnRef>
-      <a:fillRef idx="1">
+      <a:fillRef idx="3">
         <a:scrgbClr r="0" g="0" b="0"/>
       </a:fillRef>
-      <a:effectRef idx="1">
+      <a:effectRef idx="2">
         <a:scrgbClr r="0" g="0" b="0"/>
       </a:effectRef>
       <a:fontRef idx="minor">
@@ -5839,10 +6205,10 @@
     <dgm:sp3d/>
     <dgm:txPr/>
     <dgm:style>
-      <a:lnRef idx="3">
+      <a:lnRef idx="0">
         <a:scrgbClr r="0" g="0" b="0"/>
       </a:lnRef>
-      <a:fillRef idx="1">
+      <a:fillRef idx="3">
         <a:scrgbClr r="0" g="0" b="0"/>
       </a:fillRef>
       <a:effectRef idx="0">
@@ -5861,13 +6227,13 @@
     <dgm:sp3d/>
     <dgm:txPr/>
     <dgm:style>
-      <a:lnRef idx="2">
+      <a:lnRef idx="1">
         <a:scrgbClr r="0" g="0" b="0"/>
       </a:lnRef>
-      <a:fillRef idx="1">
+      <a:fillRef idx="3">
         <a:scrgbClr r="0" g="0" b="0"/>
       </a:fillRef>
-      <a:effectRef idx="1">
+      <a:effectRef idx="2">
         <a:scrgbClr r="0" g="0" b="0"/>
       </a:effectRef>
       <a:fontRef idx="minor">
@@ -5883,13 +6249,13 @@
     <dgm:sp3d/>
     <dgm:txPr/>
     <dgm:style>
-      <a:lnRef idx="3">
+      <a:lnRef idx="0">
         <a:scrgbClr r="0" g="0" b="0"/>
       </a:lnRef>
-      <a:fillRef idx="1">
+      <a:fillRef idx="3">
         <a:scrgbClr r="0" g="0" b="0"/>
       </a:fillRef>
-      <a:effectRef idx="1">
+      <a:effectRef idx="2">
         <a:scrgbClr r="0" g="0" b="0"/>
       </a:effectRef>
       <a:fontRef idx="minor">
@@ -5905,13 +6271,13 @@
     <dgm:sp3d/>
     <dgm:txPr/>
     <dgm:style>
-      <a:lnRef idx="3">
+      <a:lnRef idx="0">
         <a:scrgbClr r="0" g="0" b="0"/>
       </a:lnRef>
-      <a:fillRef idx="1">
+      <a:fillRef idx="3">
         <a:scrgbClr r="0" g="0" b="0"/>
       </a:fillRef>
-      <a:effectRef idx="1">
+      <a:effectRef idx="2">
         <a:scrgbClr r="0" g="0" b="0"/>
       </a:effectRef>
       <a:fontRef idx="minor">
@@ -5927,13 +6293,13 @@
     <dgm:sp3d/>
     <dgm:txPr/>
     <dgm:style>
-      <a:lnRef idx="3">
+      <a:lnRef idx="0">
         <a:scrgbClr r="0" g="0" b="0"/>
       </a:lnRef>
-      <a:fillRef idx="1">
+      <a:fillRef idx="3">
         <a:scrgbClr r="0" g="0" b="0"/>
       </a:fillRef>
-      <a:effectRef idx="1">
+      <a:effectRef idx="2">
         <a:scrgbClr r="0" g="0" b="0"/>
       </a:effectRef>
       <a:fontRef idx="minor">
@@ -5949,13 +6315,13 @@
     <dgm:sp3d/>
     <dgm:txPr/>
     <dgm:style>
-      <a:lnRef idx="3">
+      <a:lnRef idx="0">
         <a:scrgbClr r="0" g="0" b="0"/>
       </a:lnRef>
-      <a:fillRef idx="1">
+      <a:fillRef idx="3">
         <a:scrgbClr r="0" g="0" b="0"/>
       </a:fillRef>
-      <a:effectRef idx="1">
+      <a:effectRef idx="2">
         <a:scrgbClr r="0" g="0" b="0"/>
       </a:effectRef>
       <a:fontRef idx="minor">
@@ -5971,13 +6337,13 @@
     <dgm:sp3d/>
     <dgm:txPr/>
     <dgm:style>
-      <a:lnRef idx="3">
+      <a:lnRef idx="0">
         <a:scrgbClr r="0" g="0" b="0"/>
       </a:lnRef>
       <a:fillRef idx="1">
         <a:scrgbClr r="0" g="0" b="0"/>
       </a:fillRef>
-      <a:effectRef idx="1">
+      <a:effectRef idx="2">
         <a:scrgbClr r="0" g="0" b="0"/>
       </a:effectRef>
       <a:fontRef idx="minor"/>
@@ -5991,13 +6357,13 @@
     <dgm:sp3d/>
     <dgm:txPr/>
     <dgm:style>
-      <a:lnRef idx="3">
+      <a:lnRef idx="0">
         <a:scrgbClr r="0" g="0" b="0"/>
       </a:lnRef>
       <a:fillRef idx="1">
         <a:scrgbClr r="0" g="0" b="0"/>
       </a:fillRef>
-      <a:effectRef idx="1">
+      <a:effectRef idx="2">
         <a:scrgbClr r="0" g="0" b="0"/>
       </a:effectRef>
       <a:fontRef idx="minor"/>
@@ -6011,13 +6377,13 @@
     <dgm:sp3d/>
     <dgm:txPr/>
     <dgm:style>
-      <a:lnRef idx="3">
+      <a:lnRef idx="0">
         <a:scrgbClr r="0" g="0" b="0"/>
       </a:lnRef>
       <a:fillRef idx="1">
         <a:scrgbClr r="0" g="0" b="0"/>
       </a:fillRef>
-      <a:effectRef idx="1">
+      <a:effectRef idx="2">
         <a:scrgbClr r="0" g="0" b="0"/>
       </a:effectRef>
       <a:fontRef idx="minor"/>
@@ -6034,10 +6400,10 @@
       <a:lnRef idx="0">
         <a:scrgbClr r="0" g="0" b="0"/>
       </a:lnRef>
-      <a:fillRef idx="1">
+      <a:fillRef idx="3">
         <a:scrgbClr r="0" g="0" b="0"/>
       </a:fillRef>
-      <a:effectRef idx="1">
+      <a:effectRef idx="2">
         <a:scrgbClr r="0" g="0" b="0"/>
       </a:effectRef>
       <a:fontRef idx="minor">
@@ -6056,10 +6422,10 @@
       <a:lnRef idx="0">
         <a:scrgbClr r="0" g="0" b="0"/>
       </a:lnRef>
-      <a:fillRef idx="1">
+      <a:fillRef idx="3">
         <a:scrgbClr r="0" g="0" b="0"/>
       </a:fillRef>
-      <a:effectRef idx="1">
+      <a:effectRef idx="2">
         <a:scrgbClr r="0" g="0" b="0"/>
       </a:effectRef>
       <a:fontRef idx="minor">
@@ -6078,10 +6444,10 @@
       <a:lnRef idx="0">
         <a:scrgbClr r="0" g="0" b="0"/>
       </a:lnRef>
-      <a:fillRef idx="1">
+      <a:fillRef idx="3">
         <a:scrgbClr r="0" g="0" b="0"/>
       </a:fillRef>
-      <a:effectRef idx="1">
+      <a:effectRef idx="2">
         <a:scrgbClr r="0" g="0" b="0"/>
       </a:effectRef>
       <a:fontRef idx="minor">
@@ -6137,13 +6503,13 @@
     <dgm:sp3d/>
     <dgm:txPr/>
     <dgm:style>
-      <a:lnRef idx="3">
+      <a:lnRef idx="0">
         <a:scrgbClr r="0" g="0" b="0"/>
       </a:lnRef>
-      <a:fillRef idx="1">
+      <a:fillRef idx="3">
         <a:scrgbClr r="0" g="0" b="0"/>
       </a:fillRef>
-      <a:effectRef idx="1">
+      <a:effectRef idx="2">
         <a:scrgbClr r="0" g="0" b="0"/>
       </a:effectRef>
       <a:fontRef idx="minor">
@@ -6159,13 +6525,13 @@
     <dgm:sp3d/>
     <dgm:txPr/>
     <dgm:style>
-      <a:lnRef idx="3">
+      <a:lnRef idx="0">
         <a:scrgbClr r="0" g="0" b="0"/>
       </a:lnRef>
-      <a:fillRef idx="1">
+      <a:fillRef idx="3">
         <a:scrgbClr r="0" g="0" b="0"/>
       </a:fillRef>
-      <a:effectRef idx="1">
+      <a:effectRef idx="2">
         <a:scrgbClr r="0" g="0" b="0"/>
       </a:effectRef>
       <a:fontRef idx="minor">
@@ -6181,13 +6547,13 @@
     <dgm:sp3d/>
     <dgm:txPr/>
     <dgm:style>
-      <a:lnRef idx="3">
+      <a:lnRef idx="0">
         <a:scrgbClr r="0" g="0" b="0"/>
       </a:lnRef>
-      <a:fillRef idx="1">
+      <a:fillRef idx="3">
         <a:scrgbClr r="0" g="0" b="0"/>
       </a:fillRef>
-      <a:effectRef idx="1">
+      <a:effectRef idx="2">
         <a:scrgbClr r="0" g="0" b="0"/>
       </a:effectRef>
       <a:fontRef idx="minor">
@@ -6203,13 +6569,13 @@
     <dgm:sp3d/>
     <dgm:txPr/>
     <dgm:style>
-      <a:lnRef idx="3">
+      <a:lnRef idx="0">
         <a:scrgbClr r="0" g="0" b="0"/>
       </a:lnRef>
-      <a:fillRef idx="1">
+      <a:fillRef idx="3">
         <a:scrgbClr r="0" g="0" b="0"/>
       </a:fillRef>
-      <a:effectRef idx="1">
+      <a:effectRef idx="2">
         <a:scrgbClr r="0" g="0" b="0"/>
       </a:effectRef>
       <a:fontRef idx="minor">
@@ -6225,13 +6591,13 @@
     <dgm:sp3d/>
     <dgm:txPr/>
     <dgm:style>
-      <a:lnRef idx="3">
+      <a:lnRef idx="0">
         <a:scrgbClr r="0" g="0" b="0"/>
       </a:lnRef>
-      <a:fillRef idx="1">
+      <a:fillRef idx="3">
         <a:scrgbClr r="0" g="0" b="0"/>
       </a:fillRef>
-      <a:effectRef idx="1">
+      <a:effectRef idx="2">
         <a:scrgbClr r="0" g="0" b="0"/>
       </a:effectRef>
       <a:fontRef idx="minor">
@@ -6247,13 +6613,13 @@
     <dgm:sp3d/>
     <dgm:txPr/>
     <dgm:style>
-      <a:lnRef idx="3">
+      <a:lnRef idx="0">
         <a:scrgbClr r="0" g="0" b="0"/>
       </a:lnRef>
-      <a:fillRef idx="1">
+      <a:fillRef idx="3">
         <a:scrgbClr r="0" g="0" b="0"/>
       </a:fillRef>
-      <a:effectRef idx="1">
+      <a:effectRef idx="2">
         <a:scrgbClr r="0" g="0" b="0"/>
       </a:effectRef>
       <a:fontRef idx="minor">
@@ -6269,13 +6635,13 @@
     <dgm:sp3d/>
     <dgm:txPr/>
     <dgm:style>
-      <a:lnRef idx="3">
+      <a:lnRef idx="0">
         <a:scrgbClr r="0" g="0" b="0"/>
       </a:lnRef>
-      <a:fillRef idx="1">
+      <a:fillRef idx="3">
         <a:scrgbClr r="0" g="0" b="0"/>
       </a:fillRef>
-      <a:effectRef idx="1">
+      <a:effectRef idx="2">
         <a:scrgbClr r="0" g="0" b="0"/>
       </a:effectRef>
       <a:fontRef idx="minor">
@@ -6291,13 +6657,13 @@
     <dgm:sp3d/>
     <dgm:txPr/>
     <dgm:style>
-      <a:lnRef idx="3">
+      <a:lnRef idx="1">
         <a:scrgbClr r="0" g="0" b="0"/>
       </a:lnRef>
-      <a:fillRef idx="1">
+      <a:fillRef idx="3">
         <a:scrgbClr r="0" g="0" b="0"/>
       </a:fillRef>
-      <a:effectRef idx="1">
+      <a:effectRef idx="2">
         <a:scrgbClr r="0" g="0" b="0"/>
       </a:effectRef>
       <a:fontRef idx="minor">
@@ -6313,13 +6679,13 @@
     <dgm:sp3d/>
     <dgm:txPr/>
     <dgm:style>
-      <a:lnRef idx="3">
+      <a:lnRef idx="1">
         <a:scrgbClr r="0" g="0" b="0"/>
       </a:lnRef>
-      <a:fillRef idx="1">
+      <a:fillRef idx="3">
         <a:scrgbClr r="0" g="0" b="0"/>
       </a:fillRef>
-      <a:effectRef idx="1">
+      <a:effectRef idx="2">
         <a:scrgbClr r="0" g="0" b="0"/>
       </a:effectRef>
       <a:fontRef idx="minor">
@@ -6335,7 +6701,7 @@
     <dgm:sp3d/>
     <dgm:txPr/>
     <dgm:style>
-      <a:lnRef idx="2">
+      <a:lnRef idx="1">
         <a:scrgbClr r="0" g="0" b="0"/>
       </a:lnRef>
       <a:fillRef idx="0">
@@ -6355,7 +6721,7 @@
     <dgm:sp3d/>
     <dgm:txPr/>
     <dgm:style>
-      <a:lnRef idx="2">
+      <a:lnRef idx="1">
         <a:scrgbClr r="0" g="0" b="0"/>
       </a:lnRef>
       <a:fillRef idx="0">
@@ -6375,7 +6741,7 @@
     <dgm:sp3d/>
     <dgm:txPr/>
     <dgm:style>
-      <a:lnRef idx="2">
+      <a:lnRef idx="1">
         <a:scrgbClr r="0" g="0" b="0"/>
       </a:lnRef>
       <a:fillRef idx="0">
@@ -6395,7 +6761,7 @@
     <dgm:sp3d/>
     <dgm:txPr/>
     <dgm:style>
-      <a:lnRef idx="2">
+      <a:lnRef idx="1">
         <a:scrgbClr r="0" g="0" b="0"/>
       </a:lnRef>
       <a:fillRef idx="0">
@@ -6415,7 +6781,7 @@
     <dgm:sp3d/>
     <dgm:txPr/>
     <dgm:style>
-      <a:lnRef idx="2">
+      <a:lnRef idx="1">
         <a:scrgbClr r="0" g="0" b="0"/>
       </a:lnRef>
       <a:fillRef idx="1">
@@ -6435,7 +6801,7 @@
     <dgm:sp3d/>
     <dgm:txPr/>
     <dgm:style>
-      <a:lnRef idx="2">
+      <a:lnRef idx="1">
         <a:scrgbClr r="0" g="0" b="0"/>
       </a:lnRef>
       <a:fillRef idx="1">
@@ -6455,7 +6821,7 @@
     <dgm:sp3d/>
     <dgm:txPr/>
     <dgm:style>
-      <a:lnRef idx="2">
+      <a:lnRef idx="1">
         <a:scrgbClr r="0" g="0" b="0"/>
       </a:lnRef>
       <a:fillRef idx="1">
@@ -6495,7 +6861,7 @@
     <dgm:sp3d/>
     <dgm:txPr/>
     <dgm:style>
-      <a:lnRef idx="2">
+      <a:lnRef idx="1">
         <a:scrgbClr r="0" g="0" b="0"/>
       </a:lnRef>
       <a:fillRef idx="1">
@@ -6515,7 +6881,7 @@
     <dgm:sp3d/>
     <dgm:txPr/>
     <dgm:style>
-      <a:lnRef idx="2">
+      <a:lnRef idx="1">
         <a:scrgbClr r="0" g="0" b="0"/>
       </a:lnRef>
       <a:fillRef idx="1">
@@ -6535,7 +6901,7 @@
     <dgm:sp3d/>
     <dgm:txPr/>
     <dgm:style>
-      <a:lnRef idx="2">
+      <a:lnRef idx="1">
         <a:scrgbClr r="0" g="0" b="0"/>
       </a:lnRef>
       <a:fillRef idx="1">
@@ -6555,7 +6921,7 @@
     <dgm:sp3d/>
     <dgm:txPr/>
     <dgm:style>
-      <a:lnRef idx="2">
+      <a:lnRef idx="1">
         <a:scrgbClr r="0" g="0" b="0"/>
       </a:lnRef>
       <a:fillRef idx="1">
@@ -6575,7 +6941,7 @@
     <dgm:sp3d/>
     <dgm:txPr/>
     <dgm:style>
-      <a:lnRef idx="2">
+      <a:lnRef idx="1">
         <a:scrgbClr r="0" g="0" b="0"/>
       </a:lnRef>
       <a:fillRef idx="1">
@@ -6595,7 +6961,7 @@
     <dgm:sp3d/>
     <dgm:txPr/>
     <dgm:style>
-      <a:lnRef idx="2">
+      <a:lnRef idx="1">
         <a:scrgbClr r="0" g="0" b="0"/>
       </a:lnRef>
       <a:fillRef idx="1">
@@ -6615,7 +6981,7 @@
     <dgm:sp3d/>
     <dgm:txPr/>
     <dgm:style>
-      <a:lnRef idx="2">
+      <a:lnRef idx="1">
         <a:scrgbClr r="0" g="0" b="0"/>
       </a:lnRef>
       <a:fillRef idx="1">
@@ -6635,7 +7001,7 @@
     <dgm:sp3d/>
     <dgm:txPr/>
     <dgm:style>
-      <a:lnRef idx="2">
+      <a:lnRef idx="1">
         <a:scrgbClr r="0" g="0" b="0"/>
       </a:lnRef>
       <a:fillRef idx="1">
@@ -6655,7 +7021,7 @@
     <dgm:sp3d/>
     <dgm:txPr/>
     <dgm:style>
-      <a:lnRef idx="2">
+      <a:lnRef idx="1">
         <a:scrgbClr r="0" g="0" b="0"/>
       </a:lnRef>
       <a:fillRef idx="1">
@@ -6675,7 +7041,7 @@
     <dgm:sp3d/>
     <dgm:txPr/>
     <dgm:style>
-      <a:lnRef idx="2">
+      <a:lnRef idx="1">
         <a:scrgbClr r="0" g="0" b="0"/>
       </a:lnRef>
       <a:fillRef idx="1">
@@ -6695,7 +7061,7 @@
     <dgm:sp3d/>
     <dgm:txPr/>
     <dgm:style>
-      <a:lnRef idx="2">
+      <a:lnRef idx="1">
         <a:scrgbClr r="0" g="0" b="0"/>
       </a:lnRef>
       <a:fillRef idx="1">
@@ -6721,7 +7087,7 @@
       <a:fillRef idx="1">
         <a:scrgbClr r="0" g="0" b="0"/>
       </a:fillRef>
-      <a:effectRef idx="0">
+      <a:effectRef idx="2">
         <a:scrgbClr r="0" g="0" b="0"/>
       </a:effectRef>
       <a:fontRef idx="minor"/>
@@ -6741,7 +7107,7 @@
       <a:fillRef idx="1">
         <a:scrgbClr r="0" g="0" b="0"/>
       </a:fillRef>
-      <a:effectRef idx="0">
+      <a:effectRef idx="2">
         <a:scrgbClr r="0" g="0" b="0"/>
       </a:effectRef>
       <a:fontRef idx="minor"/>
@@ -6775,13 +7141,13 @@
     <dgm:sp3d/>
     <dgm:txPr/>
     <dgm:style>
-      <a:lnRef idx="3">
+      <a:lnRef idx="0">
         <a:scrgbClr r="0" g="0" b="0"/>
       </a:lnRef>
-      <a:fillRef idx="1">
+      <a:fillRef idx="3">
         <a:scrgbClr r="0" g="0" b="0"/>
       </a:fillRef>
-      <a:effectRef idx="1">
+      <a:effectRef idx="2">
         <a:scrgbClr r="0" g="0" b="0"/>
       </a:effectRef>
       <a:fontRef idx="minor"/>
@@ -11191,7 +11557,7 @@
         <p:spPr>
           <a:xfrm>
             <a:off x="553644" y="5683985"/>
-            <a:ext cx="2255746" cy="369332"/>
+            <a:ext cx="2311146" cy="369332"/>
           </a:xfrm>
           <a:prstGeom prst="rect">
             <a:avLst/>
@@ -11211,15 +11577,7 @@
             </a:pPr>
             <a:r>
               <a:rPr lang="en-US" dirty="0"/>
-              <a:t>Guide – </a:t>
-            </a:r>
-            <a:r>
-              <a:rPr lang="en-US" dirty="0" err="1"/>
-              <a:t>Dr.Om</a:t>
-            </a:r>
-            <a:r>
-              <a:rPr lang="en-US" dirty="0"/>
-              <a:t> Mishra</a:t>
+              <a:t>Guide – Dr. Om Mishra</a:t>
             </a:r>
             <a:endParaRPr lang="en-IN" dirty="0"/>
           </a:p>
@@ -12327,6 +12685,652 @@
       </p:grpSpPr>
       <p:sp useBgFill="1">
         <p:nvSpPr>
+          <p:cNvPr id="8" name="Rectangle 7">
+            <a:extLst>
+              <a:ext uri="{FF2B5EF4-FFF2-40B4-BE49-F238E27FC236}">
+                <a16:creationId xmlns:a16="http://schemas.microsoft.com/office/drawing/2014/main" id="{4DA718D0-4865-4629-8134-44F68D41D574}"/>
+              </a:ext>
+              <a:ext uri="{C183D7F6-B498-43B3-948B-1728B52AA6E4}">
+                <adec:decorative xmlns:adec="http://schemas.microsoft.com/office/drawing/2017/decorative" val="1"/>
+              </a:ext>
+            </a:extLst>
+          </p:cNvPr>
+          <p:cNvSpPr>
+            <a:spLocks noGrp="1" noRot="1" noChangeAspect="1" noMove="1" noResize="1" noEditPoints="1" noAdjustHandles="1" noChangeArrowheads="1" noChangeShapeType="1" noTextEdit="1"/>
+          </p:cNvSpPr>
+          <p:nvPr>
+            <p:extLst>
+              <p:ext uri="{386F3935-93C4-4BCD-93E2-E3B085C9AB24}">
+                <p16:designElem xmlns:p16="http://schemas.microsoft.com/office/powerpoint/2015/main" val="1"/>
+              </p:ext>
+            </p:extLst>
+          </p:nvPr>
+        </p:nvSpPr>
+        <p:spPr>
+          <a:xfrm>
+            <a:off x="0" y="0"/>
+            <a:ext cx="12191999" cy="6857365"/>
+          </a:xfrm>
+          <a:prstGeom prst="rect">
+            <a:avLst/>
+          </a:prstGeom>
+          <a:ln>
+            <a:noFill/>
+          </a:ln>
+        </p:spPr>
+        <p:style>
+          <a:lnRef idx="2">
+            <a:schemeClr val="accent1">
+              <a:shade val="50000"/>
+            </a:schemeClr>
+          </a:lnRef>
+          <a:fillRef idx="1">
+            <a:schemeClr val="accent1"/>
+          </a:fillRef>
+          <a:effectRef idx="0">
+            <a:schemeClr val="accent1"/>
+          </a:effectRef>
+          <a:fontRef idx="minor">
+            <a:schemeClr val="lt1"/>
+          </a:fontRef>
+        </p:style>
+        <p:txBody>
+          <a:bodyPr rtlCol="0" anchor="ctr"/>
+          <a:lstStyle/>
+          <a:p>
+            <a:pPr algn="ctr"/>
+            <a:endParaRPr lang="en-US"/>
+          </a:p>
+        </p:txBody>
+      </p:sp>
+      <p:grpSp>
+        <p:nvGrpSpPr>
+          <p:cNvPr id="10" name="Group 9">
+            <a:extLst>
+              <a:ext uri="{FF2B5EF4-FFF2-40B4-BE49-F238E27FC236}">
+                <a16:creationId xmlns:a16="http://schemas.microsoft.com/office/drawing/2014/main" id="{65167ED7-6315-43AB-B1B6-C326D5FD8F84}"/>
+              </a:ext>
+              <a:ext uri="{C183D7F6-B498-43B3-948B-1728B52AA6E4}">
+                <adec:decorative xmlns:adec="http://schemas.microsoft.com/office/drawing/2017/decorative" val="1"/>
+              </a:ext>
+            </a:extLst>
+          </p:cNvPr>
+          <p:cNvGrpSpPr>
+            <a:grpSpLocks noGrp="1" noUngrp="1" noRot="1" noChangeAspect="1" noMove="1" noResize="1"/>
+          </p:cNvGrpSpPr>
+          <p:nvPr>
+            <p:extLst>
+              <p:ext uri="{386F3935-93C4-4BCD-93E2-E3B085C9AB24}">
+                <p16:designElem xmlns:p16="http://schemas.microsoft.com/office/powerpoint/2015/main" val="1"/>
+              </p:ext>
+            </p:extLst>
+          </p:nvPr>
+        </p:nvGrpSpPr>
+        <p:grpSpPr>
+          <a:xfrm rot="5400000">
+            <a:off x="-2340441" y="2666183"/>
+            <a:ext cx="5860051" cy="527712"/>
+            <a:chOff x="6081624" y="1998368"/>
+            <a:chExt cx="5613457" cy="782175"/>
+          </a:xfrm>
+          <a:solidFill>
+            <a:schemeClr val="accent4"/>
+          </a:solidFill>
+        </p:grpSpPr>
+        <p:sp>
+          <p:nvSpPr>
+            <p:cNvPr id="11" name="Rectangle 10">
+              <a:extLst>
+                <a:ext uri="{FF2B5EF4-FFF2-40B4-BE49-F238E27FC236}">
+                  <a16:creationId xmlns:a16="http://schemas.microsoft.com/office/drawing/2014/main" id="{EF4D8839-FB03-487D-ACC8-8BFEDD4FEBAE}"/>
+                </a:ext>
+                <a:ext uri="{C183D7F6-B498-43B3-948B-1728B52AA6E4}">
+                  <adec:decorative xmlns:adec="http://schemas.microsoft.com/office/drawing/2017/decorative" val="1"/>
+                </a:ext>
+              </a:extLst>
+            </p:cNvPr>
+            <p:cNvSpPr/>
+            <p:nvPr>
+              <p:extLst>
+                <p:ext uri="{386F3935-93C4-4BCD-93E2-E3B085C9AB24}">
+                  <p16:designElem xmlns:p16="http://schemas.microsoft.com/office/powerpoint/2015/main" val="1"/>
+                </p:ext>
+              </p:extLst>
+            </p:nvPr>
+          </p:nvSpPr>
+          <p:spPr>
+            <a:xfrm rot="5400000">
+              <a:off x="11228040" y="2313027"/>
+              <a:ext cx="781700" cy="152382"/>
+            </a:xfrm>
+            <a:prstGeom prst="rect">
+              <a:avLst/>
+            </a:prstGeom>
+            <a:grpFill/>
+            <a:ln>
+              <a:noFill/>
+            </a:ln>
+          </p:spPr>
+          <p:style>
+            <a:lnRef idx="2">
+              <a:schemeClr val="accent1">
+                <a:shade val="50000"/>
+              </a:schemeClr>
+            </a:lnRef>
+            <a:fillRef idx="1">
+              <a:schemeClr val="accent1"/>
+            </a:fillRef>
+            <a:effectRef idx="0">
+              <a:schemeClr val="accent1"/>
+            </a:effectRef>
+            <a:fontRef idx="minor">
+              <a:schemeClr val="lt1"/>
+            </a:fontRef>
+          </p:style>
+          <p:txBody>
+            <a:bodyPr rtlCol="0" anchor="ctr"/>
+            <a:lstStyle/>
+            <a:p>
+              <a:pPr algn="ctr"/>
+              <a:endParaRPr lang="en-US"/>
+            </a:p>
+          </p:txBody>
+        </p:sp>
+        <p:sp>
+          <p:nvSpPr>
+            <p:cNvPr id="12" name="Rectangle 11">
+              <a:extLst>
+                <a:ext uri="{FF2B5EF4-FFF2-40B4-BE49-F238E27FC236}">
+                  <a16:creationId xmlns:a16="http://schemas.microsoft.com/office/drawing/2014/main" id="{0EF75023-9A3B-42FC-B704-61A8F7BEF415}"/>
+                </a:ext>
+                <a:ext uri="{C183D7F6-B498-43B3-948B-1728B52AA6E4}">
+                  <adec:decorative xmlns:adec="http://schemas.microsoft.com/office/drawing/2017/decorative" val="1"/>
+                </a:ext>
+              </a:extLst>
+            </p:cNvPr>
+            <p:cNvSpPr/>
+            <p:nvPr>
+              <p:extLst>
+                <p:ext uri="{386F3935-93C4-4BCD-93E2-E3B085C9AB24}">
+                  <p16:designElem xmlns:p16="http://schemas.microsoft.com/office/powerpoint/2015/main" val="1"/>
+                </p:ext>
+              </p:extLst>
+            </p:nvPr>
+          </p:nvSpPr>
+          <p:spPr>
+            <a:xfrm flipH="1" flipV="1">
+              <a:off x="6081624" y="1998844"/>
+              <a:ext cx="5372968" cy="781699"/>
+            </a:xfrm>
+            <a:prstGeom prst="rect">
+              <a:avLst/>
+            </a:prstGeom>
+            <a:grpFill/>
+            <a:ln>
+              <a:noFill/>
+            </a:ln>
+          </p:spPr>
+          <p:style>
+            <a:lnRef idx="2">
+              <a:schemeClr val="accent1">
+                <a:shade val="50000"/>
+              </a:schemeClr>
+            </a:lnRef>
+            <a:fillRef idx="1">
+              <a:schemeClr val="accent1"/>
+            </a:fillRef>
+            <a:effectRef idx="0">
+              <a:schemeClr val="accent1"/>
+            </a:effectRef>
+            <a:fontRef idx="minor">
+              <a:schemeClr val="lt1"/>
+            </a:fontRef>
+          </p:style>
+          <p:txBody>
+            <a:bodyPr rtlCol="0" anchor="ctr"/>
+            <a:lstStyle/>
+            <a:p>
+              <a:pPr algn="ctr"/>
+              <a:endParaRPr lang="en-US"/>
+            </a:p>
+          </p:txBody>
+        </p:sp>
+      </p:grpSp>
+      <p:sp>
+        <p:nvSpPr>
+          <p:cNvPr id="14" name="Rectangle 13">
+            <a:extLst>
+              <a:ext uri="{FF2B5EF4-FFF2-40B4-BE49-F238E27FC236}">
+                <a16:creationId xmlns:a16="http://schemas.microsoft.com/office/drawing/2014/main" id="{CBC4F608-B4B8-48C3-9572-C0F061B1CD99}"/>
+              </a:ext>
+              <a:ext uri="{C183D7F6-B498-43B3-948B-1728B52AA6E4}">
+                <adec:decorative xmlns:adec="http://schemas.microsoft.com/office/drawing/2017/decorative" val="1"/>
+              </a:ext>
+            </a:extLst>
+          </p:cNvPr>
+          <p:cNvSpPr>
+            <a:spLocks noGrp="1" noRot="1" noChangeAspect="1" noMove="1" noResize="1" noEditPoints="1" noAdjustHandles="1" noChangeArrowheads="1" noChangeShapeType="1" noTextEdit="1"/>
+          </p:cNvSpPr>
+          <p:nvPr>
+            <p:extLst>
+              <p:ext uri="{386F3935-93C4-4BCD-93E2-E3B085C9AB24}">
+                <p16:designElem xmlns:p16="http://schemas.microsoft.com/office/powerpoint/2015/main" val="1"/>
+              </p:ext>
+            </p:extLst>
+          </p:nvPr>
+        </p:nvSpPr>
+        <p:spPr>
+          <a:xfrm>
+            <a:off x="579528" y="922919"/>
+            <a:ext cx="11111729" cy="5461252"/>
+          </a:xfrm>
+          <a:prstGeom prst="rect">
+            <a:avLst/>
+          </a:prstGeom>
+          <a:solidFill>
+            <a:schemeClr val="bg1"/>
+          </a:solidFill>
+          <a:ln>
+            <a:noFill/>
+          </a:ln>
+          <a:effectLst>
+            <a:outerShdw blurRad="139700" dist="127000" dir="5400000" algn="t" rotWithShape="0">
+              <a:prstClr val="black">
+                <a:alpha val="15000"/>
+              </a:prstClr>
+            </a:outerShdw>
+          </a:effectLst>
+        </p:spPr>
+        <p:style>
+          <a:lnRef idx="2">
+            <a:schemeClr val="accent1">
+              <a:shade val="50000"/>
+            </a:schemeClr>
+          </a:lnRef>
+          <a:fillRef idx="1">
+            <a:schemeClr val="accent1"/>
+          </a:fillRef>
+          <a:effectRef idx="0">
+            <a:schemeClr val="accent1"/>
+          </a:effectRef>
+          <a:fontRef idx="minor">
+            <a:schemeClr val="lt1"/>
+          </a:fontRef>
+        </p:style>
+        <p:txBody>
+          <a:bodyPr rtlCol="0" anchor="ctr"/>
+          <a:lstStyle/>
+          <a:p>
+            <a:pPr algn="ctr"/>
+            <a:endParaRPr lang="en-US"/>
+          </a:p>
+        </p:txBody>
+      </p:sp>
+      <p:sp>
+        <p:nvSpPr>
+          <p:cNvPr id="2" name="Title 1">
+            <a:extLst>
+              <a:ext uri="{FF2B5EF4-FFF2-40B4-BE49-F238E27FC236}">
+                <a16:creationId xmlns:a16="http://schemas.microsoft.com/office/drawing/2014/main" id="{AFB6BA18-F46F-14B0-82C4-870C24B3F5C2}"/>
+              </a:ext>
+            </a:extLst>
+          </p:cNvPr>
+          <p:cNvSpPr>
+            <a:spLocks noGrp="1"/>
+          </p:cNvSpPr>
+          <p:nvPr>
+            <p:ph type="title"/>
+          </p:nvPr>
+        </p:nvSpPr>
+        <p:spPr>
+          <a:xfrm>
+            <a:off x="1289303" y="788990"/>
+            <a:ext cx="9849751" cy="1349671"/>
+          </a:xfrm>
+        </p:spPr>
+        <p:txBody>
+          <a:bodyPr anchor="b">
+            <a:normAutofit/>
+          </a:bodyPr>
+          <a:lstStyle/>
+          <a:p>
+            <a:r>
+              <a:rPr lang="en-US" sz="5400" dirty="0"/>
+              <a:t>References</a:t>
+            </a:r>
+            <a:endParaRPr lang="en-IN" sz="5400" dirty="0"/>
+          </a:p>
+        </p:txBody>
+      </p:sp>
+      <p:sp>
+        <p:nvSpPr>
+          <p:cNvPr id="3" name="Content Placeholder 2">
+            <a:extLst>
+              <a:ext uri="{FF2B5EF4-FFF2-40B4-BE49-F238E27FC236}">
+                <a16:creationId xmlns:a16="http://schemas.microsoft.com/office/drawing/2014/main" id="{E4AFC57B-0F54-38B6-92C5-D486AF5CEE0D}"/>
+              </a:ext>
+            </a:extLst>
+          </p:cNvPr>
+          <p:cNvSpPr>
+            <a:spLocks noGrp="1"/>
+          </p:cNvSpPr>
+          <p:nvPr>
+            <p:ph idx="1"/>
+          </p:nvPr>
+        </p:nvSpPr>
+        <p:spPr>
+          <a:xfrm>
+            <a:off x="1289304" y="2587751"/>
+            <a:ext cx="9849751" cy="3679884"/>
+          </a:xfrm>
+        </p:spPr>
+        <p:txBody>
+          <a:bodyPr anchor="ctr">
+            <a:normAutofit fontScale="47500" lnSpcReduction="20000"/>
+          </a:bodyPr>
+          <a:lstStyle/>
+          <a:p>
+            <a:pPr marL="342900" indent="-342900">
+              <a:buFont typeface="+mj-lt"/>
+              <a:buAutoNum type="arabicPeriod"/>
+            </a:pPr>
+            <a:endParaRPr lang="en-IN" sz="3300" dirty="0">
+              <a:solidFill>
+                <a:srgbClr val="954F72"/>
+              </a:solidFill>
+              <a:effectLst/>
+              <a:hlinkClick r:id="rId2">
+                <a:extLst>
+                  <a:ext uri="{A12FA001-AC4F-418D-AE19-62706E023703}">
+                    <ahyp:hlinkClr xmlns:ahyp="http://schemas.microsoft.com/office/drawing/2018/hyperlinkcolor" val="tx"/>
+                  </a:ext>
+                </a:extLst>
+              </a:hlinkClick>
+            </a:endParaRPr>
+          </a:p>
+          <a:p>
+            <a:pPr marL="342900" indent="-342900">
+              <a:buFont typeface="+mj-lt"/>
+              <a:buAutoNum type="arabicPeriod"/>
+            </a:pPr>
+            <a:r>
+              <a:rPr lang="en-IN" sz="3300" b="1" dirty="0">
+                <a:solidFill>
+                  <a:srgbClr val="0070C0"/>
+                </a:solidFill>
+                <a:effectLst/>
+                <a:hlinkClick r:id="rId2">
+                  <a:extLst>
+                    <a:ext uri="{A12FA001-AC4F-418D-AE19-62706E023703}">
+                      <ahyp:hlinkClr xmlns:ahyp="http://schemas.microsoft.com/office/drawing/2018/hyperlinkcolor" val="tx"/>
+                    </a:ext>
+                  </a:extLst>
+                </a:hlinkClick>
+              </a:rPr>
+              <a:t>https://ijariie.com/AdminUploadPdf/Fake_Product_Detection_Using_Blockchain_Technology_ijariie14881.pdf</a:t>
+            </a:r>
+            <a:endParaRPr lang="en-IN" sz="3300" b="1" dirty="0">
+              <a:solidFill>
+                <a:srgbClr val="0070C0"/>
+              </a:solidFill>
+              <a:effectLst/>
+            </a:endParaRPr>
+          </a:p>
+          <a:p>
+            <a:pPr marL="342900" indent="-342900">
+              <a:buFont typeface="+mj-lt"/>
+              <a:buAutoNum type="arabicPeriod"/>
+            </a:pPr>
+            <a:r>
+              <a:rPr lang="en-IN" sz="3300" b="1" dirty="0">
+                <a:solidFill>
+                  <a:srgbClr val="0070C0"/>
+                </a:solidFill>
+                <a:effectLst/>
+                <a:hlinkClick r:id="rId3">
+                  <a:extLst>
+                    <a:ext uri="{A12FA001-AC4F-418D-AE19-62706E023703}">
+                      <ahyp:hlinkClr xmlns:ahyp="http://schemas.microsoft.com/office/drawing/2018/hyperlinkcolor" val="tx"/>
+                    </a:ext>
+                  </a:extLst>
+                </a:hlinkClick>
+              </a:rPr>
+              <a:t>https://www.irjmets.com/uploadedfiles/paper//issue_5_may_2022/22490/final/fin_irjmets1652083694.pdf</a:t>
+            </a:r>
+            <a:endParaRPr lang="en-IN" sz="3300" b="1" dirty="0">
+              <a:solidFill>
+                <a:srgbClr val="0070C0"/>
+              </a:solidFill>
+            </a:endParaRPr>
+          </a:p>
+          <a:p>
+            <a:pPr marL="342900" indent="-342900">
+              <a:buFont typeface="+mj-lt"/>
+              <a:buAutoNum type="arabicPeriod"/>
+            </a:pPr>
+            <a:r>
+              <a:rPr lang="en-IN" sz="3300" b="1" dirty="0">
+                <a:solidFill>
+                  <a:srgbClr val="0070C0"/>
+                </a:solidFill>
+                <a:effectLst/>
+                <a:hlinkClick r:id="rId4">
+                  <a:extLst>
+                    <a:ext uri="{A12FA001-AC4F-418D-AE19-62706E023703}">
+                      <ahyp:hlinkClr xmlns:ahyp="http://schemas.microsoft.com/office/drawing/2018/hyperlinkcolor" val="tx"/>
+                    </a:ext>
+                  </a:extLst>
+                </a:hlinkClick>
+              </a:rPr>
+              <a:t>https://arxiv.org/pdf/2206.08565.pdf</a:t>
+            </a:r>
+            <a:endParaRPr lang="en-IN" sz="3300" b="1" dirty="0">
+              <a:solidFill>
+                <a:srgbClr val="0070C0"/>
+              </a:solidFill>
+              <a:effectLst/>
+            </a:endParaRPr>
+          </a:p>
+          <a:p>
+            <a:pPr marL="342900" indent="-342900">
+              <a:buFont typeface="+mj-lt"/>
+              <a:buAutoNum type="arabicPeriod"/>
+            </a:pPr>
+            <a:r>
+              <a:rPr lang="en-IN" sz="3300" b="1" dirty="0">
+                <a:solidFill>
+                  <a:srgbClr val="0070C0"/>
+                </a:solidFill>
+                <a:effectLst/>
+                <a:hlinkClick r:id="rId5">
+                  <a:extLst>
+                    <a:ext uri="{A12FA001-AC4F-418D-AE19-62706E023703}">
+                      <ahyp:hlinkClr xmlns:ahyp="http://schemas.microsoft.com/office/drawing/2018/hyperlinkcolor" val="tx"/>
+                    </a:ext>
+                  </a:extLst>
+                </a:hlinkClick>
+              </a:rPr>
+              <a:t>https://www.itm-conferences.org/articles/itmconf/pdf/2022/04/itmconf_icacc2022_03015.pdf</a:t>
+            </a:r>
+            <a:endParaRPr lang="en-IN" sz="3300" b="1" dirty="0">
+              <a:solidFill>
+                <a:srgbClr val="0070C0"/>
+              </a:solidFill>
+              <a:effectLst/>
+            </a:endParaRPr>
+          </a:p>
+          <a:p>
+            <a:pPr marL="342900" indent="-342900">
+              <a:buFont typeface="+mj-lt"/>
+              <a:buAutoNum type="arabicPeriod"/>
+            </a:pPr>
+            <a:r>
+              <a:rPr lang="en-IN" sz="3300" b="1" dirty="0">
+                <a:solidFill>
+                  <a:srgbClr val="0070C0"/>
+                </a:solidFill>
+                <a:effectLst/>
+                <a:hlinkClick r:id="rId6">
+                  <a:extLst>
+                    <a:ext uri="{A12FA001-AC4F-418D-AE19-62706E023703}">
+                      <ahyp:hlinkClr xmlns:ahyp="http://schemas.microsoft.com/office/drawing/2018/hyperlinkcolor" val="tx"/>
+                    </a:ext>
+                  </a:extLst>
+                </a:hlinkClick>
+              </a:rPr>
+              <a:t>https://ijarcce.com/wp-content/uploads/2022/05/IJARCCE.2022.11578.pdf</a:t>
+            </a:r>
+            <a:endParaRPr lang="en-IN" sz="3300" b="1" dirty="0">
+              <a:solidFill>
+                <a:srgbClr val="0070C0"/>
+              </a:solidFill>
+              <a:effectLst/>
+            </a:endParaRPr>
+          </a:p>
+          <a:p>
+            <a:pPr marL="342900" indent="-342900">
+              <a:buFont typeface="+mj-lt"/>
+              <a:buAutoNum type="arabicPeriod"/>
+            </a:pPr>
+            <a:r>
+              <a:rPr lang="en-IN" sz="3300" b="1" dirty="0">
+                <a:solidFill>
+                  <a:srgbClr val="0070C0"/>
+                </a:solidFill>
+                <a:effectLst/>
+                <a:hlinkClick r:id="rId7">
+                  <a:extLst>
+                    <a:ext uri="{A12FA001-AC4F-418D-AE19-62706E023703}">
+                      <ahyp:hlinkClr xmlns:ahyp="http://schemas.microsoft.com/office/drawing/2018/hyperlinkcolor" val="tx"/>
+                    </a:ext>
+                  </a:extLst>
+                </a:hlinkClick>
+              </a:rPr>
+              <a:t>https://www.irjet.net/archives/V8/i3/IRJET-V8I3279.pdf</a:t>
+            </a:r>
+            <a:endParaRPr lang="en-IN" sz="3300" b="1" dirty="0">
+              <a:solidFill>
+                <a:srgbClr val="0070C0"/>
+              </a:solidFill>
+            </a:endParaRPr>
+          </a:p>
+          <a:p>
+            <a:pPr marL="342900" indent="-342900">
+              <a:buFont typeface="+mj-lt"/>
+              <a:buAutoNum type="arabicPeriod"/>
+            </a:pPr>
+            <a:r>
+              <a:rPr lang="en-IN" sz="3300" b="1" dirty="0">
+                <a:solidFill>
+                  <a:srgbClr val="0070C0"/>
+                </a:solidFill>
+                <a:effectLst/>
+                <a:hlinkClick r:id="rId8">
+                  <a:extLst>
+                    <a:ext uri="{A12FA001-AC4F-418D-AE19-62706E023703}">
+                      <ahyp:hlinkClr xmlns:ahyp="http://schemas.microsoft.com/office/drawing/2018/hyperlinkcolor" val="tx"/>
+                    </a:ext>
+                  </a:extLst>
+                </a:hlinkClick>
+              </a:rPr>
+              <a:t>https://www.irjet.net/archives/V6/i5/IRJET-V6I5694.pdf</a:t>
+            </a:r>
+            <a:endParaRPr lang="en-IN" sz="3300" b="1" dirty="0">
+              <a:solidFill>
+                <a:srgbClr val="0070C0"/>
+              </a:solidFill>
+              <a:effectLst/>
+            </a:endParaRPr>
+          </a:p>
+          <a:p>
+            <a:pPr marL="342900" indent="-342900">
+              <a:buFont typeface="+mj-lt"/>
+              <a:buAutoNum type="arabicPeriod"/>
+            </a:pPr>
+            <a:r>
+              <a:rPr lang="en-IN" sz="3300" b="1" dirty="0">
+                <a:solidFill>
+                  <a:srgbClr val="0070C0"/>
+                </a:solidFill>
+                <a:effectLst/>
+                <a:hlinkClick r:id="rId9">
+                  <a:extLst>
+                    <a:ext uri="{A12FA001-AC4F-418D-AE19-62706E023703}">
+                      <ahyp:hlinkClr xmlns:ahyp="http://schemas.microsoft.com/office/drawing/2018/hyperlinkcolor" val="tx"/>
+                    </a:ext>
+                  </a:extLst>
+                </a:hlinkClick>
+              </a:rPr>
+              <a:t>https://1library.net/document/zp05d9w0-authentication-of-product-counterfeits-elimination-using-blockchain.html</a:t>
+            </a:r>
+            <a:endParaRPr lang="en-IN" sz="3300" b="1" dirty="0">
+              <a:solidFill>
+                <a:srgbClr val="0070C0"/>
+              </a:solidFill>
+              <a:effectLst/>
+            </a:endParaRPr>
+          </a:p>
+          <a:p>
+            <a:pPr marL="0" indent="0">
+              <a:buNone/>
+            </a:pPr>
+            <a:br>
+              <a:rPr lang="en-IN" sz="3200" dirty="0">
+                <a:effectLst/>
+              </a:rPr>
+            </a:br>
+            <a:br>
+              <a:rPr lang="en-IN" sz="1000" dirty="0"/>
+            </a:br>
+            <a:endParaRPr lang="en-IN" sz="1200" u="none" strike="noStrike" dirty="0"/>
+          </a:p>
+          <a:p>
+            <a:endParaRPr lang="en-IN" sz="800" dirty="0">
+              <a:effectLst/>
+            </a:endParaRPr>
+          </a:p>
+        </p:txBody>
+      </p:sp>
+    </p:spTree>
+    <p:extLst>
+      <p:ext uri="{BB962C8B-B14F-4D97-AF65-F5344CB8AC3E}">
+        <p14:creationId xmlns:p14="http://schemas.microsoft.com/office/powerpoint/2010/main" val="1466118000"/>
+      </p:ext>
+    </p:extLst>
+  </p:cSld>
+  <p:clrMapOvr>
+    <a:masterClrMapping/>
+  </p:clrMapOvr>
+</p:sld>
+</file>
+
+<file path=ppt/slides/slide15.xml><?xml version="1.0" encoding="utf-8"?>
+<p:sld xmlns:a="http://schemas.openxmlformats.org/drawingml/2006/main" xmlns:r="http://schemas.openxmlformats.org/officeDocument/2006/relationships" xmlns:p="http://schemas.openxmlformats.org/presentationml/2006/main">
+  <p:cSld>
+    <p:bg>
+      <p:bgPr>
+        <a:solidFill>
+          <a:schemeClr val="bg1"/>
+        </a:solidFill>
+        <a:effectLst/>
+      </p:bgPr>
+    </p:bg>
+    <p:spTree>
+      <p:nvGrpSpPr>
+        <p:cNvPr id="1" name=""/>
+        <p:cNvGrpSpPr/>
+        <p:nvPr/>
+      </p:nvGrpSpPr>
+      <p:grpSpPr>
+        <a:xfrm>
+          <a:off x="0" y="0"/>
+          <a:ext cx="0" cy="0"/>
+          <a:chOff x="0" y="0"/>
+          <a:chExt cx="0" cy="0"/>
+        </a:xfrm>
+      </p:grpSpPr>
+      <p:sp useBgFill="1">
+        <p:nvSpPr>
           <p:cNvPr id="90" name="Rectangle 89">
             <a:extLst>
               <a:ext uri="{FF2B5EF4-FFF2-40B4-BE49-F238E27FC236}">
@@ -12732,12 +13736,270 @@
           <a:chExt cx="0" cy="0"/>
         </a:xfrm>
       </p:grpSpPr>
+      <p:sp useBgFill="1">
+        <p:nvSpPr>
+          <p:cNvPr id="65" name="Rectangle 64">
+            <a:extLst>
+              <a:ext uri="{FF2B5EF4-FFF2-40B4-BE49-F238E27FC236}">
+                <a16:creationId xmlns:a16="http://schemas.microsoft.com/office/drawing/2014/main" id="{DB304A14-32D0-4873-B914-423ED7B8DAFD}"/>
+              </a:ext>
+              <a:ext uri="{C183D7F6-B498-43B3-948B-1728B52AA6E4}">
+                <adec:decorative xmlns:adec="http://schemas.microsoft.com/office/drawing/2017/decorative" val="1"/>
+              </a:ext>
+            </a:extLst>
+          </p:cNvPr>
+          <p:cNvSpPr>
+            <a:spLocks noGrp="1" noRot="1" noChangeAspect="1" noMove="1" noResize="1" noEditPoints="1" noAdjustHandles="1" noChangeArrowheads="1" noChangeShapeType="1" noTextEdit="1"/>
+          </p:cNvSpPr>
+          <p:nvPr>
+            <p:extLst>
+              <p:ext uri="{386F3935-93C4-4BCD-93E2-E3B085C9AB24}">
+                <p16:designElem xmlns:p16="http://schemas.microsoft.com/office/powerpoint/2015/main" val="1"/>
+              </p:ext>
+            </p:extLst>
+          </p:nvPr>
+        </p:nvSpPr>
+        <p:spPr bwMode="white">
+          <a:xfrm>
+            <a:off x="0" y="0"/>
+            <a:ext cx="12192000" cy="6858000"/>
+          </a:xfrm>
+          <a:prstGeom prst="rect">
+            <a:avLst/>
+          </a:prstGeom>
+          <a:ln>
+            <a:noFill/>
+          </a:ln>
+        </p:spPr>
+        <p:style>
+          <a:lnRef idx="2">
+            <a:schemeClr val="accent1">
+              <a:shade val="50000"/>
+            </a:schemeClr>
+          </a:lnRef>
+          <a:fillRef idx="1">
+            <a:schemeClr val="accent1"/>
+          </a:fillRef>
+          <a:effectRef idx="0">
+            <a:schemeClr val="accent1"/>
+          </a:effectRef>
+          <a:fontRef idx="minor">
+            <a:schemeClr val="lt1"/>
+          </a:fontRef>
+        </p:style>
+        <p:txBody>
+          <a:bodyPr rtlCol="0" anchor="ctr"/>
+          <a:lstStyle>
+            <a:defPPr>
+              <a:defRPr lang="en-US"/>
+            </a:defPPr>
+            <a:lvl1pPr marL="0" algn="l" defTabSz="914400" rtl="0" eaLnBrk="1" latinLnBrk="0" hangingPunct="1">
+              <a:defRPr sz="1800" kern="1200">
+                <a:solidFill>
+                  <a:schemeClr val="lt1"/>
+                </a:solidFill>
+                <a:latin typeface="+mn-lt"/>
+                <a:ea typeface="+mn-ea"/>
+                <a:cs typeface="+mn-cs"/>
+              </a:defRPr>
+            </a:lvl1pPr>
+            <a:lvl2pPr marL="457200" algn="l" defTabSz="914400" rtl="0" eaLnBrk="1" latinLnBrk="0" hangingPunct="1">
+              <a:defRPr sz="1800" kern="1200">
+                <a:solidFill>
+                  <a:schemeClr val="lt1"/>
+                </a:solidFill>
+                <a:latin typeface="+mn-lt"/>
+                <a:ea typeface="+mn-ea"/>
+                <a:cs typeface="+mn-cs"/>
+              </a:defRPr>
+            </a:lvl2pPr>
+            <a:lvl3pPr marL="914400" algn="l" defTabSz="914400" rtl="0" eaLnBrk="1" latinLnBrk="0" hangingPunct="1">
+              <a:defRPr sz="1800" kern="1200">
+                <a:solidFill>
+                  <a:schemeClr val="lt1"/>
+                </a:solidFill>
+                <a:latin typeface="+mn-lt"/>
+                <a:ea typeface="+mn-ea"/>
+                <a:cs typeface="+mn-cs"/>
+              </a:defRPr>
+            </a:lvl3pPr>
+            <a:lvl4pPr marL="1371600" algn="l" defTabSz="914400" rtl="0" eaLnBrk="1" latinLnBrk="0" hangingPunct="1">
+              <a:defRPr sz="1800" kern="1200">
+                <a:solidFill>
+                  <a:schemeClr val="lt1"/>
+                </a:solidFill>
+                <a:latin typeface="+mn-lt"/>
+                <a:ea typeface="+mn-ea"/>
+                <a:cs typeface="+mn-cs"/>
+              </a:defRPr>
+            </a:lvl4pPr>
+            <a:lvl5pPr marL="1828800" algn="l" defTabSz="914400" rtl="0" eaLnBrk="1" latinLnBrk="0" hangingPunct="1">
+              <a:defRPr sz="1800" kern="1200">
+                <a:solidFill>
+                  <a:schemeClr val="lt1"/>
+                </a:solidFill>
+                <a:latin typeface="+mn-lt"/>
+                <a:ea typeface="+mn-ea"/>
+                <a:cs typeface="+mn-cs"/>
+              </a:defRPr>
+            </a:lvl5pPr>
+            <a:lvl6pPr marL="2286000" algn="l" defTabSz="914400" rtl="0" eaLnBrk="1" latinLnBrk="0" hangingPunct="1">
+              <a:defRPr sz="1800" kern="1200">
+                <a:solidFill>
+                  <a:schemeClr val="lt1"/>
+                </a:solidFill>
+                <a:latin typeface="+mn-lt"/>
+                <a:ea typeface="+mn-ea"/>
+                <a:cs typeface="+mn-cs"/>
+              </a:defRPr>
+            </a:lvl6pPr>
+            <a:lvl7pPr marL="2743200" algn="l" defTabSz="914400" rtl="0" eaLnBrk="1" latinLnBrk="0" hangingPunct="1">
+              <a:defRPr sz="1800" kern="1200">
+                <a:solidFill>
+                  <a:schemeClr val="lt1"/>
+                </a:solidFill>
+                <a:latin typeface="+mn-lt"/>
+                <a:ea typeface="+mn-ea"/>
+                <a:cs typeface="+mn-cs"/>
+              </a:defRPr>
+            </a:lvl7pPr>
+            <a:lvl8pPr marL="3200400" algn="l" defTabSz="914400" rtl="0" eaLnBrk="1" latinLnBrk="0" hangingPunct="1">
+              <a:defRPr sz="1800" kern="1200">
+                <a:solidFill>
+                  <a:schemeClr val="lt1"/>
+                </a:solidFill>
+                <a:latin typeface="+mn-lt"/>
+                <a:ea typeface="+mn-ea"/>
+                <a:cs typeface="+mn-cs"/>
+              </a:defRPr>
+            </a:lvl8pPr>
+            <a:lvl9pPr marL="3657600" algn="l" defTabSz="914400" rtl="0" eaLnBrk="1" latinLnBrk="0" hangingPunct="1">
+              <a:defRPr sz="1800" kern="1200">
+                <a:solidFill>
+                  <a:schemeClr val="lt1"/>
+                </a:solidFill>
+                <a:latin typeface="+mn-lt"/>
+                <a:ea typeface="+mn-ea"/>
+                <a:cs typeface="+mn-cs"/>
+              </a:defRPr>
+            </a:lvl9pPr>
+          </a:lstStyle>
+          <a:p>
+            <a:pPr algn="ctr"/>
+            <a:endParaRPr lang="en-US"/>
+          </a:p>
+        </p:txBody>
+      </p:sp>
       <p:sp>
         <p:nvSpPr>
-          <p:cNvPr id="52" name="Rectangle 51">
+          <p:cNvPr id="2" name="Title 1">
             <a:extLst>
               <a:ext uri="{FF2B5EF4-FFF2-40B4-BE49-F238E27FC236}">
-                <a16:creationId xmlns:a16="http://schemas.microsoft.com/office/drawing/2014/main" id="{2B566528-1B12-4246-9431-5C2D7D081168}"/>
+                <a16:creationId xmlns:a16="http://schemas.microsoft.com/office/drawing/2014/main" id="{F0BCF312-7E9B-88E0-E189-99A2DB24B2FE}"/>
+              </a:ext>
+            </a:extLst>
+          </p:cNvPr>
+          <p:cNvSpPr>
+            <a:spLocks noGrp="1"/>
+          </p:cNvSpPr>
+          <p:nvPr>
+            <p:ph type="title"/>
+          </p:nvPr>
+        </p:nvSpPr>
+        <p:spPr>
+          <a:xfrm>
+            <a:off x="838200" y="365125"/>
+            <a:ext cx="5387502" cy="1325563"/>
+          </a:xfrm>
+        </p:spPr>
+        <p:txBody>
+          <a:bodyPr>
+            <a:normAutofit/>
+          </a:bodyPr>
+          <a:lstStyle/>
+          <a:p>
+            <a:r>
+              <a:rPr lang="en-US"/>
+              <a:t>Table Of Contents</a:t>
+            </a:r>
+            <a:endParaRPr lang="en-IN"/>
+          </a:p>
+        </p:txBody>
+      </p:sp>
+      <p:pic>
+        <p:nvPicPr>
+          <p:cNvPr id="15" name="Picture 14" descr="Background pattern&#10;&#10;Description automatically generated">
+            <a:extLst>
+              <a:ext uri="{FF2B5EF4-FFF2-40B4-BE49-F238E27FC236}">
+                <a16:creationId xmlns:a16="http://schemas.microsoft.com/office/drawing/2014/main" id="{89B0027F-47B8-9CC9-0365-EE19C7DC2F52}"/>
+              </a:ext>
+            </a:extLst>
+          </p:cNvPr>
+          <p:cNvPicPr>
+            <a:picLocks noChangeAspect="1"/>
+          </p:cNvPicPr>
+          <p:nvPr/>
+        </p:nvPicPr>
+        <p:blipFill rotWithShape="1">
+          <a:blip r:embed="rId2"/>
+          <a:srcRect l="25704" r="7449" b="2"/>
+          <a:stretch/>
+        </p:blipFill>
+        <p:spPr>
+          <a:xfrm>
+            <a:off x="6621294" y="1295416"/>
+            <a:ext cx="5570706" cy="5562584"/>
+          </a:xfrm>
+          <a:custGeom>
+            <a:avLst/>
+            <a:gdLst/>
+            <a:ahLst/>
+            <a:cxnLst/>
+            <a:rect l="l" t="t" r="r" b="b"/>
+            <a:pathLst>
+              <a:path w="5570706" h="5562584">
+                <a:moveTo>
+                  <a:pt x="3374687" y="0"/>
+                </a:moveTo>
+                <a:cubicBezTo>
+                  <a:pt x="4190094" y="0"/>
+                  <a:pt x="4937956" y="289196"/>
+                  <a:pt x="5521301" y="770615"/>
+                </a:cubicBezTo>
+                <a:lnTo>
+                  <a:pt x="5570706" y="815517"/>
+                </a:lnTo>
+                <a:lnTo>
+                  <a:pt x="5570706" y="5562584"/>
+                </a:lnTo>
+                <a:lnTo>
+                  <a:pt x="808135" y="5562584"/>
+                </a:lnTo>
+                <a:lnTo>
+                  <a:pt x="770615" y="5521302"/>
+                </a:lnTo>
+                <a:cubicBezTo>
+                  <a:pt x="289196" y="4937957"/>
+                  <a:pt x="0" y="4190095"/>
+                  <a:pt x="0" y="3374687"/>
+                </a:cubicBezTo>
+                <a:cubicBezTo>
+                  <a:pt x="0" y="1510899"/>
+                  <a:pt x="1510899" y="0"/>
+                  <a:pt x="3374687" y="0"/>
+                </a:cubicBezTo>
+                <a:close/>
+              </a:path>
+            </a:pathLst>
+          </a:custGeom>
+        </p:spPr>
+      </p:pic>
+      <p:sp>
+        <p:nvSpPr>
+          <p:cNvPr id="67" name="!!Oval">
+            <a:extLst>
+              <a:ext uri="{FF2B5EF4-FFF2-40B4-BE49-F238E27FC236}">
+                <a16:creationId xmlns:a16="http://schemas.microsoft.com/office/drawing/2014/main" id="{1D460C86-854F-4FB3-ABC2-E823D8FEB9DB}"/>
               </a:ext>
               <a:ext uri="{C183D7F6-B498-43B3-948B-1728B52AA6E4}">
                 <adec:decorative xmlns:adec="http://schemas.microsoft.com/office/drawing/2017/decorative" val="1"/>
@@ -12757,14 +14019,14 @@
         </p:nvSpPr>
         <p:spPr>
           <a:xfrm>
-            <a:off x="0" y="0"/>
-            <a:ext cx="12192000" cy="6858000"/>
+            <a:off x="6643451" y="1656147"/>
+            <a:ext cx="546100" cy="546100"/>
           </a:xfrm>
-          <a:prstGeom prst="rect">
+          <a:prstGeom prst="ellipse">
             <a:avLst/>
           </a:prstGeom>
           <a:solidFill>
-            <a:schemeClr val="bg1"/>
+            <a:schemeClr val="accent1"/>
           </a:solidFill>
           <a:ln>
             <a:noFill/>
@@ -12790,106 +14052,46 @@
           <a:bodyPr rtlCol="0" anchor="ctr"/>
           <a:lstStyle/>
           <a:p>
-            <a:pPr algn="ctr"/>
-            <a:endParaRPr lang="en-US" dirty="0"/>
+            <a:pPr marL="0" marR="0" lvl="0" indent="0" algn="ctr" defTabSz="914400" rtl="0" eaLnBrk="1" fontAlgn="auto" latinLnBrk="0" hangingPunct="1">
+              <a:lnSpc>
+                <a:spcPct val="100000"/>
+              </a:lnSpc>
+              <a:spcBef>
+                <a:spcPts val="0"/>
+              </a:spcBef>
+              <a:spcAft>
+                <a:spcPts val="0"/>
+              </a:spcAft>
+              <a:buClrTx/>
+              <a:buSzTx/>
+              <a:buFontTx/>
+              <a:buNone/>
+              <a:tabLst/>
+              <a:defRPr/>
+            </a:pPr>
+            <a:endParaRPr kumimoji="0" lang="en-US" sz="1800" b="0" i="0" u="none" strike="noStrike" kern="1200" cap="none" spc="0" normalizeH="0" baseline="0" noProof="0">
+              <a:ln>
+                <a:noFill/>
+              </a:ln>
+              <a:solidFill>
+                <a:srgbClr val="FFFFFF"/>
+              </a:solidFill>
+              <a:effectLst/>
+              <a:uLnTx/>
+              <a:uFillTx/>
+              <a:latin typeface="Calibri" panose="020F0502020204030204"/>
+              <a:ea typeface="+mn-ea"/>
+              <a:cs typeface="+mn-cs"/>
+            </a:endParaRPr>
           </a:p>
         </p:txBody>
       </p:sp>
       <p:sp>
         <p:nvSpPr>
-          <p:cNvPr id="2" name="Title 1">
+          <p:cNvPr id="69" name="!!Arc">
             <a:extLst>
               <a:ext uri="{FF2B5EF4-FFF2-40B4-BE49-F238E27FC236}">
-                <a16:creationId xmlns:a16="http://schemas.microsoft.com/office/drawing/2014/main" id="{F0BCF312-7E9B-88E0-E189-99A2DB24B2FE}"/>
-              </a:ext>
-            </a:extLst>
-          </p:cNvPr>
-          <p:cNvSpPr>
-            <a:spLocks noGrp="1"/>
-          </p:cNvSpPr>
-          <p:nvPr>
-            <p:ph type="title"/>
-          </p:nvPr>
-        </p:nvSpPr>
-        <p:spPr>
-          <a:xfrm>
-            <a:off x="643467" y="321734"/>
-            <a:ext cx="10905066" cy="1135737"/>
-          </a:xfrm>
-        </p:spPr>
-        <p:txBody>
-          <a:bodyPr>
-            <a:normAutofit/>
-          </a:bodyPr>
-          <a:lstStyle/>
-          <a:p>
-            <a:r>
-              <a:rPr lang="en-US" sz="3600"/>
-              <a:t>Table Of Contents</a:t>
-            </a:r>
-            <a:endParaRPr lang="en-IN" sz="3600"/>
-          </a:p>
-        </p:txBody>
-      </p:sp>
-      <p:pic>
-        <p:nvPicPr>
-          <p:cNvPr id="15" name="Picture 14" descr="Background pattern&#10;&#10;Description automatically generated">
-            <a:extLst>
-              <a:ext uri="{FF2B5EF4-FFF2-40B4-BE49-F238E27FC236}">
-                <a16:creationId xmlns:a16="http://schemas.microsoft.com/office/drawing/2014/main" id="{89B0027F-47B8-9CC9-0365-EE19C7DC2F52}"/>
-              </a:ext>
-            </a:extLst>
-          </p:cNvPr>
-          <p:cNvPicPr>
-            <a:picLocks noChangeAspect="1"/>
-          </p:cNvPicPr>
-          <p:nvPr/>
-        </p:nvPicPr>
-        <p:blipFill rotWithShape="1">
-          <a:blip r:embed="rId2"/>
-          <a:srcRect l="28946" r="10692" b="2"/>
-          <a:stretch/>
-        </p:blipFill>
-        <p:spPr>
-          <a:xfrm>
-            <a:off x="7777393" y="1976277"/>
-            <a:ext cx="4414606" cy="4881723"/>
-          </a:xfrm>
-          <a:custGeom>
-            <a:avLst/>
-            <a:gdLst/>
-            <a:ahLst/>
-            <a:cxnLst/>
-            <a:rect l="l" t="t" r="r" b="b"/>
-            <a:pathLst>
-              <a:path w="4414606" h="4881723">
-                <a:moveTo>
-                  <a:pt x="3151661" y="0"/>
-                </a:moveTo>
-                <a:lnTo>
-                  <a:pt x="4414606" y="1262946"/>
-                </a:lnTo>
-                <a:lnTo>
-                  <a:pt x="4414606" y="4881723"/>
-                </a:lnTo>
-                <a:lnTo>
-                  <a:pt x="1730061" y="4881723"/>
-                </a:lnTo>
-                <a:lnTo>
-                  <a:pt x="0" y="3151662"/>
-                </a:lnTo>
-                <a:close/>
-              </a:path>
-            </a:pathLst>
-          </a:custGeom>
-        </p:spPr>
-      </p:pic>
-      <p:sp>
-        <p:nvSpPr>
-          <p:cNvPr id="54" name="Rectangle 53">
-            <a:extLst>
-              <a:ext uri="{FF2B5EF4-FFF2-40B4-BE49-F238E27FC236}">
-                <a16:creationId xmlns:a16="http://schemas.microsoft.com/office/drawing/2014/main" id="{2E80C965-DB6D-4F81-9E9E-B027384D0BD6}"/>
+                <a16:creationId xmlns:a16="http://schemas.microsoft.com/office/drawing/2014/main" id="{BB48116A-278A-4CC5-89D3-9DE8E8FF1245}"/>
               </a:ext>
               <a:ext uri="{C183D7F6-B498-43B3-948B-1728B52AA6E4}">
                 <adec:decorative xmlns:adec="http://schemas.microsoft.com/office/drawing/2017/decorative" val="1"/>
@@ -12908,243 +14110,73 @@
           </p:nvPr>
         </p:nvSpPr>
         <p:spPr>
-          <a:xfrm rot="2700000">
-            <a:off x="11052629" y="2120024"/>
-            <a:ext cx="645368" cy="645368"/>
+          <a:xfrm>
+            <a:off x="8134739" y="587516"/>
+            <a:ext cx="2987899" cy="2987899"/>
           </a:xfrm>
-          <a:prstGeom prst="rect">
-            <a:avLst/>
+          <a:prstGeom prst="arc">
+            <a:avLst>
+              <a:gd name="adj1" fmla="val 15817365"/>
+              <a:gd name="adj2" fmla="val 1781380"/>
+            </a:avLst>
           </a:prstGeom>
-          <a:solidFill>
-            <a:schemeClr val="accent4">
-              <a:alpha val="30000"/>
-            </a:schemeClr>
-          </a:solidFill>
-          <a:ln>
-            <a:noFill/>
+          <a:ln w="127000" cap="rnd">
+            <a:solidFill>
+              <a:schemeClr val="accent4"/>
+            </a:solidFill>
+            <a:prstDash val="dash"/>
+            <a:miter lim="800000"/>
           </a:ln>
         </p:spPr>
         <p:style>
-          <a:lnRef idx="2">
-            <a:schemeClr val="accent1">
-              <a:shade val="50000"/>
-            </a:schemeClr>
+          <a:lnRef idx="1">
+            <a:schemeClr val="accent1"/>
           </a:lnRef>
-          <a:fillRef idx="1">
+          <a:fillRef idx="0">
             <a:schemeClr val="accent1"/>
           </a:fillRef>
           <a:effectRef idx="0">
             <a:schemeClr val="accent1"/>
           </a:effectRef>
           <a:fontRef idx="minor">
-            <a:schemeClr val="lt1"/>
+            <a:schemeClr val="tx1"/>
           </a:fontRef>
         </p:style>
         <p:txBody>
           <a:bodyPr rtlCol="0" anchor="ctr"/>
           <a:lstStyle/>
           <a:p>
-            <a:pPr algn="ctr"/>
-            <a:endParaRPr lang="en-US"/>
-          </a:p>
-        </p:txBody>
-      </p:sp>
-      <p:sp>
-        <p:nvSpPr>
-          <p:cNvPr id="56" name="Isosceles Triangle 55">
-            <a:extLst>
-              <a:ext uri="{FF2B5EF4-FFF2-40B4-BE49-F238E27FC236}">
-                <a16:creationId xmlns:a16="http://schemas.microsoft.com/office/drawing/2014/main" id="{A580F890-B085-4E95-96AA-55AEBEC5CE6E}"/>
-              </a:ext>
-              <a:ext uri="{C183D7F6-B498-43B3-948B-1728B52AA6E4}">
-                <adec:decorative xmlns:adec="http://schemas.microsoft.com/office/drawing/2017/decorative" val="1"/>
-              </a:ext>
-            </a:extLst>
-          </p:cNvPr>
-          <p:cNvSpPr>
-            <a:spLocks noGrp="1" noRot="1" noChangeAspect="1" noMove="1" noResize="1" noEditPoints="1" noAdjustHandles="1" noChangeArrowheads="1" noChangeShapeType="1" noTextEdit="1"/>
-          </p:cNvSpPr>
-          <p:nvPr>
-            <p:extLst>
-              <p:ext uri="{386F3935-93C4-4BCD-93E2-E3B085C9AB24}">
-                <p16:designElem xmlns:p16="http://schemas.microsoft.com/office/powerpoint/2015/main" val="1"/>
-              </p:ext>
-            </p:extLst>
-          </p:nvPr>
-        </p:nvSpPr>
-        <p:spPr>
-          <a:xfrm rot="16200000">
-            <a:off x="10289068" y="1343027"/>
-            <a:ext cx="2532832" cy="1273032"/>
-          </a:xfrm>
-          <a:prstGeom prst="triangle">
-            <a:avLst>
-              <a:gd name="adj" fmla="val 50000"/>
-            </a:avLst>
-          </a:prstGeom>
-          <a:solidFill>
-            <a:schemeClr val="accent4">
-              <a:alpha val="30000"/>
-            </a:schemeClr>
-          </a:solidFill>
-          <a:ln>
-            <a:noFill/>
-          </a:ln>
-        </p:spPr>
-        <p:style>
-          <a:lnRef idx="2">
-            <a:schemeClr val="accent1">
-              <a:shade val="50000"/>
-            </a:schemeClr>
-          </a:lnRef>
-          <a:fillRef idx="1">
-            <a:schemeClr val="accent1"/>
-          </a:fillRef>
-          <a:effectRef idx="0">
-            <a:schemeClr val="accent1"/>
-          </a:effectRef>
-          <a:fontRef idx="minor">
-            <a:schemeClr val="lt1"/>
-          </a:fontRef>
-        </p:style>
-        <p:txBody>
-          <a:bodyPr rtlCol="0" anchor="ctr"/>
-          <a:lstStyle/>
-          <a:p>
-            <a:pPr algn="ctr"/>
-            <a:endParaRPr lang="en-US"/>
-          </a:p>
-        </p:txBody>
-      </p:sp>
-      <p:sp>
-        <p:nvSpPr>
-          <p:cNvPr id="58" name="Isosceles Triangle 57">
-            <a:extLst>
-              <a:ext uri="{FF2B5EF4-FFF2-40B4-BE49-F238E27FC236}">
-                <a16:creationId xmlns:a16="http://schemas.microsoft.com/office/drawing/2014/main" id="{D3F51FEB-38FB-4F6C-9F7B-2F2AFAB65463}"/>
-              </a:ext>
-              <a:ext uri="{C183D7F6-B498-43B3-948B-1728B52AA6E4}">
-                <adec:decorative xmlns:adec="http://schemas.microsoft.com/office/drawing/2017/decorative" val="1"/>
-              </a:ext>
-            </a:extLst>
-          </p:cNvPr>
-          <p:cNvSpPr>
-            <a:spLocks noGrp="1" noRot="1" noChangeAspect="1" noMove="1" noResize="1" noEditPoints="1" noAdjustHandles="1" noChangeArrowheads="1" noChangeShapeType="1" noTextEdit="1"/>
-          </p:cNvSpPr>
-          <p:nvPr>
-            <p:extLst>
-              <p:ext uri="{386F3935-93C4-4BCD-93E2-E3B085C9AB24}">
-                <p16:designElem xmlns:p16="http://schemas.microsoft.com/office/powerpoint/2015/main" val="1"/>
-              </p:ext>
-            </p:extLst>
-          </p:nvPr>
-        </p:nvSpPr>
-        <p:spPr>
-          <a:xfrm rot="5400000">
-            <a:off x="-501760" y="5103257"/>
-            <a:ext cx="2017580" cy="1014060"/>
-          </a:xfrm>
-          <a:prstGeom prst="triangle">
-            <a:avLst>
-              <a:gd name="adj" fmla="val 50000"/>
-            </a:avLst>
-          </a:prstGeom>
-          <a:solidFill>
-            <a:schemeClr val="accent1">
-              <a:alpha val="30000"/>
-            </a:schemeClr>
-          </a:solidFill>
-          <a:ln>
-            <a:noFill/>
-          </a:ln>
-        </p:spPr>
-        <p:style>
-          <a:lnRef idx="2">
-            <a:schemeClr val="accent1">
-              <a:shade val="50000"/>
-            </a:schemeClr>
-          </a:lnRef>
-          <a:fillRef idx="1">
-            <a:schemeClr val="accent1"/>
-          </a:fillRef>
-          <a:effectRef idx="0">
-            <a:schemeClr val="accent1"/>
-          </a:effectRef>
-          <a:fontRef idx="minor">
-            <a:schemeClr val="lt1"/>
-          </a:fontRef>
-        </p:style>
-        <p:txBody>
-          <a:bodyPr rtlCol="0" anchor="ctr"/>
-          <a:lstStyle/>
-          <a:p>
-            <a:pPr algn="ctr"/>
-            <a:endParaRPr lang="en-US"/>
-          </a:p>
-        </p:txBody>
-      </p:sp>
-      <p:sp>
-        <p:nvSpPr>
-          <p:cNvPr id="60" name="Rectangle 59">
-            <a:extLst>
-              <a:ext uri="{FF2B5EF4-FFF2-40B4-BE49-F238E27FC236}">
-                <a16:creationId xmlns:a16="http://schemas.microsoft.com/office/drawing/2014/main" id="{1E547BA6-BAE0-43BB-A7CA-60F69CE252F0}"/>
-              </a:ext>
-              <a:ext uri="{C183D7F6-B498-43B3-948B-1728B52AA6E4}">
-                <adec:decorative xmlns:adec="http://schemas.microsoft.com/office/drawing/2017/decorative" val="1"/>
-              </a:ext>
-            </a:extLst>
-          </p:cNvPr>
-          <p:cNvSpPr>
-            <a:spLocks noGrp="1" noRot="1" noChangeAspect="1" noMove="1" noResize="1" noEditPoints="1" noAdjustHandles="1" noChangeArrowheads="1" noChangeShapeType="1" noTextEdit="1"/>
-          </p:cNvSpPr>
-          <p:nvPr>
-            <p:extLst>
-              <p:ext uri="{386F3935-93C4-4BCD-93E2-E3B085C9AB24}">
-                <p16:designElem xmlns:p16="http://schemas.microsoft.com/office/powerpoint/2015/main" val="1"/>
-              </p:ext>
-            </p:extLst>
-          </p:nvPr>
-        </p:nvSpPr>
-        <p:spPr>
-          <a:xfrm rot="2700000">
-            <a:off x="427916" y="5728708"/>
-            <a:ext cx="485578" cy="485578"/>
-          </a:xfrm>
-          <a:prstGeom prst="rect">
-            <a:avLst/>
-          </a:prstGeom>
-          <a:solidFill>
-            <a:schemeClr val="accent1">
-              <a:alpha val="30000"/>
-            </a:schemeClr>
-          </a:solidFill>
-          <a:ln>
-            <a:noFill/>
-          </a:ln>
-        </p:spPr>
-        <p:style>
-          <a:lnRef idx="2">
-            <a:schemeClr val="accent1">
-              <a:shade val="50000"/>
-            </a:schemeClr>
-          </a:lnRef>
-          <a:fillRef idx="1">
-            <a:schemeClr val="accent1"/>
-          </a:fillRef>
-          <a:effectRef idx="0">
-            <a:schemeClr val="accent1"/>
-          </a:effectRef>
-          <a:fontRef idx="minor">
-            <a:schemeClr val="lt1"/>
-          </a:fontRef>
-        </p:style>
-        <p:txBody>
-          <a:bodyPr rtlCol="0" anchor="ctr"/>
-          <a:lstStyle/>
-          <a:p>
-            <a:pPr algn="ctr"/>
-            <a:endParaRPr lang="en-US"/>
+            <a:pPr marL="0" marR="0" lvl="0" indent="0" algn="ctr" defTabSz="914400" rtl="0" eaLnBrk="1" fontAlgn="auto" latinLnBrk="0" hangingPunct="1">
+              <a:lnSpc>
+                <a:spcPct val="100000"/>
+              </a:lnSpc>
+              <a:spcBef>
+                <a:spcPts val="0"/>
+              </a:spcBef>
+              <a:spcAft>
+                <a:spcPts val="0"/>
+              </a:spcAft>
+              <a:buClrTx/>
+              <a:buSzTx/>
+              <a:buFontTx/>
+              <a:buNone/>
+              <a:tabLst/>
+              <a:defRPr/>
+            </a:pPr>
+            <a:endParaRPr kumimoji="0" lang="en-US" sz="1800" b="0" i="0" u="none" strike="noStrike" kern="1200" cap="none" spc="0" normalizeH="0" baseline="0" noProof="0">
+              <a:ln>
+                <a:noFill/>
+              </a:ln>
+              <a:solidFill>
+                <a:srgbClr val="000000"/>
+              </a:solidFill>
+              <a:effectLst/>
+              <a:uLnTx/>
+              <a:uFillTx/>
+              <a:latin typeface="Calibri" panose="020F0502020204030204"/>
+              <a:ea typeface="+mn-ea"/>
+              <a:cs typeface="+mn-cs"/>
+            </a:endParaRPr>
           </a:p>
         </p:txBody>
       </p:sp>
@@ -13164,14 +14196,14 @@
             <p:ph idx="1"/>
             <p:extLst>
               <p:ext uri="{D42A27DB-BD31-4B8C-83A1-F6EECF244321}">
-                <p14:modId xmlns:p14="http://schemas.microsoft.com/office/powerpoint/2010/main" val="895980805"/>
+                <p14:modId xmlns:p14="http://schemas.microsoft.com/office/powerpoint/2010/main" val="2182910782"/>
               </p:ext>
             </p:extLst>
           </p:nvPr>
         </p:nvGraphicFramePr>
         <p:xfrm>
-          <a:off x="643468" y="1782981"/>
-          <a:ext cx="6891188" cy="4393982"/>
+          <a:off x="838200" y="1825625"/>
+          <a:ext cx="5387502" cy="4351338"/>
         </p:xfrm>
         <a:graphic>
           <a:graphicData uri="http://schemas.openxmlformats.org/drawingml/2006/diagram">
@@ -13187,7 +14219,7 @@
     </p:extLst>
   </p:cSld>
   <p:clrMapOvr>
-    <a:overrideClrMapping bg1="lt1" tx1="dk1" bg2="lt2" tx2="dk2" accent1="accent1" accent2="accent2" accent3="accent3" accent4="accent4" accent5="accent5" accent6="accent6" hlink="hlink" folHlink="folHlink"/>
+    <a:masterClrMapping/>
   </p:clrMapOvr>
 </p:sld>
 </file>

</xml_diff>